<commit_message>
Site updated: 2020-06-06 17:12:17
</commit_message>
<xml_diff>
--- a/img/pic.pptx
+++ b/img/pic.pptx
@@ -26463,7 +26463,7 @@
         </p:nvCxnSpPr>
         <p:spPr>
           <a:xfrm>
-            <a:off x="4419600" y="3428999"/>
+            <a:off x="4419600" y="3124192"/>
             <a:ext cx="0" cy="2528476"/>
           </a:xfrm>
           <a:prstGeom prst="line">
@@ -26505,7 +26505,7 @@
         </p:nvCxnSpPr>
         <p:spPr>
           <a:xfrm>
-            <a:off x="5391150" y="3428999"/>
+            <a:off x="5391150" y="3124192"/>
             <a:ext cx="0" cy="2528476"/>
           </a:xfrm>
           <a:prstGeom prst="line">
@@ -26547,7 +26547,7 @@
         </p:nvCxnSpPr>
         <p:spPr>
           <a:xfrm>
-            <a:off x="1562100" y="3428999"/>
+            <a:off x="1562100" y="3124192"/>
             <a:ext cx="0" cy="2528476"/>
           </a:xfrm>
           <a:prstGeom prst="line">
@@ -26589,7 +26589,7 @@
         </p:nvCxnSpPr>
         <p:spPr>
           <a:xfrm>
-            <a:off x="2533650" y="3428999"/>
+            <a:off x="2533650" y="3124192"/>
             <a:ext cx="0" cy="2528476"/>
           </a:xfrm>
           <a:prstGeom prst="line">
@@ -26707,7 +26707,7 @@
         </p:nvSpPr>
         <p:spPr>
           <a:xfrm>
-            <a:off x="4152902" y="4596263"/>
+            <a:off x="4152902" y="4291456"/>
             <a:ext cx="328936" cy="369332"/>
           </a:xfrm>
           <a:prstGeom prst="rect">
@@ -26743,7 +26743,7 @@
         </p:nvSpPr>
         <p:spPr>
           <a:xfrm>
-            <a:off x="5331458" y="4599954"/>
+            <a:off x="5331458" y="4295147"/>
             <a:ext cx="423514" cy="369332"/>
           </a:xfrm>
           <a:prstGeom prst="rect">
@@ -26819,7 +26819,7 @@
         </p:nvSpPr>
         <p:spPr>
           <a:xfrm>
-            <a:off x="3623484" y="3465362"/>
+            <a:off x="3623484" y="3160555"/>
             <a:ext cx="679994" cy="369332"/>
           </a:xfrm>
           <a:prstGeom prst="rect">
@@ -26841,505 +26841,484 @@
           </a:p>
         </p:txBody>
       </p:sp>
-      <p:grpSp>
-        <p:nvGrpSpPr>
-          <p:cNvPr id="34" name="组合 33">
+      <p:pic>
+        <p:nvPicPr>
+          <p:cNvPr id="7" name="图片 6">
             <a:extLst>
               <a:ext uri="{FF2B5EF4-FFF2-40B4-BE49-F238E27FC236}">
-                <a16:creationId xmlns:a16="http://schemas.microsoft.com/office/drawing/2014/main" id="{DF1DF391-1D8E-4424-9CE1-22DCE6F14B68}"/>
+                <a16:creationId xmlns:a16="http://schemas.microsoft.com/office/drawing/2014/main" id="{3A6632E5-EA32-4757-89C3-34AED5C72C0E}"/>
               </a:ext>
             </a:extLst>
           </p:cNvPr>
-          <p:cNvGrpSpPr/>
+          <p:cNvPicPr>
+            <a:picLocks noChangeAspect="1"/>
+          </p:cNvPicPr>
           <p:nvPr/>
-        </p:nvGrpSpPr>
-        <p:grpSpPr>
+        </p:nvPicPr>
+        <p:blipFill rotWithShape="1">
+          <a:blip r:embed="rId4">
+            <a:extLst>
+              <a:ext uri="{28A0092B-C50C-407E-A947-70E740481C1C}">
+                <a14:useLocalDpi xmlns:a14="http://schemas.microsoft.com/office/drawing/2010/main" val="0"/>
+              </a:ext>
+            </a:extLst>
+          </a:blip>
+          <a:srcRect l="13742" r="15790"/>
+          <a:stretch/>
+        </p:blipFill>
+        <p:spPr>
           <a:xfrm>
-            <a:off x="5971396" y="537921"/>
-            <a:ext cx="5565957" cy="5094436"/>
-            <a:chOff x="6833861" y="576313"/>
-            <a:chExt cx="5565957" cy="5094436"/>
+            <a:off x="5971396" y="537923"/>
+            <a:ext cx="5565957" cy="5094434"/>
           </a:xfrm>
-        </p:grpSpPr>
-        <p:pic>
-          <p:nvPicPr>
-            <p:cNvPr id="7" name="图片 6">
-              <a:extLst>
-                <a:ext uri="{FF2B5EF4-FFF2-40B4-BE49-F238E27FC236}">
-                  <a16:creationId xmlns:a16="http://schemas.microsoft.com/office/drawing/2014/main" id="{3A6632E5-EA32-4757-89C3-34AED5C72C0E}"/>
-                </a:ext>
-              </a:extLst>
-            </p:cNvPr>
-            <p:cNvPicPr>
-              <a:picLocks noChangeAspect="1"/>
-            </p:cNvPicPr>
-            <p:nvPr/>
-          </p:nvPicPr>
-          <p:blipFill rotWithShape="1">
-            <a:blip r:embed="rId4">
-              <a:extLst>
-                <a:ext uri="{28A0092B-C50C-407E-A947-70E740481C1C}">
-                  <a14:useLocalDpi xmlns:a14="http://schemas.microsoft.com/office/drawing/2010/main" val="0"/>
-                </a:ext>
-              </a:extLst>
-            </a:blip>
-            <a:srcRect l="13742" r="15790"/>
-            <a:stretch/>
-          </p:blipFill>
-          <p:spPr>
-            <a:xfrm>
-              <a:off x="6833861" y="576315"/>
-              <a:ext cx="5565957" cy="5094434"/>
-            </a:xfrm>
-            <a:prstGeom prst="rect">
-              <a:avLst/>
-            </a:prstGeom>
-            <a:ln>
-              <a:solidFill>
-                <a:schemeClr val="tx1"/>
-              </a:solidFill>
-            </a:ln>
-          </p:spPr>
-        </p:pic>
-        <p:cxnSp>
-          <p:nvCxnSpPr>
-            <p:cNvPr id="17" name="直接连接符 16">
-              <a:extLst>
-                <a:ext uri="{FF2B5EF4-FFF2-40B4-BE49-F238E27FC236}">
-                  <a16:creationId xmlns:a16="http://schemas.microsoft.com/office/drawing/2014/main" id="{1F2FF5A1-4B5F-4D5B-A089-DAB2120D9470}"/>
-                </a:ext>
-              </a:extLst>
-            </p:cNvPr>
-            <p:cNvCxnSpPr>
-              <a:cxnSpLocks/>
-            </p:cNvCxnSpPr>
-            <p:nvPr/>
-          </p:nvCxnSpPr>
-          <p:spPr>
-            <a:xfrm>
-              <a:off x="8960696" y="576315"/>
-              <a:ext cx="0" cy="5094434"/>
-            </a:xfrm>
-            <a:prstGeom prst="line">
-              <a:avLst/>
-            </a:prstGeom>
-            <a:ln w="12700">
-              <a:solidFill>
-                <a:srgbClr val="390606"/>
-              </a:solidFill>
-              <a:prstDash val="dash"/>
-            </a:ln>
-          </p:spPr>
-          <p:style>
-            <a:lnRef idx="1">
-              <a:schemeClr val="accent1"/>
-            </a:lnRef>
-            <a:fillRef idx="0">
-              <a:schemeClr val="accent1"/>
-            </a:fillRef>
-            <a:effectRef idx="0">
-              <a:schemeClr val="accent1"/>
-            </a:effectRef>
-            <a:fontRef idx="minor">
+          <a:prstGeom prst="rect">
+            <a:avLst/>
+          </a:prstGeom>
+          <a:ln>
+            <a:solidFill>
               <a:schemeClr val="tx1"/>
-            </a:fontRef>
-          </p:style>
-        </p:cxnSp>
-        <p:cxnSp>
-          <p:nvCxnSpPr>
-            <p:cNvPr id="20" name="直接连接符 19">
-              <a:extLst>
-                <a:ext uri="{FF2B5EF4-FFF2-40B4-BE49-F238E27FC236}">
-                  <a16:creationId xmlns:a16="http://schemas.microsoft.com/office/drawing/2014/main" id="{93495EDC-E073-4C8F-BCC7-AC8B1F85F449}"/>
-                </a:ext>
-              </a:extLst>
-            </p:cNvPr>
-            <p:cNvCxnSpPr>
-              <a:cxnSpLocks/>
-            </p:cNvCxnSpPr>
-            <p:nvPr/>
-          </p:nvCxnSpPr>
-          <p:spPr>
-            <a:xfrm>
-              <a:off x="7554492" y="576314"/>
-              <a:ext cx="0" cy="5094434"/>
-            </a:xfrm>
-            <a:prstGeom prst="line">
-              <a:avLst/>
-            </a:prstGeom>
-            <a:ln w="12700">
-              <a:solidFill>
-                <a:srgbClr val="390606"/>
-              </a:solidFill>
-              <a:prstDash val="dash"/>
-            </a:ln>
-          </p:spPr>
-          <p:style>
-            <a:lnRef idx="1">
-              <a:schemeClr val="accent1"/>
-            </a:lnRef>
-            <a:fillRef idx="0">
-              <a:schemeClr val="accent1"/>
-            </a:fillRef>
-            <a:effectRef idx="0">
-              <a:schemeClr val="accent1"/>
-            </a:effectRef>
-            <a:fontRef idx="minor">
-              <a:schemeClr val="tx1"/>
-            </a:fontRef>
-          </p:style>
-        </p:cxnSp>
-        <p:cxnSp>
-          <p:nvCxnSpPr>
-            <p:cNvPr id="21" name="直接连接符 20">
-              <a:extLst>
-                <a:ext uri="{FF2B5EF4-FFF2-40B4-BE49-F238E27FC236}">
-                  <a16:creationId xmlns:a16="http://schemas.microsoft.com/office/drawing/2014/main" id="{2F1B2DAC-607E-4D30-BD46-95627F02FB52}"/>
-                </a:ext>
-              </a:extLst>
-            </p:cNvPr>
-            <p:cNvCxnSpPr>
-              <a:cxnSpLocks/>
-            </p:cNvCxnSpPr>
-            <p:nvPr/>
-          </p:nvCxnSpPr>
-          <p:spPr>
-            <a:xfrm>
-              <a:off x="11731745" y="576314"/>
-              <a:ext cx="0" cy="5094434"/>
-            </a:xfrm>
-            <a:prstGeom prst="line">
-              <a:avLst/>
-            </a:prstGeom>
-            <a:ln w="12700">
-              <a:solidFill>
-                <a:srgbClr val="390606"/>
-              </a:solidFill>
-              <a:prstDash val="dash"/>
-            </a:ln>
-          </p:spPr>
-          <p:style>
-            <a:lnRef idx="1">
-              <a:schemeClr val="accent1"/>
-            </a:lnRef>
-            <a:fillRef idx="0">
-              <a:schemeClr val="accent1"/>
-            </a:fillRef>
-            <a:effectRef idx="0">
-              <a:schemeClr val="accent1"/>
-            </a:effectRef>
-            <a:fontRef idx="minor">
-              <a:schemeClr val="tx1"/>
-            </a:fontRef>
-          </p:style>
-        </p:cxnSp>
-        <p:cxnSp>
-          <p:nvCxnSpPr>
-            <p:cNvPr id="22" name="直接连接符 21">
-              <a:extLst>
-                <a:ext uri="{FF2B5EF4-FFF2-40B4-BE49-F238E27FC236}">
-                  <a16:creationId xmlns:a16="http://schemas.microsoft.com/office/drawing/2014/main" id="{E6AEB320-3A3E-422E-B926-A10220F97AAD}"/>
-                </a:ext>
-              </a:extLst>
-            </p:cNvPr>
-            <p:cNvCxnSpPr>
-              <a:cxnSpLocks/>
-            </p:cNvCxnSpPr>
-            <p:nvPr/>
-          </p:nvCxnSpPr>
-          <p:spPr>
-            <a:xfrm>
-              <a:off x="10325541" y="576313"/>
-              <a:ext cx="0" cy="5094434"/>
-            </a:xfrm>
-            <a:prstGeom prst="line">
-              <a:avLst/>
-            </a:prstGeom>
-            <a:ln w="12700">
-              <a:solidFill>
-                <a:srgbClr val="390606"/>
-              </a:solidFill>
-              <a:prstDash val="dash"/>
-            </a:ln>
-          </p:spPr>
-          <p:style>
-            <a:lnRef idx="1">
-              <a:schemeClr val="accent1"/>
-            </a:lnRef>
-            <a:fillRef idx="0">
-              <a:schemeClr val="accent1"/>
-            </a:fillRef>
-            <a:effectRef idx="0">
-              <a:schemeClr val="accent1"/>
-            </a:effectRef>
-            <a:fontRef idx="minor">
-              <a:schemeClr val="tx1"/>
-            </a:fontRef>
-          </p:style>
-        </p:cxnSp>
-        <mc:AlternateContent xmlns:mc="http://schemas.openxmlformats.org/markup-compatibility/2006" xmlns:a14="http://schemas.microsoft.com/office/drawing/2010/main">
-          <mc:Choice Requires="a14">
-            <p:sp>
-              <p:nvSpPr>
-                <p:cNvPr id="27" name="文本框 26">
-                  <a:extLst>
-                    <a:ext uri="{FF2B5EF4-FFF2-40B4-BE49-F238E27FC236}">
-                      <a16:creationId xmlns:a16="http://schemas.microsoft.com/office/drawing/2014/main" id="{56991216-AF95-4FC5-A413-E25FE2E84CCF}"/>
-                    </a:ext>
-                  </a:extLst>
-                </p:cNvPr>
-                <p:cNvSpPr txBox="1"/>
-                <p:nvPr/>
-              </p:nvSpPr>
-              <p:spPr>
-                <a:xfrm>
-                  <a:off x="10278666" y="2375119"/>
-                  <a:ext cx="617627" cy="659728"/>
-                </a:xfrm>
-                <a:prstGeom prst="rect">
-                  <a:avLst/>
-                </a:prstGeom>
-                <a:noFill/>
-              </p:spPr>
-              <p:txBody>
-                <a:bodyPr wrap="none" rtlCol="0">
-                  <a:spAutoFit/>
-                </a:bodyPr>
-                <a:lstStyle/>
-                <a:p>
-                  <a14:m>
-                    <m:oMath xmlns:m="http://schemas.openxmlformats.org/officeDocument/2006/math">
-                      <m:f>
-                        <m:fPr>
-                          <m:ctrlPr>
-                            <a:rPr lang="en-US" altLang="zh-CN" i="1" smtClean="0">
-                              <a:latin typeface="Cambria Math" panose="02040503050406030204" pitchFamily="18" charset="0"/>
-                            </a:rPr>
-                          </m:ctrlPr>
-                        </m:fPr>
-                        <m:num>
-                          <m:r>
-                            <a:rPr lang="en-US" altLang="zh-CN" b="0" i="1" smtClean="0">
-                              <a:latin typeface="Cambria Math" panose="02040503050406030204" pitchFamily="18" charset="0"/>
-                            </a:rPr>
-                            <m:t>1</m:t>
-                          </m:r>
-                        </m:num>
-                        <m:den>
-                          <m:r>
-                            <a:rPr lang="en-US" altLang="zh-CN" b="0" i="1" smtClean="0">
-                              <a:latin typeface="Cambria Math" panose="02040503050406030204" pitchFamily="18" charset="0"/>
-                            </a:rPr>
-                            <m:t>2</m:t>
-                          </m:r>
-                        </m:den>
-                      </m:f>
-                    </m:oMath>
-                  </a14:m>
-                  <a:r>
-                    <a:rPr lang="en-US" altLang="zh-CN" dirty="0"/>
-                    <a:t>π</a:t>
-                  </a:r>
-                  <a:endParaRPr lang="zh-CN" altLang="en-US" dirty="0"/>
-                </a:p>
-              </p:txBody>
-            </p:sp>
-          </mc:Choice>
-          <mc:Fallback xmlns="">
-            <p:sp>
-              <p:nvSpPr>
-                <p:cNvPr id="27" name="文本框 26">
-                  <a:extLst>
-                    <a:ext uri="{FF2B5EF4-FFF2-40B4-BE49-F238E27FC236}">
-                      <a16:creationId xmlns:a16="http://schemas.microsoft.com/office/drawing/2014/main" id="{56991216-AF95-4FC5-A413-E25FE2E84CCF}"/>
-                    </a:ext>
-                  </a:extLst>
-                </p:cNvPr>
-                <p:cNvSpPr txBox="1">
-                  <a:spLocks noRot="1" noChangeAspect="1" noMove="1" noResize="1" noEditPoints="1" noAdjustHandles="1" noChangeArrowheads="1" noChangeShapeType="1" noTextEdit="1"/>
-                </p:cNvSpPr>
-                <p:nvPr/>
-              </p:nvSpPr>
-              <p:spPr>
-                <a:xfrm>
-                  <a:off x="10278666" y="2375119"/>
-                  <a:ext cx="617627" cy="659728"/>
-                </a:xfrm>
-                <a:prstGeom prst="rect">
-                  <a:avLst/>
-                </a:prstGeom>
-                <a:blipFill>
-                  <a:blip r:embed="rId5"/>
-                  <a:stretch>
-                    <a:fillRect/>
-                  </a:stretch>
-                </a:blipFill>
-              </p:spPr>
-              <p:txBody>
-                <a:bodyPr/>
-                <a:lstStyle/>
-                <a:p>
-                  <a:r>
-                    <a:rPr lang="zh-CN" altLang="en-US">
-                      <a:noFill/>
-                    </a:rPr>
-                    <a:t> </a:t>
-                  </a:r>
-                </a:p>
-              </p:txBody>
-            </p:sp>
-          </mc:Fallback>
-        </mc:AlternateContent>
-        <mc:AlternateContent xmlns:mc="http://schemas.openxmlformats.org/markup-compatibility/2006" xmlns:a14="http://schemas.microsoft.com/office/drawing/2010/main">
-          <mc:Choice Requires="a14">
-            <p:sp>
-              <p:nvSpPr>
-                <p:cNvPr id="29" name="文本框 28">
-                  <a:extLst>
-                    <a:ext uri="{FF2B5EF4-FFF2-40B4-BE49-F238E27FC236}">
-                      <a16:creationId xmlns:a16="http://schemas.microsoft.com/office/drawing/2014/main" id="{CD580CBF-323F-4B42-8BDC-D3C34E57EEAC}"/>
-                    </a:ext>
-                  </a:extLst>
-                </p:cNvPr>
-                <p:cNvSpPr txBox="1"/>
-                <p:nvPr/>
-              </p:nvSpPr>
-              <p:spPr>
-                <a:xfrm>
-                  <a:off x="11684870" y="2380053"/>
-                  <a:ext cx="617627" cy="659728"/>
-                </a:xfrm>
-                <a:prstGeom prst="rect">
-                  <a:avLst/>
-                </a:prstGeom>
-                <a:noFill/>
-              </p:spPr>
-              <p:txBody>
-                <a:bodyPr wrap="none" rtlCol="0">
-                  <a:spAutoFit/>
-                </a:bodyPr>
-                <a:lstStyle/>
-                <a:p>
-                  <a14:m>
-                    <m:oMath xmlns:m="http://schemas.openxmlformats.org/officeDocument/2006/math">
-                      <m:f>
-                        <m:fPr>
-                          <m:ctrlPr>
-                            <a:rPr lang="en-US" altLang="zh-CN" i="1" smtClean="0">
-                              <a:latin typeface="Cambria Math" panose="02040503050406030204" pitchFamily="18" charset="0"/>
-                            </a:rPr>
-                          </m:ctrlPr>
-                        </m:fPr>
-                        <m:num>
-                          <m:r>
-                            <a:rPr lang="en-US" altLang="zh-CN" b="0" i="1" smtClean="0">
-                              <a:latin typeface="Cambria Math" panose="02040503050406030204" pitchFamily="18" charset="0"/>
-                            </a:rPr>
-                            <m:t>3</m:t>
-                          </m:r>
-                        </m:num>
-                        <m:den>
-                          <m:r>
-                            <a:rPr lang="en-US" altLang="zh-CN" b="0" i="1" smtClean="0">
-                              <a:latin typeface="Cambria Math" panose="02040503050406030204" pitchFamily="18" charset="0"/>
-                            </a:rPr>
-                            <m:t>2</m:t>
-                          </m:r>
-                        </m:den>
-                      </m:f>
-                    </m:oMath>
-                  </a14:m>
-                  <a:r>
-                    <a:rPr lang="en-US" altLang="zh-CN" dirty="0"/>
-                    <a:t>π</a:t>
-                  </a:r>
-                  <a:endParaRPr lang="zh-CN" altLang="en-US" dirty="0"/>
-                </a:p>
-              </p:txBody>
-            </p:sp>
-          </mc:Choice>
-          <mc:Fallback xmlns="">
-            <p:sp>
-              <p:nvSpPr>
-                <p:cNvPr id="29" name="文本框 28">
-                  <a:extLst>
-                    <a:ext uri="{FF2B5EF4-FFF2-40B4-BE49-F238E27FC236}">
-                      <a16:creationId xmlns:a16="http://schemas.microsoft.com/office/drawing/2014/main" id="{CD580CBF-323F-4B42-8BDC-D3C34E57EEAC}"/>
-                    </a:ext>
-                  </a:extLst>
-                </p:cNvPr>
-                <p:cNvSpPr txBox="1">
-                  <a:spLocks noRot="1" noChangeAspect="1" noMove="1" noResize="1" noEditPoints="1" noAdjustHandles="1" noChangeArrowheads="1" noChangeShapeType="1" noTextEdit="1"/>
-                </p:cNvSpPr>
-                <p:nvPr/>
-              </p:nvSpPr>
-              <p:spPr>
-                <a:xfrm>
-                  <a:off x="11684870" y="2380053"/>
-                  <a:ext cx="617627" cy="659728"/>
-                </a:xfrm>
-                <a:prstGeom prst="rect">
-                  <a:avLst/>
-                </a:prstGeom>
-                <a:blipFill>
-                  <a:blip r:embed="rId6"/>
-                  <a:stretch>
-                    <a:fillRect/>
-                  </a:stretch>
-                </a:blipFill>
-              </p:spPr>
-              <p:txBody>
-                <a:bodyPr/>
-                <a:lstStyle/>
-                <a:p>
-                  <a:r>
-                    <a:rPr lang="zh-CN" altLang="en-US">
-                      <a:noFill/>
-                    </a:rPr>
-                    <a:t> </a:t>
-                  </a:r>
-                </a:p>
-              </p:txBody>
-            </p:sp>
-          </mc:Fallback>
-        </mc:AlternateContent>
-        <p:sp>
-          <p:nvSpPr>
-            <p:cNvPr id="32" name="文本框 31">
-              <a:extLst>
-                <a:ext uri="{FF2B5EF4-FFF2-40B4-BE49-F238E27FC236}">
-                  <a16:creationId xmlns:a16="http://schemas.microsoft.com/office/drawing/2014/main" id="{2BCB6C3B-824E-4B76-9BFC-B1373A191AB5}"/>
-                </a:ext>
-              </a:extLst>
-            </p:cNvPr>
-            <p:cNvSpPr txBox="1"/>
-            <p:nvPr/>
-          </p:nvSpPr>
-          <p:spPr>
-            <a:xfrm>
-              <a:off x="10365435" y="614449"/>
-              <a:ext cx="984211" cy="503983"/>
-            </a:xfrm>
-            <a:prstGeom prst="rect">
-              <a:avLst/>
-            </a:prstGeom>
-            <a:noFill/>
-          </p:spPr>
-          <p:txBody>
-            <a:bodyPr wrap="none" rtlCol="0">
-              <a:spAutoFit/>
-            </a:bodyPr>
-            <a:lstStyle/>
-            <a:p>
-              <a:r>
-                <a:rPr lang="en-US" altLang="zh-CN" dirty="0"/>
-                <a:t>tan x</a:t>
-              </a:r>
-              <a:endParaRPr lang="zh-CN" altLang="en-US" dirty="0"/>
-            </a:p>
-          </p:txBody>
-        </p:sp>
-      </p:grpSp>
+            </a:solidFill>
+          </a:ln>
+        </p:spPr>
+      </p:pic>
+      <p:cxnSp>
+        <p:nvCxnSpPr>
+          <p:cNvPr id="17" name="直接连接符 16">
+            <a:extLst>
+              <a:ext uri="{FF2B5EF4-FFF2-40B4-BE49-F238E27FC236}">
+                <a16:creationId xmlns:a16="http://schemas.microsoft.com/office/drawing/2014/main" id="{1F2FF5A1-4B5F-4D5B-A089-DAB2120D9470}"/>
+              </a:ext>
+            </a:extLst>
+          </p:cNvPr>
+          <p:cNvCxnSpPr>
+            <a:cxnSpLocks/>
+          </p:cNvCxnSpPr>
+          <p:nvPr/>
+        </p:nvCxnSpPr>
+        <p:spPr>
+          <a:xfrm>
+            <a:off x="8098231" y="537923"/>
+            <a:ext cx="0" cy="5094434"/>
+          </a:xfrm>
+          <a:prstGeom prst="line">
+            <a:avLst/>
+          </a:prstGeom>
+          <a:ln w="12700">
+            <a:solidFill>
+              <a:srgbClr val="390606"/>
+            </a:solidFill>
+            <a:prstDash val="dash"/>
+          </a:ln>
+        </p:spPr>
+        <p:style>
+          <a:lnRef idx="1">
+            <a:schemeClr val="accent1"/>
+          </a:lnRef>
+          <a:fillRef idx="0">
+            <a:schemeClr val="accent1"/>
+          </a:fillRef>
+          <a:effectRef idx="0">
+            <a:schemeClr val="accent1"/>
+          </a:effectRef>
+          <a:fontRef idx="minor">
+            <a:schemeClr val="tx1"/>
+          </a:fontRef>
+        </p:style>
+      </p:cxnSp>
+      <p:cxnSp>
+        <p:nvCxnSpPr>
+          <p:cNvPr id="20" name="直接连接符 19">
+            <a:extLst>
+              <a:ext uri="{FF2B5EF4-FFF2-40B4-BE49-F238E27FC236}">
+                <a16:creationId xmlns:a16="http://schemas.microsoft.com/office/drawing/2014/main" id="{93495EDC-E073-4C8F-BCC7-AC8B1F85F449}"/>
+              </a:ext>
+            </a:extLst>
+          </p:cNvPr>
+          <p:cNvCxnSpPr>
+            <a:cxnSpLocks/>
+          </p:cNvCxnSpPr>
+          <p:nvPr/>
+        </p:nvCxnSpPr>
+        <p:spPr>
+          <a:xfrm>
+            <a:off x="6692027" y="537922"/>
+            <a:ext cx="0" cy="5094434"/>
+          </a:xfrm>
+          <a:prstGeom prst="line">
+            <a:avLst/>
+          </a:prstGeom>
+          <a:ln w="12700">
+            <a:solidFill>
+              <a:srgbClr val="390606"/>
+            </a:solidFill>
+            <a:prstDash val="dash"/>
+          </a:ln>
+        </p:spPr>
+        <p:style>
+          <a:lnRef idx="1">
+            <a:schemeClr val="accent1"/>
+          </a:lnRef>
+          <a:fillRef idx="0">
+            <a:schemeClr val="accent1"/>
+          </a:fillRef>
+          <a:effectRef idx="0">
+            <a:schemeClr val="accent1"/>
+          </a:effectRef>
+          <a:fontRef idx="minor">
+            <a:schemeClr val="tx1"/>
+          </a:fontRef>
+        </p:style>
+      </p:cxnSp>
+      <p:cxnSp>
+        <p:nvCxnSpPr>
+          <p:cNvPr id="21" name="直接连接符 20">
+            <a:extLst>
+              <a:ext uri="{FF2B5EF4-FFF2-40B4-BE49-F238E27FC236}">
+                <a16:creationId xmlns:a16="http://schemas.microsoft.com/office/drawing/2014/main" id="{2F1B2DAC-607E-4D30-BD46-95627F02FB52}"/>
+              </a:ext>
+            </a:extLst>
+          </p:cNvPr>
+          <p:cNvCxnSpPr>
+            <a:cxnSpLocks/>
+          </p:cNvCxnSpPr>
+          <p:nvPr/>
+        </p:nvCxnSpPr>
+        <p:spPr>
+          <a:xfrm>
+            <a:off x="10869280" y="537922"/>
+            <a:ext cx="0" cy="5094434"/>
+          </a:xfrm>
+          <a:prstGeom prst="line">
+            <a:avLst/>
+          </a:prstGeom>
+          <a:ln w="12700">
+            <a:solidFill>
+              <a:srgbClr val="390606"/>
+            </a:solidFill>
+            <a:prstDash val="dash"/>
+          </a:ln>
+        </p:spPr>
+        <p:style>
+          <a:lnRef idx="1">
+            <a:schemeClr val="accent1"/>
+          </a:lnRef>
+          <a:fillRef idx="0">
+            <a:schemeClr val="accent1"/>
+          </a:fillRef>
+          <a:effectRef idx="0">
+            <a:schemeClr val="accent1"/>
+          </a:effectRef>
+          <a:fontRef idx="minor">
+            <a:schemeClr val="tx1"/>
+          </a:fontRef>
+        </p:style>
+      </p:cxnSp>
+      <p:cxnSp>
+        <p:nvCxnSpPr>
+          <p:cNvPr id="22" name="直接连接符 21">
+            <a:extLst>
+              <a:ext uri="{FF2B5EF4-FFF2-40B4-BE49-F238E27FC236}">
+                <a16:creationId xmlns:a16="http://schemas.microsoft.com/office/drawing/2014/main" id="{E6AEB320-3A3E-422E-B926-A10220F97AAD}"/>
+              </a:ext>
+            </a:extLst>
+          </p:cNvPr>
+          <p:cNvCxnSpPr>
+            <a:cxnSpLocks/>
+          </p:cNvCxnSpPr>
+          <p:nvPr/>
+        </p:nvCxnSpPr>
+        <p:spPr>
+          <a:xfrm>
+            <a:off x="9463076" y="537921"/>
+            <a:ext cx="0" cy="5094434"/>
+          </a:xfrm>
+          <a:prstGeom prst="line">
+            <a:avLst/>
+          </a:prstGeom>
+          <a:ln w="12700">
+            <a:solidFill>
+              <a:srgbClr val="390606"/>
+            </a:solidFill>
+            <a:prstDash val="dash"/>
+          </a:ln>
+        </p:spPr>
+        <p:style>
+          <a:lnRef idx="1">
+            <a:schemeClr val="accent1"/>
+          </a:lnRef>
+          <a:fillRef idx="0">
+            <a:schemeClr val="accent1"/>
+          </a:fillRef>
+          <a:effectRef idx="0">
+            <a:schemeClr val="accent1"/>
+          </a:effectRef>
+          <a:fontRef idx="minor">
+            <a:schemeClr val="tx1"/>
+          </a:fontRef>
+        </p:style>
+      </p:cxnSp>
+      <mc:AlternateContent xmlns:mc="http://schemas.openxmlformats.org/markup-compatibility/2006">
+        <mc:Choice xmlns:a14="http://schemas.microsoft.com/office/drawing/2010/main" Requires="a14">
+          <p:sp>
+            <p:nvSpPr>
+              <p:cNvPr id="27" name="文本框 26">
+                <a:extLst>
+                  <a:ext uri="{FF2B5EF4-FFF2-40B4-BE49-F238E27FC236}">
+                    <a16:creationId xmlns:a16="http://schemas.microsoft.com/office/drawing/2014/main" id="{56991216-AF95-4FC5-A413-E25FE2E84CCF}"/>
+                  </a:ext>
+                </a:extLst>
+              </p:cNvPr>
+              <p:cNvSpPr txBox="1"/>
+              <p:nvPr/>
+            </p:nvSpPr>
+            <p:spPr>
+              <a:xfrm>
+                <a:off x="9416201" y="2336727"/>
+                <a:ext cx="617627" cy="659728"/>
+              </a:xfrm>
+              <a:prstGeom prst="rect">
+                <a:avLst/>
+              </a:prstGeom>
+              <a:noFill/>
+            </p:spPr>
+            <p:txBody>
+              <a:bodyPr wrap="none" rtlCol="0">
+                <a:spAutoFit/>
+              </a:bodyPr>
+              <a:lstStyle/>
+              <a:p>
+                <a14:m>
+                  <m:oMath xmlns:m="http://schemas.openxmlformats.org/officeDocument/2006/math">
+                    <m:f>
+                      <m:fPr>
+                        <m:ctrlPr>
+                          <a:rPr lang="en-US" altLang="zh-CN" i="1" smtClean="0">
+                            <a:latin typeface="Cambria Math" panose="02040503050406030204" pitchFamily="18" charset="0"/>
+                          </a:rPr>
+                        </m:ctrlPr>
+                      </m:fPr>
+                      <m:num>
+                        <m:r>
+                          <a:rPr lang="en-US" altLang="zh-CN" b="0" i="1" smtClean="0">
+                            <a:latin typeface="Cambria Math" panose="02040503050406030204" pitchFamily="18" charset="0"/>
+                          </a:rPr>
+                          <m:t>1</m:t>
+                        </m:r>
+                      </m:num>
+                      <m:den>
+                        <m:r>
+                          <a:rPr lang="en-US" altLang="zh-CN" b="0" i="1" smtClean="0">
+                            <a:latin typeface="Cambria Math" panose="02040503050406030204" pitchFamily="18" charset="0"/>
+                          </a:rPr>
+                          <m:t>2</m:t>
+                        </m:r>
+                      </m:den>
+                    </m:f>
+                  </m:oMath>
+                </a14:m>
+                <a:r>
+                  <a:rPr lang="en-US" altLang="zh-CN" dirty="0"/>
+                  <a:t>π</a:t>
+                </a:r>
+                <a:endParaRPr lang="zh-CN" altLang="en-US" dirty="0"/>
+              </a:p>
+            </p:txBody>
+          </p:sp>
+        </mc:Choice>
+        <mc:Fallback>
+          <p:sp>
+            <p:nvSpPr>
+              <p:cNvPr id="27" name="文本框 26">
+                <a:extLst>
+                  <a:ext uri="{FF2B5EF4-FFF2-40B4-BE49-F238E27FC236}">
+                    <a16:creationId xmlns:a16="http://schemas.microsoft.com/office/drawing/2014/main" id="{56991216-AF95-4FC5-A413-E25FE2E84CCF}"/>
+                  </a:ext>
+                </a:extLst>
+              </p:cNvPr>
+              <p:cNvSpPr txBox="1">
+                <a:spLocks noRot="1" noChangeAspect="1" noMove="1" noResize="1" noEditPoints="1" noAdjustHandles="1" noChangeArrowheads="1" noChangeShapeType="1" noTextEdit="1"/>
+              </p:cNvSpPr>
+              <p:nvPr/>
+            </p:nvSpPr>
+            <p:spPr>
+              <a:xfrm>
+                <a:off x="9416201" y="2336727"/>
+                <a:ext cx="617627" cy="659728"/>
+              </a:xfrm>
+              <a:prstGeom prst="rect">
+                <a:avLst/>
+              </a:prstGeom>
+              <a:blipFill>
+                <a:blip r:embed="rId5"/>
+                <a:stretch>
+                  <a:fillRect/>
+                </a:stretch>
+              </a:blipFill>
+            </p:spPr>
+            <p:txBody>
+              <a:bodyPr/>
+              <a:lstStyle/>
+              <a:p>
+                <a:r>
+                  <a:rPr lang="zh-CN" altLang="en-US">
+                    <a:noFill/>
+                  </a:rPr>
+                  <a:t> </a:t>
+                </a:r>
+              </a:p>
+            </p:txBody>
+          </p:sp>
+        </mc:Fallback>
+      </mc:AlternateContent>
+      <mc:AlternateContent xmlns:mc="http://schemas.openxmlformats.org/markup-compatibility/2006">
+        <mc:Choice xmlns:a14="http://schemas.microsoft.com/office/drawing/2010/main" Requires="a14">
+          <p:sp>
+            <p:nvSpPr>
+              <p:cNvPr id="29" name="文本框 28">
+                <a:extLst>
+                  <a:ext uri="{FF2B5EF4-FFF2-40B4-BE49-F238E27FC236}">
+                    <a16:creationId xmlns:a16="http://schemas.microsoft.com/office/drawing/2014/main" id="{CD580CBF-323F-4B42-8BDC-D3C34E57EEAC}"/>
+                  </a:ext>
+                </a:extLst>
+              </p:cNvPr>
+              <p:cNvSpPr txBox="1"/>
+              <p:nvPr/>
+            </p:nvSpPr>
+            <p:spPr>
+              <a:xfrm>
+                <a:off x="10822405" y="2341661"/>
+                <a:ext cx="617627" cy="659728"/>
+              </a:xfrm>
+              <a:prstGeom prst="rect">
+                <a:avLst/>
+              </a:prstGeom>
+              <a:noFill/>
+            </p:spPr>
+            <p:txBody>
+              <a:bodyPr wrap="none" rtlCol="0">
+                <a:spAutoFit/>
+              </a:bodyPr>
+              <a:lstStyle/>
+              <a:p>
+                <a14:m>
+                  <m:oMath xmlns:m="http://schemas.openxmlformats.org/officeDocument/2006/math">
+                    <m:f>
+                      <m:fPr>
+                        <m:ctrlPr>
+                          <a:rPr lang="en-US" altLang="zh-CN" i="1" smtClean="0">
+                            <a:latin typeface="Cambria Math" panose="02040503050406030204" pitchFamily="18" charset="0"/>
+                          </a:rPr>
+                        </m:ctrlPr>
+                      </m:fPr>
+                      <m:num>
+                        <m:r>
+                          <a:rPr lang="en-US" altLang="zh-CN" b="0" i="1" smtClean="0">
+                            <a:latin typeface="Cambria Math" panose="02040503050406030204" pitchFamily="18" charset="0"/>
+                          </a:rPr>
+                          <m:t>3</m:t>
+                        </m:r>
+                      </m:num>
+                      <m:den>
+                        <m:r>
+                          <a:rPr lang="en-US" altLang="zh-CN" b="0" i="1" smtClean="0">
+                            <a:latin typeface="Cambria Math" panose="02040503050406030204" pitchFamily="18" charset="0"/>
+                          </a:rPr>
+                          <m:t>2</m:t>
+                        </m:r>
+                      </m:den>
+                    </m:f>
+                  </m:oMath>
+                </a14:m>
+                <a:r>
+                  <a:rPr lang="en-US" altLang="zh-CN" dirty="0"/>
+                  <a:t>π</a:t>
+                </a:r>
+                <a:endParaRPr lang="zh-CN" altLang="en-US" dirty="0"/>
+              </a:p>
+            </p:txBody>
+          </p:sp>
+        </mc:Choice>
+        <mc:Fallback>
+          <p:sp>
+            <p:nvSpPr>
+              <p:cNvPr id="29" name="文本框 28">
+                <a:extLst>
+                  <a:ext uri="{FF2B5EF4-FFF2-40B4-BE49-F238E27FC236}">
+                    <a16:creationId xmlns:a16="http://schemas.microsoft.com/office/drawing/2014/main" id="{CD580CBF-323F-4B42-8BDC-D3C34E57EEAC}"/>
+                  </a:ext>
+                </a:extLst>
+              </p:cNvPr>
+              <p:cNvSpPr txBox="1">
+                <a:spLocks noRot="1" noChangeAspect="1" noMove="1" noResize="1" noEditPoints="1" noAdjustHandles="1" noChangeArrowheads="1" noChangeShapeType="1" noTextEdit="1"/>
+              </p:cNvSpPr>
+              <p:nvPr/>
+            </p:nvSpPr>
+            <p:spPr>
+              <a:xfrm>
+                <a:off x="10822405" y="2341661"/>
+                <a:ext cx="617627" cy="659728"/>
+              </a:xfrm>
+              <a:prstGeom prst="rect">
+                <a:avLst/>
+              </a:prstGeom>
+              <a:blipFill>
+                <a:blip r:embed="rId6"/>
+                <a:stretch>
+                  <a:fillRect/>
+                </a:stretch>
+              </a:blipFill>
+            </p:spPr>
+            <p:txBody>
+              <a:bodyPr/>
+              <a:lstStyle/>
+              <a:p>
+                <a:r>
+                  <a:rPr lang="zh-CN" altLang="en-US">
+                    <a:noFill/>
+                  </a:rPr>
+                  <a:t> </a:t>
+                </a:r>
+              </a:p>
+            </p:txBody>
+          </p:sp>
+        </mc:Fallback>
+      </mc:AlternateContent>
+      <p:sp>
+        <p:nvSpPr>
+          <p:cNvPr id="32" name="文本框 31">
+            <a:extLst>
+              <a:ext uri="{FF2B5EF4-FFF2-40B4-BE49-F238E27FC236}">
+                <a16:creationId xmlns:a16="http://schemas.microsoft.com/office/drawing/2014/main" id="{2BCB6C3B-824E-4B76-9BFC-B1373A191AB5}"/>
+              </a:ext>
+            </a:extLst>
+          </p:cNvPr>
+          <p:cNvSpPr txBox="1"/>
+          <p:nvPr/>
+        </p:nvSpPr>
+        <p:spPr>
+          <a:xfrm>
+            <a:off x="9502970" y="576057"/>
+            <a:ext cx="984211" cy="503983"/>
+          </a:xfrm>
+          <a:prstGeom prst="rect">
+            <a:avLst/>
+          </a:prstGeom>
+          <a:noFill/>
+        </p:spPr>
+        <p:txBody>
+          <a:bodyPr wrap="none" rtlCol="0">
+            <a:spAutoFit/>
+          </a:bodyPr>
+          <a:lstStyle/>
+          <a:p>
+            <a:r>
+              <a:rPr lang="en-US" altLang="zh-CN" dirty="0"/>
+              <a:t>tan x</a:t>
+            </a:r>
+            <a:endParaRPr lang="zh-CN" altLang="en-US" dirty="0"/>
+          </a:p>
+        </p:txBody>
+      </p:sp>
     </p:spTree>
     <p:extLst>
       <p:ext uri="{BB962C8B-B14F-4D97-AF65-F5344CB8AC3E}">

</xml_diff>

<commit_message>
Site updated: 2020-07-16 11:31:18
</commit_message>
<xml_diff>
--- a/img/pic.pptx
+++ b/img/pic.pptx
@@ -5,7 +5,7 @@
     <p:sldMasterId id="2147483648" r:id="rId1"/>
   </p:sldMasterIdLst>
   <p:notesMasterIdLst>
-    <p:notesMasterId r:id="rId9"/>
+    <p:notesMasterId r:id="rId8"/>
   </p:notesMasterIdLst>
   <p:sldIdLst>
     <p:sldId id="256" r:id="rId2"/>
@@ -13,8 +13,7 @@
     <p:sldId id="258" r:id="rId4"/>
     <p:sldId id="259" r:id="rId5"/>
     <p:sldId id="260" r:id="rId6"/>
-    <p:sldId id="261" r:id="rId7"/>
-    <p:sldId id="262" r:id="rId8"/>
+    <p:sldId id="263" r:id="rId7"/>
   </p:sldIdLst>
   <p:sldSz cx="12192000" cy="6858000"/>
   <p:notesSz cx="6858000" cy="9144000"/>
@@ -203,7 +202,7 @@
           <a:p>
             <a:fld id="{6C1D4226-1D08-4AB6-B9A0-83A7BEB3795D}" type="datetimeFigureOut">
               <a:rPr lang="zh-CN" altLang="en-US" smtClean="0"/>
-              <a:t>2020/6/6</a:t>
+              <a:t>2020/7/16</a:t>
             </a:fld>
             <a:endParaRPr lang="zh-CN" altLang="en-US"/>
           </a:p>
@@ -701,7 +700,7 @@
           <a:p>
             <a:fld id="{AD787EDF-0DB4-449C-B77F-F665B7FCA930}" type="datetimeFigureOut">
               <a:rPr lang="zh-CN" altLang="en-US" smtClean="0"/>
-              <a:t>2020/6/6</a:t>
+              <a:t>2020/7/16</a:t>
             </a:fld>
             <a:endParaRPr lang="zh-CN" altLang="en-US"/>
           </a:p>
@@ -899,7 +898,7 @@
           <a:p>
             <a:fld id="{AD787EDF-0DB4-449C-B77F-F665B7FCA930}" type="datetimeFigureOut">
               <a:rPr lang="zh-CN" altLang="en-US" smtClean="0"/>
-              <a:t>2020/6/6</a:t>
+              <a:t>2020/7/16</a:t>
             </a:fld>
             <a:endParaRPr lang="zh-CN" altLang="en-US"/>
           </a:p>
@@ -1107,7 +1106,7 @@
           <a:p>
             <a:fld id="{AD787EDF-0DB4-449C-B77F-F665B7FCA930}" type="datetimeFigureOut">
               <a:rPr lang="zh-CN" altLang="en-US" smtClean="0"/>
-              <a:t>2020/6/6</a:t>
+              <a:t>2020/7/16</a:t>
             </a:fld>
             <a:endParaRPr lang="zh-CN" altLang="en-US"/>
           </a:p>
@@ -1305,7 +1304,7 @@
           <a:p>
             <a:fld id="{AD787EDF-0DB4-449C-B77F-F665B7FCA930}" type="datetimeFigureOut">
               <a:rPr lang="zh-CN" altLang="en-US" smtClean="0"/>
-              <a:t>2020/6/6</a:t>
+              <a:t>2020/7/16</a:t>
             </a:fld>
             <a:endParaRPr lang="zh-CN" altLang="en-US"/>
           </a:p>
@@ -1580,7 +1579,7 @@
           <a:p>
             <a:fld id="{AD787EDF-0DB4-449C-B77F-F665B7FCA930}" type="datetimeFigureOut">
               <a:rPr lang="zh-CN" altLang="en-US" smtClean="0"/>
-              <a:t>2020/6/6</a:t>
+              <a:t>2020/7/16</a:t>
             </a:fld>
             <a:endParaRPr lang="zh-CN" altLang="en-US"/>
           </a:p>
@@ -1845,7 +1844,7 @@
           <a:p>
             <a:fld id="{AD787EDF-0DB4-449C-B77F-F665B7FCA930}" type="datetimeFigureOut">
               <a:rPr lang="zh-CN" altLang="en-US" smtClean="0"/>
-              <a:t>2020/6/6</a:t>
+              <a:t>2020/7/16</a:t>
             </a:fld>
             <a:endParaRPr lang="zh-CN" altLang="en-US"/>
           </a:p>
@@ -2257,7 +2256,7 @@
           <a:p>
             <a:fld id="{AD787EDF-0DB4-449C-B77F-F665B7FCA930}" type="datetimeFigureOut">
               <a:rPr lang="zh-CN" altLang="en-US" smtClean="0"/>
-              <a:t>2020/6/6</a:t>
+              <a:t>2020/7/16</a:t>
             </a:fld>
             <a:endParaRPr lang="zh-CN" altLang="en-US"/>
           </a:p>
@@ -2398,7 +2397,7 @@
           <a:p>
             <a:fld id="{AD787EDF-0DB4-449C-B77F-F665B7FCA930}" type="datetimeFigureOut">
               <a:rPr lang="zh-CN" altLang="en-US" smtClean="0"/>
-              <a:t>2020/6/6</a:t>
+              <a:t>2020/7/16</a:t>
             </a:fld>
             <a:endParaRPr lang="zh-CN" altLang="en-US"/>
           </a:p>
@@ -2511,7 +2510,7 @@
           <a:p>
             <a:fld id="{AD787EDF-0DB4-449C-B77F-F665B7FCA930}" type="datetimeFigureOut">
               <a:rPr lang="zh-CN" altLang="en-US" smtClean="0"/>
-              <a:t>2020/6/6</a:t>
+              <a:t>2020/7/16</a:t>
             </a:fld>
             <a:endParaRPr lang="zh-CN" altLang="en-US"/>
           </a:p>
@@ -2822,7 +2821,7 @@
           <a:p>
             <a:fld id="{AD787EDF-0DB4-449C-B77F-F665B7FCA930}" type="datetimeFigureOut">
               <a:rPr lang="zh-CN" altLang="en-US" smtClean="0"/>
-              <a:t>2020/6/6</a:t>
+              <a:t>2020/7/16</a:t>
             </a:fld>
             <a:endParaRPr lang="zh-CN" altLang="en-US"/>
           </a:p>
@@ -3110,7 +3109,7 @@
           <a:p>
             <a:fld id="{AD787EDF-0DB4-449C-B77F-F665B7FCA930}" type="datetimeFigureOut">
               <a:rPr lang="zh-CN" altLang="en-US" smtClean="0"/>
-              <a:t>2020/6/6</a:t>
+              <a:t>2020/7/16</a:t>
             </a:fld>
             <a:endParaRPr lang="zh-CN" altLang="en-US"/>
           </a:p>
@@ -3351,7 +3350,7 @@
           <a:p>
             <a:fld id="{AD787EDF-0DB4-449C-B77F-F665B7FCA930}" type="datetimeFigureOut">
               <a:rPr lang="zh-CN" altLang="en-US" smtClean="0"/>
-              <a:t>2020/6/6</a:t>
+              <a:t>2020/7/16</a:t>
             </a:fld>
             <a:endParaRPr lang="zh-CN" altLang="en-US"/>
           </a:p>
@@ -26201,111 +26200,33 @@
           <a:chExt cx="0" cy="0"/>
         </a:xfrm>
       </p:grpSpPr>
-      <p:pic>
-        <p:nvPicPr>
-          <p:cNvPr id="3" name="图片 2">
+      <p:sp>
+        <p:nvSpPr>
+          <p:cNvPr id="37" name="椭圆 36">
             <a:extLst>
               <a:ext uri="{FF2B5EF4-FFF2-40B4-BE49-F238E27FC236}">
-                <a16:creationId xmlns:a16="http://schemas.microsoft.com/office/drawing/2014/main" id="{1D79434C-148D-4BB5-B4AA-542616D6E744}"/>
+                <a16:creationId xmlns:a16="http://schemas.microsoft.com/office/drawing/2014/main" id="{DD49F40B-9EA5-4E13-BE1B-ADE8A70DEB36}"/>
               </a:ext>
             </a:extLst>
           </p:cNvPr>
-          <p:cNvPicPr>
-            <a:picLocks noChangeAspect="1"/>
-          </p:cNvPicPr>
+          <p:cNvSpPr/>
           <p:nvPr/>
-        </p:nvPicPr>
-        <p:blipFill rotWithShape="1">
-          <a:blip r:embed="rId2">
-            <a:extLst>
-              <a:ext uri="{28A0092B-C50C-407E-A947-70E740481C1C}">
-                <a14:useLocalDpi xmlns:a14="http://schemas.microsoft.com/office/drawing/2010/main" val="0"/>
-              </a:ext>
-            </a:extLst>
-          </a:blip>
-          <a:srcRect l="8846" r="9484" b="17550"/>
-          <a:stretch/>
-        </p:blipFill>
+        </p:nvSpPr>
         <p:spPr>
           <a:xfrm>
-            <a:off x="1047750" y="537921"/>
-            <a:ext cx="4876799" cy="2528476"/>
+            <a:off x="5837431" y="1560659"/>
+            <a:ext cx="928254" cy="526474"/>
           </a:xfrm>
-          <a:prstGeom prst="rect">
+          <a:prstGeom prst="ellipse">
             <a:avLst/>
           </a:prstGeom>
-          <a:ln>
+          <a:solidFill>
+            <a:srgbClr val="EFCAC3"/>
+          </a:solidFill>
+          <a:ln w="28575">
             <a:solidFill>
-              <a:schemeClr val="tx1"/>
+              <a:srgbClr val="EFCAC3"/>
             </a:solidFill>
-          </a:ln>
-        </p:spPr>
-      </p:pic>
-      <p:pic>
-        <p:nvPicPr>
-          <p:cNvPr id="5" name="图片 4">
-            <a:extLst>
-              <a:ext uri="{FF2B5EF4-FFF2-40B4-BE49-F238E27FC236}">
-                <a16:creationId xmlns:a16="http://schemas.microsoft.com/office/drawing/2014/main" id="{EBF32D3D-10BC-4C1B-89C9-37E2069A8249}"/>
-              </a:ext>
-            </a:extLst>
-          </p:cNvPr>
-          <p:cNvPicPr>
-            <a:picLocks noChangeAspect="1"/>
-          </p:cNvPicPr>
-          <p:nvPr/>
-        </p:nvPicPr>
-        <p:blipFill rotWithShape="1">
-          <a:blip r:embed="rId3">
-            <a:extLst>
-              <a:ext uri="{28A0092B-C50C-407E-A947-70E740481C1C}">
-                <a14:useLocalDpi xmlns:a14="http://schemas.microsoft.com/office/drawing/2010/main" val="0"/>
-              </a:ext>
-            </a:extLst>
-          </a:blip>
-          <a:srcRect l="1471" r="1179" b="4500"/>
-          <a:stretch/>
-        </p:blipFill>
-        <p:spPr>
-          <a:xfrm>
-            <a:off x="1047750" y="3104947"/>
-            <a:ext cx="4876799" cy="2528475"/>
-          </a:xfrm>
-          <a:prstGeom prst="rect">
-            <a:avLst/>
-          </a:prstGeom>
-          <a:ln>
-            <a:solidFill>
-              <a:schemeClr val="tx1"/>
-            </a:solidFill>
-          </a:ln>
-        </p:spPr>
-      </p:pic>
-      <p:cxnSp>
-        <p:nvCxnSpPr>
-          <p:cNvPr id="9" name="直接连接符 8">
-            <a:extLst>
-              <a:ext uri="{FF2B5EF4-FFF2-40B4-BE49-F238E27FC236}">
-                <a16:creationId xmlns:a16="http://schemas.microsoft.com/office/drawing/2014/main" id="{292BBA2A-A276-48A9-AFBD-88E3A33626B6}"/>
-              </a:ext>
-            </a:extLst>
-          </p:cNvPr>
-          <p:cNvCxnSpPr/>
-          <p:nvPr/>
-        </p:nvCxnSpPr>
-        <p:spPr>
-          <a:xfrm>
-            <a:off x="4419600" y="537921"/>
-            <a:ext cx="0" cy="2528476"/>
-          </a:xfrm>
-          <a:prstGeom prst="line">
-            <a:avLst/>
-          </a:prstGeom>
-          <a:ln w="12700">
-            <a:solidFill>
-              <a:srgbClr val="390606"/>
-            </a:solidFill>
-            <a:prstDash val="dash"/>
           </a:ln>
         </p:spPr>
         <p:style>
@@ -26322,32 +26243,42 @@
             <a:schemeClr val="tx1"/>
           </a:fontRef>
         </p:style>
-      </p:cxnSp>
-      <p:cxnSp>
-        <p:nvCxnSpPr>
-          <p:cNvPr id="10" name="直接连接符 9">
+        <p:txBody>
+          <a:bodyPr rtlCol="0" anchor="ctr"/>
+          <a:lstStyle/>
+          <a:p>
+            <a:pPr algn="ctr"/>
+            <a:endParaRPr lang="zh-CN" altLang="en-US"/>
+          </a:p>
+        </p:txBody>
+      </p:sp>
+      <p:sp>
+        <p:nvSpPr>
+          <p:cNvPr id="9" name="椭圆 8">
             <a:extLst>
               <a:ext uri="{FF2B5EF4-FFF2-40B4-BE49-F238E27FC236}">
-                <a16:creationId xmlns:a16="http://schemas.microsoft.com/office/drawing/2014/main" id="{ADC730BB-7685-4E02-9F66-66632CDC6968}"/>
+                <a16:creationId xmlns:a16="http://schemas.microsoft.com/office/drawing/2014/main" id="{F2485E97-833C-4F00-9AB6-24F687187C2C}"/>
               </a:ext>
             </a:extLst>
           </p:cNvPr>
-          <p:cNvCxnSpPr/>
+          <p:cNvSpPr/>
           <p:nvPr/>
-        </p:nvCxnSpPr>
+        </p:nvSpPr>
         <p:spPr>
           <a:xfrm>
-            <a:off x="5391150" y="537921"/>
-            <a:ext cx="0" cy="2528476"/>
+            <a:off x="4405744" y="1560659"/>
+            <a:ext cx="928254" cy="526474"/>
           </a:xfrm>
-          <a:prstGeom prst="line">
+          <a:prstGeom prst="ellipse">
             <a:avLst/>
           </a:prstGeom>
-          <a:ln w="12700">
+          <a:solidFill>
+            <a:srgbClr val="F9EBE9"/>
+          </a:solidFill>
+          <a:ln w="28575">
             <a:solidFill>
-              <a:srgbClr val="390606"/>
+              <a:srgbClr val="F9EBE9"/>
             </a:solidFill>
-            <a:prstDash val="dash"/>
           </a:ln>
         </p:spPr>
         <p:style>
@@ -26364,32 +26295,42 @@
             <a:schemeClr val="tx1"/>
           </a:fontRef>
         </p:style>
-      </p:cxnSp>
-      <p:cxnSp>
-        <p:nvCxnSpPr>
-          <p:cNvPr id="11" name="直接连接符 10">
+        <p:txBody>
+          <a:bodyPr rtlCol="0" anchor="ctr"/>
+          <a:lstStyle/>
+          <a:p>
+            <a:pPr algn="ctr"/>
+            <a:endParaRPr lang="zh-CN" altLang="en-US"/>
+          </a:p>
+        </p:txBody>
+      </p:sp>
+      <p:sp>
+        <p:nvSpPr>
+          <p:cNvPr id="38" name="椭圆 37">
             <a:extLst>
               <a:ext uri="{FF2B5EF4-FFF2-40B4-BE49-F238E27FC236}">
-                <a16:creationId xmlns:a16="http://schemas.microsoft.com/office/drawing/2014/main" id="{15D57D2B-7B65-40BF-A967-3F464A456A00}"/>
+                <a16:creationId xmlns:a16="http://schemas.microsoft.com/office/drawing/2014/main" id="{7C67A41C-B82F-458F-AC5B-016873CD0593}"/>
               </a:ext>
             </a:extLst>
           </p:cNvPr>
-          <p:cNvCxnSpPr/>
+          <p:cNvSpPr/>
           <p:nvPr/>
-        </p:nvCxnSpPr>
+        </p:nvSpPr>
         <p:spPr>
           <a:xfrm>
-            <a:off x="1562100" y="537921"/>
-            <a:ext cx="0" cy="2528476"/>
+            <a:off x="4378034" y="2224323"/>
+            <a:ext cx="928254" cy="526474"/>
           </a:xfrm>
-          <a:prstGeom prst="line">
+          <a:prstGeom prst="ellipse">
             <a:avLst/>
           </a:prstGeom>
-          <a:ln w="12700">
+          <a:solidFill>
+            <a:srgbClr val="CDA398"/>
+          </a:solidFill>
+          <a:ln w="28575">
             <a:solidFill>
-              <a:srgbClr val="390606"/>
+              <a:srgbClr val="CDA398"/>
             </a:solidFill>
-            <a:prstDash val="dash"/>
           </a:ln>
         </p:spPr>
         <p:style>
@@ -26406,223 +26347,21 @@
             <a:schemeClr val="tx1"/>
           </a:fontRef>
         </p:style>
-      </p:cxnSp>
-      <p:cxnSp>
-        <p:nvCxnSpPr>
-          <p:cNvPr id="12" name="直接连接符 11">
+        <p:txBody>
+          <a:bodyPr rtlCol="0" anchor="ctr"/>
+          <a:lstStyle/>
+          <a:p>
+            <a:pPr algn="ctr"/>
+            <a:endParaRPr lang="zh-CN" altLang="en-US"/>
+          </a:p>
+        </p:txBody>
+      </p:sp>
+      <p:sp>
+        <p:nvSpPr>
+          <p:cNvPr id="3" name="文本框 2">
             <a:extLst>
               <a:ext uri="{FF2B5EF4-FFF2-40B4-BE49-F238E27FC236}">
-                <a16:creationId xmlns:a16="http://schemas.microsoft.com/office/drawing/2014/main" id="{A10D85AF-7D23-415D-BFE5-C58A574F6F34}"/>
-              </a:ext>
-            </a:extLst>
-          </p:cNvPr>
-          <p:cNvCxnSpPr/>
-          <p:nvPr/>
-        </p:nvCxnSpPr>
-        <p:spPr>
-          <a:xfrm>
-            <a:off x="2533650" y="537921"/>
-            <a:ext cx="0" cy="2528476"/>
-          </a:xfrm>
-          <a:prstGeom prst="line">
-            <a:avLst/>
-          </a:prstGeom>
-          <a:ln w="12700">
-            <a:solidFill>
-              <a:srgbClr val="390606"/>
-            </a:solidFill>
-            <a:prstDash val="dash"/>
-          </a:ln>
-        </p:spPr>
-        <p:style>
-          <a:lnRef idx="1">
-            <a:schemeClr val="accent1"/>
-          </a:lnRef>
-          <a:fillRef idx="0">
-            <a:schemeClr val="accent1"/>
-          </a:fillRef>
-          <a:effectRef idx="0">
-            <a:schemeClr val="accent1"/>
-          </a:effectRef>
-          <a:fontRef idx="minor">
-            <a:schemeClr val="tx1"/>
-          </a:fontRef>
-        </p:style>
-      </p:cxnSp>
-      <p:cxnSp>
-        <p:nvCxnSpPr>
-          <p:cNvPr id="13" name="直接连接符 12">
-            <a:extLst>
-              <a:ext uri="{FF2B5EF4-FFF2-40B4-BE49-F238E27FC236}">
-                <a16:creationId xmlns:a16="http://schemas.microsoft.com/office/drawing/2014/main" id="{FC185208-F049-4490-B398-0A13AA0CB9D8}"/>
-              </a:ext>
-            </a:extLst>
-          </p:cNvPr>
-          <p:cNvCxnSpPr/>
-          <p:nvPr/>
-        </p:nvCxnSpPr>
-        <p:spPr>
-          <a:xfrm>
-            <a:off x="4419600" y="3124192"/>
-            <a:ext cx="0" cy="2528476"/>
-          </a:xfrm>
-          <a:prstGeom prst="line">
-            <a:avLst/>
-          </a:prstGeom>
-          <a:ln w="12700">
-            <a:solidFill>
-              <a:srgbClr val="390606"/>
-            </a:solidFill>
-            <a:prstDash val="dash"/>
-          </a:ln>
-        </p:spPr>
-        <p:style>
-          <a:lnRef idx="1">
-            <a:schemeClr val="accent1"/>
-          </a:lnRef>
-          <a:fillRef idx="0">
-            <a:schemeClr val="accent1"/>
-          </a:fillRef>
-          <a:effectRef idx="0">
-            <a:schemeClr val="accent1"/>
-          </a:effectRef>
-          <a:fontRef idx="minor">
-            <a:schemeClr val="tx1"/>
-          </a:fontRef>
-        </p:style>
-      </p:cxnSp>
-      <p:cxnSp>
-        <p:nvCxnSpPr>
-          <p:cNvPr id="14" name="直接连接符 13">
-            <a:extLst>
-              <a:ext uri="{FF2B5EF4-FFF2-40B4-BE49-F238E27FC236}">
-                <a16:creationId xmlns:a16="http://schemas.microsoft.com/office/drawing/2014/main" id="{42DC4898-8084-46FB-A9E7-4802EB95E427}"/>
-              </a:ext>
-            </a:extLst>
-          </p:cNvPr>
-          <p:cNvCxnSpPr/>
-          <p:nvPr/>
-        </p:nvCxnSpPr>
-        <p:spPr>
-          <a:xfrm>
-            <a:off x="5391150" y="3124192"/>
-            <a:ext cx="0" cy="2528476"/>
-          </a:xfrm>
-          <a:prstGeom prst="line">
-            <a:avLst/>
-          </a:prstGeom>
-          <a:ln w="12700">
-            <a:solidFill>
-              <a:srgbClr val="390606"/>
-            </a:solidFill>
-            <a:prstDash val="dash"/>
-          </a:ln>
-        </p:spPr>
-        <p:style>
-          <a:lnRef idx="1">
-            <a:schemeClr val="accent1"/>
-          </a:lnRef>
-          <a:fillRef idx="0">
-            <a:schemeClr val="accent1"/>
-          </a:fillRef>
-          <a:effectRef idx="0">
-            <a:schemeClr val="accent1"/>
-          </a:effectRef>
-          <a:fontRef idx="minor">
-            <a:schemeClr val="tx1"/>
-          </a:fontRef>
-        </p:style>
-      </p:cxnSp>
-      <p:cxnSp>
-        <p:nvCxnSpPr>
-          <p:cNvPr id="15" name="直接连接符 14">
-            <a:extLst>
-              <a:ext uri="{FF2B5EF4-FFF2-40B4-BE49-F238E27FC236}">
-                <a16:creationId xmlns:a16="http://schemas.microsoft.com/office/drawing/2014/main" id="{11FC33C8-8FA5-4D66-B5FA-39F509AB46A4}"/>
-              </a:ext>
-            </a:extLst>
-          </p:cNvPr>
-          <p:cNvCxnSpPr/>
-          <p:nvPr/>
-        </p:nvCxnSpPr>
-        <p:spPr>
-          <a:xfrm>
-            <a:off x="1562100" y="3124192"/>
-            <a:ext cx="0" cy="2528476"/>
-          </a:xfrm>
-          <a:prstGeom prst="line">
-            <a:avLst/>
-          </a:prstGeom>
-          <a:ln w="12700">
-            <a:solidFill>
-              <a:srgbClr val="390606"/>
-            </a:solidFill>
-            <a:prstDash val="dash"/>
-          </a:ln>
-        </p:spPr>
-        <p:style>
-          <a:lnRef idx="1">
-            <a:schemeClr val="accent1"/>
-          </a:lnRef>
-          <a:fillRef idx="0">
-            <a:schemeClr val="accent1"/>
-          </a:fillRef>
-          <a:effectRef idx="0">
-            <a:schemeClr val="accent1"/>
-          </a:effectRef>
-          <a:fontRef idx="minor">
-            <a:schemeClr val="tx1"/>
-          </a:fontRef>
-        </p:style>
-      </p:cxnSp>
-      <p:cxnSp>
-        <p:nvCxnSpPr>
-          <p:cNvPr id="16" name="直接连接符 15">
-            <a:extLst>
-              <a:ext uri="{FF2B5EF4-FFF2-40B4-BE49-F238E27FC236}">
-                <a16:creationId xmlns:a16="http://schemas.microsoft.com/office/drawing/2014/main" id="{68D6259B-93DA-4CDD-80BD-082DDB1BF05B}"/>
-              </a:ext>
-            </a:extLst>
-          </p:cNvPr>
-          <p:cNvCxnSpPr/>
-          <p:nvPr/>
-        </p:nvCxnSpPr>
-        <p:spPr>
-          <a:xfrm>
-            <a:off x="2533650" y="3124192"/>
-            <a:ext cx="0" cy="2528476"/>
-          </a:xfrm>
-          <a:prstGeom prst="line">
-            <a:avLst/>
-          </a:prstGeom>
-          <a:ln w="12700">
-            <a:solidFill>
-              <a:srgbClr val="390606"/>
-            </a:solidFill>
-            <a:prstDash val="dash"/>
-          </a:ln>
-        </p:spPr>
-        <p:style>
-          <a:lnRef idx="1">
-            <a:schemeClr val="accent1"/>
-          </a:lnRef>
-          <a:fillRef idx="0">
-            <a:schemeClr val="accent1"/>
-          </a:fillRef>
-          <a:effectRef idx="0">
-            <a:schemeClr val="accent1"/>
-          </a:effectRef>
-          <a:fontRef idx="minor">
-            <a:schemeClr val="tx1"/>
-          </a:fontRef>
-        </p:style>
-      </p:cxnSp>
-      <p:sp>
-        <p:nvSpPr>
-          <p:cNvPr id="23" name="文本框 22">
-            <a:extLst>
-              <a:ext uri="{FF2B5EF4-FFF2-40B4-BE49-F238E27FC236}">
-                <a16:creationId xmlns:a16="http://schemas.microsoft.com/office/drawing/2014/main" id="{0A7921AE-0D10-449C-B8E6-79F60B06E039}"/>
+                <a16:creationId xmlns:a16="http://schemas.microsoft.com/office/drawing/2014/main" id="{66CEC29E-51D3-4695-9564-739FC21776A9}"/>
               </a:ext>
             </a:extLst>
           </p:cNvPr>
@@ -26631,8 +26370,128 @@
         </p:nvSpPr>
         <p:spPr>
           <a:xfrm>
-            <a:off x="4152902" y="1695450"/>
-            <a:ext cx="328936" cy="369332"/>
+            <a:off x="4405744" y="1343890"/>
+            <a:ext cx="2359941" cy="1409360"/>
+          </a:xfrm>
+          <a:prstGeom prst="rect">
+            <a:avLst/>
+          </a:prstGeom>
+          <a:noFill/>
+        </p:spPr>
+        <p:txBody>
+          <a:bodyPr wrap="none" rtlCol="0">
+            <a:spAutoFit/>
+          </a:bodyPr>
+          <a:lstStyle/>
+          <a:p>
+            <a:pPr>
+              <a:lnSpc>
+                <a:spcPct val="150000"/>
+              </a:lnSpc>
+            </a:pPr>
+            <a:r>
+              <a:rPr lang="en-US" altLang="zh-CN" sz="3500" dirty="0">
+                <a:latin typeface="微软雅黑" panose="020B0503020204020204" pitchFamily="34" charset="-122"/>
+                <a:ea typeface="微软雅黑" panose="020B0503020204020204" pitchFamily="34" charset="-122"/>
+              </a:rPr>
+              <a:t>+ -  </a:t>
+            </a:r>
+            <a:r>
+              <a:rPr lang="zh-CN" altLang="en-US" sz="3500" dirty="0">
+                <a:latin typeface="微软雅黑" panose="020B0503020204020204" pitchFamily="34" charset="-122"/>
+                <a:ea typeface="微软雅黑" panose="020B0503020204020204" pitchFamily="34" charset="-122"/>
+              </a:rPr>
+              <a:t>、</a:t>
+            </a:r>
+            <a:r>
+              <a:rPr lang="en-US" altLang="zh-CN" sz="3500" dirty="0">
+                <a:latin typeface="微软雅黑" panose="020B0503020204020204" pitchFamily="34" charset="-122"/>
+                <a:ea typeface="微软雅黑" panose="020B0503020204020204" pitchFamily="34" charset="-122"/>
+              </a:rPr>
+              <a:t>× ÷</a:t>
+            </a:r>
+          </a:p>
+          <a:p>
+            <a:pPr>
+              <a:lnSpc>
+                <a:spcPct val="150000"/>
+              </a:lnSpc>
+            </a:pPr>
+            <a:r>
+              <a:rPr lang="zh-CN" altLang="en-US" sz="2500" dirty="0">
+                <a:latin typeface="微软雅黑" panose="020B0503020204020204" pitchFamily="34" charset="-122"/>
+                <a:ea typeface="微软雅黑" panose="020B0503020204020204" pitchFamily="34" charset="-122"/>
+              </a:rPr>
+              <a:t>复合</a:t>
+            </a:r>
+          </a:p>
+        </p:txBody>
+      </p:sp>
+      <p:sp>
+        <p:nvSpPr>
+          <p:cNvPr id="5" name="左大括号 4">
+            <a:extLst>
+              <a:ext uri="{FF2B5EF4-FFF2-40B4-BE49-F238E27FC236}">
+                <a16:creationId xmlns:a16="http://schemas.microsoft.com/office/drawing/2014/main" id="{40DC236D-69CA-46DA-AE53-30210DD2AD06}"/>
+              </a:ext>
+            </a:extLst>
+          </p:cNvPr>
+          <p:cNvSpPr/>
+          <p:nvPr/>
+        </p:nvSpPr>
+        <p:spPr>
+          <a:xfrm>
+            <a:off x="4128653" y="1399310"/>
+            <a:ext cx="207819" cy="1409360"/>
+          </a:xfrm>
+          <a:prstGeom prst="leftBrace">
+            <a:avLst/>
+          </a:prstGeom>
+          <a:ln w="28575">
+            <a:solidFill>
+              <a:schemeClr val="tx1"/>
+            </a:solidFill>
+          </a:ln>
+        </p:spPr>
+        <p:style>
+          <a:lnRef idx="1">
+            <a:schemeClr val="accent1"/>
+          </a:lnRef>
+          <a:fillRef idx="0">
+            <a:schemeClr val="accent1"/>
+          </a:fillRef>
+          <a:effectRef idx="0">
+            <a:schemeClr val="accent1"/>
+          </a:effectRef>
+          <a:fontRef idx="minor">
+            <a:schemeClr val="tx1"/>
+          </a:fontRef>
+        </p:style>
+        <p:txBody>
+          <a:bodyPr rtlCol="0" anchor="ctr"/>
+          <a:lstStyle/>
+          <a:p>
+            <a:pPr algn="ctr"/>
+            <a:endParaRPr lang="zh-CN" altLang="en-US"/>
+          </a:p>
+        </p:txBody>
+      </p:sp>
+      <p:sp>
+        <p:nvSpPr>
+          <p:cNvPr id="34" name="文本框 33">
+            <a:extLst>
+              <a:ext uri="{FF2B5EF4-FFF2-40B4-BE49-F238E27FC236}">
+                <a16:creationId xmlns:a16="http://schemas.microsoft.com/office/drawing/2014/main" id="{A2C1B366-0B82-4591-8CA6-6609EBE47893}"/>
+              </a:ext>
+            </a:extLst>
+          </p:cNvPr>
+          <p:cNvSpPr txBox="1"/>
+          <p:nvPr/>
+        </p:nvSpPr>
+        <p:spPr>
+          <a:xfrm>
+            <a:off x="3233514" y="1865463"/>
+            <a:ext cx="825867" cy="477054"/>
           </a:xfrm>
           <a:prstGeom prst="rect">
             <a:avLst/>
@@ -26646,19 +26505,21 @@
           <a:lstStyle/>
           <a:p>
             <a:r>
-              <a:rPr lang="en-US" altLang="zh-CN" dirty="0"/>
-              <a:t>π</a:t>
+              <a:rPr lang="zh-CN" altLang="en-US" sz="2500" dirty="0">
+                <a:latin typeface="微软雅黑" panose="020B0503020204020204" pitchFamily="34" charset="-122"/>
+                <a:ea typeface="微软雅黑" panose="020B0503020204020204" pitchFamily="34" charset="-122"/>
+              </a:rPr>
+              <a:t>求导</a:t>
             </a:r>
-            <a:endParaRPr lang="zh-CN" altLang="en-US" dirty="0"/>
           </a:p>
         </p:txBody>
       </p:sp>
       <p:sp>
         <p:nvSpPr>
-          <p:cNvPr id="24" name="文本框 23">
+          <p:cNvPr id="14" name="文本框 13">
             <a:extLst>
               <a:ext uri="{FF2B5EF4-FFF2-40B4-BE49-F238E27FC236}">
-                <a16:creationId xmlns:a16="http://schemas.microsoft.com/office/drawing/2014/main" id="{FA3C6779-0EDD-4029-B51B-D47060FB1325}"/>
+                <a16:creationId xmlns:a16="http://schemas.microsoft.com/office/drawing/2014/main" id="{A411E9E5-A410-4F1C-8883-087589148DB9}"/>
               </a:ext>
             </a:extLst>
           </p:cNvPr>
@@ -26667,8 +26528,8 @@
         </p:nvSpPr>
         <p:spPr>
           <a:xfrm>
-            <a:off x="5331458" y="1699141"/>
-            <a:ext cx="423514" cy="369332"/>
+            <a:off x="4336472" y="1238803"/>
+            <a:ext cx="2582758" cy="369332"/>
           </a:xfrm>
           <a:prstGeom prst="rect">
             <a:avLst/>
@@ -26682,23 +26543,21 @@
           <a:lstStyle/>
           <a:p>
             <a:r>
-              <a:rPr lang="en-US" altLang="zh-CN" sz="1400" dirty="0"/>
-              <a:t>2</a:t>
+              <a:rPr lang="zh-CN" altLang="en-US" dirty="0">
+                <a:latin typeface="微软雅黑" panose="020B0503020204020204" pitchFamily="34" charset="-122"/>
+                <a:ea typeface="微软雅黑" panose="020B0503020204020204" pitchFamily="34" charset="-122"/>
+              </a:rPr>
+              <a:t>拆项积分        分部积分</a:t>
             </a:r>
-            <a:r>
-              <a:rPr lang="en-US" altLang="zh-CN" dirty="0"/>
-              <a:t>π</a:t>
-            </a:r>
-            <a:endParaRPr lang="zh-CN" altLang="en-US" dirty="0"/>
           </a:p>
         </p:txBody>
       </p:sp>
       <p:sp>
         <p:nvSpPr>
-          <p:cNvPr id="25" name="文本框 24">
+          <p:cNvPr id="39" name="文本框 38">
             <a:extLst>
               <a:ext uri="{FF2B5EF4-FFF2-40B4-BE49-F238E27FC236}">
-                <a16:creationId xmlns:a16="http://schemas.microsoft.com/office/drawing/2014/main" id="{69348BBA-2B3D-43AE-BF77-93F4EF52E96B}"/>
+                <a16:creationId xmlns:a16="http://schemas.microsoft.com/office/drawing/2014/main" id="{A4FC4CDB-9AC6-4250-BE86-B4567EF51B29}"/>
               </a:ext>
             </a:extLst>
           </p:cNvPr>
@@ -26707,8 +26566,8 @@
         </p:nvSpPr>
         <p:spPr>
           <a:xfrm>
-            <a:off x="4152902" y="4291456"/>
-            <a:ext cx="328936" cy="369332"/>
+            <a:off x="4315873" y="2729091"/>
+            <a:ext cx="1107996" cy="369332"/>
           </a:xfrm>
           <a:prstGeom prst="rect">
             <a:avLst/>
@@ -26722,639 +26581,21 @@
           <a:lstStyle/>
           <a:p>
             <a:r>
-              <a:rPr lang="en-US" altLang="zh-CN" dirty="0"/>
-              <a:t>π</a:t>
+              <a:rPr lang="zh-CN" altLang="en-US" dirty="0">
+                <a:latin typeface="微软雅黑" panose="020B0503020204020204" pitchFamily="34" charset="-122"/>
+                <a:ea typeface="微软雅黑" panose="020B0503020204020204" pitchFamily="34" charset="-122"/>
+              </a:rPr>
+              <a:t>换元积分</a:t>
             </a:r>
-            <a:endParaRPr lang="zh-CN" altLang="en-US" dirty="0"/>
-          </a:p>
-        </p:txBody>
-      </p:sp>
-      <p:sp>
-        <p:nvSpPr>
-          <p:cNvPr id="26" name="文本框 25">
-            <a:extLst>
-              <a:ext uri="{FF2B5EF4-FFF2-40B4-BE49-F238E27FC236}">
-                <a16:creationId xmlns:a16="http://schemas.microsoft.com/office/drawing/2014/main" id="{DF7BD5AF-1F3B-471E-A0CD-7167A85358F4}"/>
-              </a:ext>
-            </a:extLst>
-          </p:cNvPr>
-          <p:cNvSpPr txBox="1"/>
-          <p:nvPr/>
-        </p:nvSpPr>
-        <p:spPr>
-          <a:xfrm>
-            <a:off x="5331458" y="4295147"/>
-            <a:ext cx="423514" cy="369332"/>
-          </a:xfrm>
-          <a:prstGeom prst="rect">
-            <a:avLst/>
-          </a:prstGeom>
-          <a:noFill/>
-        </p:spPr>
-        <p:txBody>
-          <a:bodyPr wrap="none" rtlCol="0">
-            <a:spAutoFit/>
-          </a:bodyPr>
-          <a:lstStyle/>
-          <a:p>
-            <a:r>
-              <a:rPr lang="en-US" altLang="zh-CN" sz="1400" dirty="0"/>
-              <a:t>2</a:t>
-            </a:r>
-            <a:r>
-              <a:rPr lang="en-US" altLang="zh-CN" dirty="0"/>
-              <a:t>π</a:t>
-            </a:r>
-            <a:endParaRPr lang="zh-CN" altLang="en-US" dirty="0"/>
-          </a:p>
-        </p:txBody>
-      </p:sp>
-      <p:sp>
-        <p:nvSpPr>
-          <p:cNvPr id="30" name="文本框 29">
-            <a:extLst>
-              <a:ext uri="{FF2B5EF4-FFF2-40B4-BE49-F238E27FC236}">
-                <a16:creationId xmlns:a16="http://schemas.microsoft.com/office/drawing/2014/main" id="{BDC86746-C65B-4EF1-9E28-E0369D1B945C}"/>
-              </a:ext>
-            </a:extLst>
-          </p:cNvPr>
-          <p:cNvSpPr txBox="1"/>
-          <p:nvPr/>
-        </p:nvSpPr>
-        <p:spPr>
-          <a:xfrm>
-            <a:off x="3608798" y="557821"/>
-            <a:ext cx="620683" cy="369332"/>
-          </a:xfrm>
-          <a:prstGeom prst="rect">
-            <a:avLst/>
-          </a:prstGeom>
-          <a:noFill/>
-        </p:spPr>
-        <p:txBody>
-          <a:bodyPr wrap="none" rtlCol="0">
-            <a:spAutoFit/>
-          </a:bodyPr>
-          <a:lstStyle/>
-          <a:p>
-            <a:r>
-              <a:rPr lang="en-US" altLang="zh-CN" dirty="0"/>
-              <a:t>sin x</a:t>
-            </a:r>
-            <a:endParaRPr lang="zh-CN" altLang="en-US" dirty="0"/>
-          </a:p>
-        </p:txBody>
-      </p:sp>
-      <p:sp>
-        <p:nvSpPr>
-          <p:cNvPr id="31" name="文本框 30">
-            <a:extLst>
-              <a:ext uri="{FF2B5EF4-FFF2-40B4-BE49-F238E27FC236}">
-                <a16:creationId xmlns:a16="http://schemas.microsoft.com/office/drawing/2014/main" id="{163F86F9-86F1-47E7-9485-367EA76349C2}"/>
-              </a:ext>
-            </a:extLst>
-          </p:cNvPr>
-          <p:cNvSpPr txBox="1"/>
-          <p:nvPr/>
-        </p:nvSpPr>
-        <p:spPr>
-          <a:xfrm>
-            <a:off x="3623484" y="3160555"/>
-            <a:ext cx="679994" cy="369332"/>
-          </a:xfrm>
-          <a:prstGeom prst="rect">
-            <a:avLst/>
-          </a:prstGeom>
-          <a:noFill/>
-        </p:spPr>
-        <p:txBody>
-          <a:bodyPr wrap="none" rtlCol="0">
-            <a:spAutoFit/>
-          </a:bodyPr>
-          <a:lstStyle/>
-          <a:p>
-            <a:r>
-              <a:rPr lang="en-US" altLang="zh-CN" dirty="0"/>
-              <a:t>cos x</a:t>
-            </a:r>
-            <a:endParaRPr lang="zh-CN" altLang="en-US" dirty="0"/>
           </a:p>
         </p:txBody>
       </p:sp>
       <p:pic>
         <p:nvPicPr>
-          <p:cNvPr id="7" name="图片 6">
+          <p:cNvPr id="17" name="图片 16">
             <a:extLst>
               <a:ext uri="{FF2B5EF4-FFF2-40B4-BE49-F238E27FC236}">
-                <a16:creationId xmlns:a16="http://schemas.microsoft.com/office/drawing/2014/main" id="{3A6632E5-EA32-4757-89C3-34AED5C72C0E}"/>
-              </a:ext>
-            </a:extLst>
-          </p:cNvPr>
-          <p:cNvPicPr>
-            <a:picLocks noChangeAspect="1"/>
-          </p:cNvPicPr>
-          <p:nvPr/>
-        </p:nvPicPr>
-        <p:blipFill rotWithShape="1">
-          <a:blip r:embed="rId4">
-            <a:extLst>
-              <a:ext uri="{28A0092B-C50C-407E-A947-70E740481C1C}">
-                <a14:useLocalDpi xmlns:a14="http://schemas.microsoft.com/office/drawing/2010/main" val="0"/>
-              </a:ext>
-            </a:extLst>
-          </a:blip>
-          <a:srcRect l="13742" r="15790"/>
-          <a:stretch/>
-        </p:blipFill>
-        <p:spPr>
-          <a:xfrm>
-            <a:off x="5971396" y="537923"/>
-            <a:ext cx="5565957" cy="5094434"/>
-          </a:xfrm>
-          <a:prstGeom prst="rect">
-            <a:avLst/>
-          </a:prstGeom>
-          <a:ln>
-            <a:solidFill>
-              <a:schemeClr val="tx1"/>
-            </a:solidFill>
-          </a:ln>
-        </p:spPr>
-      </p:pic>
-      <p:cxnSp>
-        <p:nvCxnSpPr>
-          <p:cNvPr id="17" name="直接连接符 16">
-            <a:extLst>
-              <a:ext uri="{FF2B5EF4-FFF2-40B4-BE49-F238E27FC236}">
-                <a16:creationId xmlns:a16="http://schemas.microsoft.com/office/drawing/2014/main" id="{1F2FF5A1-4B5F-4D5B-A089-DAB2120D9470}"/>
-              </a:ext>
-            </a:extLst>
-          </p:cNvPr>
-          <p:cNvCxnSpPr>
-            <a:cxnSpLocks/>
-          </p:cNvCxnSpPr>
-          <p:nvPr/>
-        </p:nvCxnSpPr>
-        <p:spPr>
-          <a:xfrm>
-            <a:off x="8098231" y="537923"/>
-            <a:ext cx="0" cy="5094434"/>
-          </a:xfrm>
-          <a:prstGeom prst="line">
-            <a:avLst/>
-          </a:prstGeom>
-          <a:ln w="12700">
-            <a:solidFill>
-              <a:srgbClr val="390606"/>
-            </a:solidFill>
-            <a:prstDash val="dash"/>
-          </a:ln>
-        </p:spPr>
-        <p:style>
-          <a:lnRef idx="1">
-            <a:schemeClr val="accent1"/>
-          </a:lnRef>
-          <a:fillRef idx="0">
-            <a:schemeClr val="accent1"/>
-          </a:fillRef>
-          <a:effectRef idx="0">
-            <a:schemeClr val="accent1"/>
-          </a:effectRef>
-          <a:fontRef idx="minor">
-            <a:schemeClr val="tx1"/>
-          </a:fontRef>
-        </p:style>
-      </p:cxnSp>
-      <p:cxnSp>
-        <p:nvCxnSpPr>
-          <p:cNvPr id="20" name="直接连接符 19">
-            <a:extLst>
-              <a:ext uri="{FF2B5EF4-FFF2-40B4-BE49-F238E27FC236}">
-                <a16:creationId xmlns:a16="http://schemas.microsoft.com/office/drawing/2014/main" id="{93495EDC-E073-4C8F-BCC7-AC8B1F85F449}"/>
-              </a:ext>
-            </a:extLst>
-          </p:cNvPr>
-          <p:cNvCxnSpPr>
-            <a:cxnSpLocks/>
-          </p:cNvCxnSpPr>
-          <p:nvPr/>
-        </p:nvCxnSpPr>
-        <p:spPr>
-          <a:xfrm>
-            <a:off x="6692027" y="537922"/>
-            <a:ext cx="0" cy="5094434"/>
-          </a:xfrm>
-          <a:prstGeom prst="line">
-            <a:avLst/>
-          </a:prstGeom>
-          <a:ln w="12700">
-            <a:solidFill>
-              <a:srgbClr val="390606"/>
-            </a:solidFill>
-            <a:prstDash val="dash"/>
-          </a:ln>
-        </p:spPr>
-        <p:style>
-          <a:lnRef idx="1">
-            <a:schemeClr val="accent1"/>
-          </a:lnRef>
-          <a:fillRef idx="0">
-            <a:schemeClr val="accent1"/>
-          </a:fillRef>
-          <a:effectRef idx="0">
-            <a:schemeClr val="accent1"/>
-          </a:effectRef>
-          <a:fontRef idx="minor">
-            <a:schemeClr val="tx1"/>
-          </a:fontRef>
-        </p:style>
-      </p:cxnSp>
-      <p:cxnSp>
-        <p:nvCxnSpPr>
-          <p:cNvPr id="21" name="直接连接符 20">
-            <a:extLst>
-              <a:ext uri="{FF2B5EF4-FFF2-40B4-BE49-F238E27FC236}">
-                <a16:creationId xmlns:a16="http://schemas.microsoft.com/office/drawing/2014/main" id="{2F1B2DAC-607E-4D30-BD46-95627F02FB52}"/>
-              </a:ext>
-            </a:extLst>
-          </p:cNvPr>
-          <p:cNvCxnSpPr>
-            <a:cxnSpLocks/>
-          </p:cNvCxnSpPr>
-          <p:nvPr/>
-        </p:nvCxnSpPr>
-        <p:spPr>
-          <a:xfrm>
-            <a:off x="10869280" y="537922"/>
-            <a:ext cx="0" cy="5094434"/>
-          </a:xfrm>
-          <a:prstGeom prst="line">
-            <a:avLst/>
-          </a:prstGeom>
-          <a:ln w="12700">
-            <a:solidFill>
-              <a:srgbClr val="390606"/>
-            </a:solidFill>
-            <a:prstDash val="dash"/>
-          </a:ln>
-        </p:spPr>
-        <p:style>
-          <a:lnRef idx="1">
-            <a:schemeClr val="accent1"/>
-          </a:lnRef>
-          <a:fillRef idx="0">
-            <a:schemeClr val="accent1"/>
-          </a:fillRef>
-          <a:effectRef idx="0">
-            <a:schemeClr val="accent1"/>
-          </a:effectRef>
-          <a:fontRef idx="minor">
-            <a:schemeClr val="tx1"/>
-          </a:fontRef>
-        </p:style>
-      </p:cxnSp>
-      <p:cxnSp>
-        <p:nvCxnSpPr>
-          <p:cNvPr id="22" name="直接连接符 21">
-            <a:extLst>
-              <a:ext uri="{FF2B5EF4-FFF2-40B4-BE49-F238E27FC236}">
-                <a16:creationId xmlns:a16="http://schemas.microsoft.com/office/drawing/2014/main" id="{E6AEB320-3A3E-422E-B926-A10220F97AAD}"/>
-              </a:ext>
-            </a:extLst>
-          </p:cNvPr>
-          <p:cNvCxnSpPr>
-            <a:cxnSpLocks/>
-          </p:cNvCxnSpPr>
-          <p:nvPr/>
-        </p:nvCxnSpPr>
-        <p:spPr>
-          <a:xfrm>
-            <a:off x="9463076" y="537921"/>
-            <a:ext cx="0" cy="5094434"/>
-          </a:xfrm>
-          <a:prstGeom prst="line">
-            <a:avLst/>
-          </a:prstGeom>
-          <a:ln w="12700">
-            <a:solidFill>
-              <a:srgbClr val="390606"/>
-            </a:solidFill>
-            <a:prstDash val="dash"/>
-          </a:ln>
-        </p:spPr>
-        <p:style>
-          <a:lnRef idx="1">
-            <a:schemeClr val="accent1"/>
-          </a:lnRef>
-          <a:fillRef idx="0">
-            <a:schemeClr val="accent1"/>
-          </a:fillRef>
-          <a:effectRef idx="0">
-            <a:schemeClr val="accent1"/>
-          </a:effectRef>
-          <a:fontRef idx="minor">
-            <a:schemeClr val="tx1"/>
-          </a:fontRef>
-        </p:style>
-      </p:cxnSp>
-      <mc:AlternateContent xmlns:mc="http://schemas.openxmlformats.org/markup-compatibility/2006">
-        <mc:Choice xmlns:a14="http://schemas.microsoft.com/office/drawing/2010/main" Requires="a14">
-          <p:sp>
-            <p:nvSpPr>
-              <p:cNvPr id="27" name="文本框 26">
-                <a:extLst>
-                  <a:ext uri="{FF2B5EF4-FFF2-40B4-BE49-F238E27FC236}">
-                    <a16:creationId xmlns:a16="http://schemas.microsoft.com/office/drawing/2014/main" id="{56991216-AF95-4FC5-A413-E25FE2E84CCF}"/>
-                  </a:ext>
-                </a:extLst>
-              </p:cNvPr>
-              <p:cNvSpPr txBox="1"/>
-              <p:nvPr/>
-            </p:nvSpPr>
-            <p:spPr>
-              <a:xfrm>
-                <a:off x="9416201" y="2336727"/>
-                <a:ext cx="617627" cy="659728"/>
-              </a:xfrm>
-              <a:prstGeom prst="rect">
-                <a:avLst/>
-              </a:prstGeom>
-              <a:noFill/>
-            </p:spPr>
-            <p:txBody>
-              <a:bodyPr wrap="none" rtlCol="0">
-                <a:spAutoFit/>
-              </a:bodyPr>
-              <a:lstStyle/>
-              <a:p>
-                <a14:m>
-                  <m:oMath xmlns:m="http://schemas.openxmlformats.org/officeDocument/2006/math">
-                    <m:f>
-                      <m:fPr>
-                        <m:ctrlPr>
-                          <a:rPr lang="en-US" altLang="zh-CN" i="1" smtClean="0">
-                            <a:latin typeface="Cambria Math" panose="02040503050406030204" pitchFamily="18" charset="0"/>
-                          </a:rPr>
-                        </m:ctrlPr>
-                      </m:fPr>
-                      <m:num>
-                        <m:r>
-                          <a:rPr lang="en-US" altLang="zh-CN" b="0" i="1" smtClean="0">
-                            <a:latin typeface="Cambria Math" panose="02040503050406030204" pitchFamily="18" charset="0"/>
-                          </a:rPr>
-                          <m:t>1</m:t>
-                        </m:r>
-                      </m:num>
-                      <m:den>
-                        <m:r>
-                          <a:rPr lang="en-US" altLang="zh-CN" b="0" i="1" smtClean="0">
-                            <a:latin typeface="Cambria Math" panose="02040503050406030204" pitchFamily="18" charset="0"/>
-                          </a:rPr>
-                          <m:t>2</m:t>
-                        </m:r>
-                      </m:den>
-                    </m:f>
-                  </m:oMath>
-                </a14:m>
-                <a:r>
-                  <a:rPr lang="en-US" altLang="zh-CN" dirty="0"/>
-                  <a:t>π</a:t>
-                </a:r>
-                <a:endParaRPr lang="zh-CN" altLang="en-US" dirty="0"/>
-              </a:p>
-            </p:txBody>
-          </p:sp>
-        </mc:Choice>
-        <mc:Fallback>
-          <p:sp>
-            <p:nvSpPr>
-              <p:cNvPr id="27" name="文本框 26">
-                <a:extLst>
-                  <a:ext uri="{FF2B5EF4-FFF2-40B4-BE49-F238E27FC236}">
-                    <a16:creationId xmlns:a16="http://schemas.microsoft.com/office/drawing/2014/main" id="{56991216-AF95-4FC5-A413-E25FE2E84CCF}"/>
-                  </a:ext>
-                </a:extLst>
-              </p:cNvPr>
-              <p:cNvSpPr txBox="1">
-                <a:spLocks noRot="1" noChangeAspect="1" noMove="1" noResize="1" noEditPoints="1" noAdjustHandles="1" noChangeArrowheads="1" noChangeShapeType="1" noTextEdit="1"/>
-              </p:cNvSpPr>
-              <p:nvPr/>
-            </p:nvSpPr>
-            <p:spPr>
-              <a:xfrm>
-                <a:off x="9416201" y="2336727"/>
-                <a:ext cx="617627" cy="659728"/>
-              </a:xfrm>
-              <a:prstGeom prst="rect">
-                <a:avLst/>
-              </a:prstGeom>
-              <a:blipFill>
-                <a:blip r:embed="rId5"/>
-                <a:stretch>
-                  <a:fillRect/>
-                </a:stretch>
-              </a:blipFill>
-            </p:spPr>
-            <p:txBody>
-              <a:bodyPr/>
-              <a:lstStyle/>
-              <a:p>
-                <a:r>
-                  <a:rPr lang="zh-CN" altLang="en-US">
-                    <a:noFill/>
-                  </a:rPr>
-                  <a:t> </a:t>
-                </a:r>
-              </a:p>
-            </p:txBody>
-          </p:sp>
-        </mc:Fallback>
-      </mc:AlternateContent>
-      <mc:AlternateContent xmlns:mc="http://schemas.openxmlformats.org/markup-compatibility/2006">
-        <mc:Choice xmlns:a14="http://schemas.microsoft.com/office/drawing/2010/main" Requires="a14">
-          <p:sp>
-            <p:nvSpPr>
-              <p:cNvPr id="29" name="文本框 28">
-                <a:extLst>
-                  <a:ext uri="{FF2B5EF4-FFF2-40B4-BE49-F238E27FC236}">
-                    <a16:creationId xmlns:a16="http://schemas.microsoft.com/office/drawing/2014/main" id="{CD580CBF-323F-4B42-8BDC-D3C34E57EEAC}"/>
-                  </a:ext>
-                </a:extLst>
-              </p:cNvPr>
-              <p:cNvSpPr txBox="1"/>
-              <p:nvPr/>
-            </p:nvSpPr>
-            <p:spPr>
-              <a:xfrm>
-                <a:off x="10822405" y="2341661"/>
-                <a:ext cx="617627" cy="659728"/>
-              </a:xfrm>
-              <a:prstGeom prst="rect">
-                <a:avLst/>
-              </a:prstGeom>
-              <a:noFill/>
-            </p:spPr>
-            <p:txBody>
-              <a:bodyPr wrap="none" rtlCol="0">
-                <a:spAutoFit/>
-              </a:bodyPr>
-              <a:lstStyle/>
-              <a:p>
-                <a14:m>
-                  <m:oMath xmlns:m="http://schemas.openxmlformats.org/officeDocument/2006/math">
-                    <m:f>
-                      <m:fPr>
-                        <m:ctrlPr>
-                          <a:rPr lang="en-US" altLang="zh-CN" i="1" smtClean="0">
-                            <a:latin typeface="Cambria Math" panose="02040503050406030204" pitchFamily="18" charset="0"/>
-                          </a:rPr>
-                        </m:ctrlPr>
-                      </m:fPr>
-                      <m:num>
-                        <m:r>
-                          <a:rPr lang="en-US" altLang="zh-CN" b="0" i="1" smtClean="0">
-                            <a:latin typeface="Cambria Math" panose="02040503050406030204" pitchFamily="18" charset="0"/>
-                          </a:rPr>
-                          <m:t>3</m:t>
-                        </m:r>
-                      </m:num>
-                      <m:den>
-                        <m:r>
-                          <a:rPr lang="en-US" altLang="zh-CN" b="0" i="1" smtClean="0">
-                            <a:latin typeface="Cambria Math" panose="02040503050406030204" pitchFamily="18" charset="0"/>
-                          </a:rPr>
-                          <m:t>2</m:t>
-                        </m:r>
-                      </m:den>
-                    </m:f>
-                  </m:oMath>
-                </a14:m>
-                <a:r>
-                  <a:rPr lang="en-US" altLang="zh-CN" dirty="0"/>
-                  <a:t>π</a:t>
-                </a:r>
-                <a:endParaRPr lang="zh-CN" altLang="en-US" dirty="0"/>
-              </a:p>
-            </p:txBody>
-          </p:sp>
-        </mc:Choice>
-        <mc:Fallback>
-          <p:sp>
-            <p:nvSpPr>
-              <p:cNvPr id="29" name="文本框 28">
-                <a:extLst>
-                  <a:ext uri="{FF2B5EF4-FFF2-40B4-BE49-F238E27FC236}">
-                    <a16:creationId xmlns:a16="http://schemas.microsoft.com/office/drawing/2014/main" id="{CD580CBF-323F-4B42-8BDC-D3C34E57EEAC}"/>
-                  </a:ext>
-                </a:extLst>
-              </p:cNvPr>
-              <p:cNvSpPr txBox="1">
-                <a:spLocks noRot="1" noChangeAspect="1" noMove="1" noResize="1" noEditPoints="1" noAdjustHandles="1" noChangeArrowheads="1" noChangeShapeType="1" noTextEdit="1"/>
-              </p:cNvSpPr>
-              <p:nvPr/>
-            </p:nvSpPr>
-            <p:spPr>
-              <a:xfrm>
-                <a:off x="10822405" y="2341661"/>
-                <a:ext cx="617627" cy="659728"/>
-              </a:xfrm>
-              <a:prstGeom prst="rect">
-                <a:avLst/>
-              </a:prstGeom>
-              <a:blipFill>
-                <a:blip r:embed="rId6"/>
-                <a:stretch>
-                  <a:fillRect/>
-                </a:stretch>
-              </a:blipFill>
-            </p:spPr>
-            <p:txBody>
-              <a:bodyPr/>
-              <a:lstStyle/>
-              <a:p>
-                <a:r>
-                  <a:rPr lang="zh-CN" altLang="en-US">
-                    <a:noFill/>
-                  </a:rPr>
-                  <a:t> </a:t>
-                </a:r>
-              </a:p>
-            </p:txBody>
-          </p:sp>
-        </mc:Fallback>
-      </mc:AlternateContent>
-      <p:sp>
-        <p:nvSpPr>
-          <p:cNvPr id="32" name="文本框 31">
-            <a:extLst>
-              <a:ext uri="{FF2B5EF4-FFF2-40B4-BE49-F238E27FC236}">
-                <a16:creationId xmlns:a16="http://schemas.microsoft.com/office/drawing/2014/main" id="{2BCB6C3B-824E-4B76-9BFC-B1373A191AB5}"/>
-              </a:ext>
-            </a:extLst>
-          </p:cNvPr>
-          <p:cNvSpPr txBox="1"/>
-          <p:nvPr/>
-        </p:nvSpPr>
-        <p:spPr>
-          <a:xfrm>
-            <a:off x="9502970" y="576057"/>
-            <a:ext cx="984211" cy="503983"/>
-          </a:xfrm>
-          <a:prstGeom prst="rect">
-            <a:avLst/>
-          </a:prstGeom>
-          <a:noFill/>
-        </p:spPr>
-        <p:txBody>
-          <a:bodyPr wrap="none" rtlCol="0">
-            <a:spAutoFit/>
-          </a:bodyPr>
-          <a:lstStyle/>
-          <a:p>
-            <a:r>
-              <a:rPr lang="en-US" altLang="zh-CN" dirty="0"/>
-              <a:t>tan x</a:t>
-            </a:r>
-            <a:endParaRPr lang="zh-CN" altLang="en-US" dirty="0"/>
-          </a:p>
-        </p:txBody>
-      </p:sp>
-    </p:spTree>
-    <p:extLst>
-      <p:ext uri="{BB962C8B-B14F-4D97-AF65-F5344CB8AC3E}">
-        <p14:creationId xmlns:p14="http://schemas.microsoft.com/office/powerpoint/2010/main" val="3545543770"/>
-      </p:ext>
-    </p:extLst>
-  </p:cSld>
-  <p:clrMapOvr>
-    <a:masterClrMapping/>
-  </p:clrMapOvr>
-</p:sld>
-</file>
-
-<file path=ppt/slides/slide7.xml><?xml version="1.0" encoding="utf-8"?>
-<p:sld xmlns:a="http://schemas.openxmlformats.org/drawingml/2006/main" xmlns:r="http://schemas.openxmlformats.org/officeDocument/2006/relationships" xmlns:p="http://schemas.openxmlformats.org/presentationml/2006/main">
-  <p:cSld>
-    <p:spTree>
-      <p:nvGrpSpPr>
-        <p:cNvPr id="1" name=""/>
-        <p:cNvGrpSpPr/>
-        <p:nvPr/>
-      </p:nvGrpSpPr>
-      <p:grpSpPr>
-        <a:xfrm>
-          <a:off x="0" y="0"/>
-          <a:ext cx="0" cy="0"/>
-          <a:chOff x="0" y="0"/>
-          <a:chExt cx="0" cy="0"/>
-        </a:xfrm>
-      </p:grpSpPr>
-      <p:pic>
-        <p:nvPicPr>
-          <p:cNvPr id="3" name="图片 2">
-            <a:extLst>
-              <a:ext uri="{FF2B5EF4-FFF2-40B4-BE49-F238E27FC236}">
-                <a16:creationId xmlns:a16="http://schemas.microsoft.com/office/drawing/2014/main" id="{91279350-2563-4B19-905C-39237EFB21B5}"/>
+                <a16:creationId xmlns:a16="http://schemas.microsoft.com/office/drawing/2014/main" id="{5C6C611F-DE15-4874-B8BA-3C53AD2C578E}"/>
               </a:ext>
             </a:extLst>
           </p:cNvPr>
@@ -27364,279 +26605,25 @@
           <p:nvPr/>
         </p:nvPicPr>
         <p:blipFill>
-          <a:blip r:embed="rId2">
-            <a:extLst>
-              <a:ext uri="{28A0092B-C50C-407E-A947-70E740481C1C}">
-                <a14:useLocalDpi xmlns:a14="http://schemas.microsoft.com/office/drawing/2010/main" val="0"/>
-              </a:ext>
-            </a:extLst>
-          </a:blip>
+          <a:blip r:embed="rId2"/>
           <a:stretch>
             <a:fillRect/>
           </a:stretch>
         </p:blipFill>
         <p:spPr>
           <a:xfrm>
-            <a:off x="2167428" y="1295666"/>
-            <a:ext cx="7857143" cy="4266667"/>
+            <a:off x="1505378" y="3740381"/>
+            <a:ext cx="3828620" cy="1987468"/>
           </a:xfrm>
           <a:prstGeom prst="rect">
             <a:avLst/>
           </a:prstGeom>
         </p:spPr>
       </p:pic>
-      <p:cxnSp>
-        <p:nvCxnSpPr>
-          <p:cNvPr id="6" name="直接连接符 5">
-            <a:extLst>
-              <a:ext uri="{FF2B5EF4-FFF2-40B4-BE49-F238E27FC236}">
-                <a16:creationId xmlns:a16="http://schemas.microsoft.com/office/drawing/2014/main" id="{E3AA3429-9578-4804-85DA-7797BE804DCE}"/>
-              </a:ext>
-            </a:extLst>
-          </p:cNvPr>
-          <p:cNvCxnSpPr>
-            <a:cxnSpLocks/>
-          </p:cNvCxnSpPr>
-          <p:nvPr/>
-        </p:nvCxnSpPr>
-        <p:spPr>
-          <a:xfrm flipH="1">
-            <a:off x="2238375" y="2695575"/>
-            <a:ext cx="7696201" cy="0"/>
-          </a:xfrm>
-          <a:prstGeom prst="line">
-            <a:avLst/>
-          </a:prstGeom>
-          <a:ln w="12700">
-            <a:solidFill>
-              <a:srgbClr val="390606"/>
-            </a:solidFill>
-            <a:prstDash val="dash"/>
-          </a:ln>
-        </p:spPr>
-        <p:style>
-          <a:lnRef idx="1">
-            <a:schemeClr val="accent1"/>
-          </a:lnRef>
-          <a:fillRef idx="0">
-            <a:schemeClr val="accent1"/>
-          </a:fillRef>
-          <a:effectRef idx="0">
-            <a:schemeClr val="accent1"/>
-          </a:effectRef>
-          <a:fontRef idx="minor">
-            <a:schemeClr val="tx1"/>
-          </a:fontRef>
-        </p:style>
-      </p:cxnSp>
-      <p:cxnSp>
-        <p:nvCxnSpPr>
-          <p:cNvPr id="11" name="直接连接符 10">
-            <a:extLst>
-              <a:ext uri="{FF2B5EF4-FFF2-40B4-BE49-F238E27FC236}">
-                <a16:creationId xmlns:a16="http://schemas.microsoft.com/office/drawing/2014/main" id="{2993B127-BC9F-4FE0-88A9-D6EC370CD537}"/>
-              </a:ext>
-            </a:extLst>
-          </p:cNvPr>
-          <p:cNvCxnSpPr>
-            <a:cxnSpLocks/>
-          </p:cNvCxnSpPr>
-          <p:nvPr/>
-        </p:nvCxnSpPr>
-        <p:spPr>
-          <a:xfrm flipH="1">
-            <a:off x="2218228" y="1476375"/>
-            <a:ext cx="7696201" cy="0"/>
-          </a:xfrm>
-          <a:prstGeom prst="line">
-            <a:avLst/>
-          </a:prstGeom>
-          <a:ln w="12700">
-            <a:solidFill>
-              <a:srgbClr val="390606"/>
-            </a:solidFill>
-            <a:prstDash val="dash"/>
-          </a:ln>
-        </p:spPr>
-        <p:style>
-          <a:lnRef idx="1">
-            <a:schemeClr val="accent1"/>
-          </a:lnRef>
-          <a:fillRef idx="0">
-            <a:schemeClr val="accent1"/>
-          </a:fillRef>
-          <a:effectRef idx="0">
-            <a:schemeClr val="accent1"/>
-          </a:effectRef>
-          <a:fontRef idx="minor">
-            <a:schemeClr val="tx1"/>
-          </a:fontRef>
-        </p:style>
-      </p:cxnSp>
-      <p:cxnSp>
-        <p:nvCxnSpPr>
-          <p:cNvPr id="12" name="直接连接符 11">
-            <a:extLst>
-              <a:ext uri="{FF2B5EF4-FFF2-40B4-BE49-F238E27FC236}">
-                <a16:creationId xmlns:a16="http://schemas.microsoft.com/office/drawing/2014/main" id="{FD32F20C-BDE1-4601-B797-34C20A5F6DB8}"/>
-              </a:ext>
-            </a:extLst>
-          </p:cNvPr>
-          <p:cNvCxnSpPr>
-            <a:cxnSpLocks/>
-          </p:cNvCxnSpPr>
-          <p:nvPr/>
-        </p:nvCxnSpPr>
-        <p:spPr>
-          <a:xfrm flipH="1">
-            <a:off x="2247899" y="5159375"/>
-            <a:ext cx="7696201" cy="0"/>
-          </a:xfrm>
-          <a:prstGeom prst="line">
-            <a:avLst/>
-          </a:prstGeom>
-          <a:ln w="12700">
-            <a:solidFill>
-              <a:srgbClr val="390606"/>
-            </a:solidFill>
-            <a:prstDash val="dash"/>
-          </a:ln>
-        </p:spPr>
-        <p:style>
-          <a:lnRef idx="1">
-            <a:schemeClr val="accent1"/>
-          </a:lnRef>
-          <a:fillRef idx="0">
-            <a:schemeClr val="accent1"/>
-          </a:fillRef>
-          <a:effectRef idx="0">
-            <a:schemeClr val="accent1"/>
-          </a:effectRef>
-          <a:fontRef idx="minor">
-            <a:schemeClr val="tx1"/>
-          </a:fontRef>
-        </p:style>
-      </p:cxnSp>
-      <p:sp>
-        <p:nvSpPr>
-          <p:cNvPr id="13" name="文本框 12">
-            <a:extLst>
-              <a:ext uri="{FF2B5EF4-FFF2-40B4-BE49-F238E27FC236}">
-                <a16:creationId xmlns:a16="http://schemas.microsoft.com/office/drawing/2014/main" id="{F0EF672E-7E1A-4937-8299-6982DC380584}"/>
-              </a:ext>
-            </a:extLst>
-          </p:cNvPr>
-          <p:cNvSpPr txBox="1"/>
-          <p:nvPr/>
-        </p:nvSpPr>
-        <p:spPr>
-          <a:xfrm>
-            <a:off x="4406900" y="1513958"/>
-            <a:ext cx="978153" cy="369332"/>
-          </a:xfrm>
-          <a:prstGeom prst="rect">
-            <a:avLst/>
-          </a:prstGeom>
-          <a:noFill/>
-        </p:spPr>
-        <p:txBody>
-          <a:bodyPr wrap="none" rtlCol="0">
-            <a:spAutoFit/>
-          </a:bodyPr>
-          <a:lstStyle/>
-          <a:p>
-            <a:r>
-              <a:rPr lang="en-US" altLang="zh-CN" dirty="0" err="1"/>
-              <a:t>arccos</a:t>
-            </a:r>
-            <a:r>
-              <a:rPr lang="en-US" altLang="zh-CN" dirty="0"/>
-              <a:t> x</a:t>
-            </a:r>
-            <a:endParaRPr lang="zh-CN" altLang="en-US" dirty="0"/>
-          </a:p>
-        </p:txBody>
-      </p:sp>
-      <p:sp>
-        <p:nvSpPr>
-          <p:cNvPr id="14" name="文本框 13">
-            <a:extLst>
-              <a:ext uri="{FF2B5EF4-FFF2-40B4-BE49-F238E27FC236}">
-                <a16:creationId xmlns:a16="http://schemas.microsoft.com/office/drawing/2014/main" id="{A8012297-D5B7-41F5-A142-1BDB7AAD98A5}"/>
-              </a:ext>
-            </a:extLst>
-          </p:cNvPr>
-          <p:cNvSpPr txBox="1"/>
-          <p:nvPr/>
-        </p:nvSpPr>
-        <p:spPr>
-          <a:xfrm>
-            <a:off x="6794500" y="2673523"/>
-            <a:ext cx="918841" cy="369332"/>
-          </a:xfrm>
-          <a:prstGeom prst="rect">
-            <a:avLst/>
-          </a:prstGeom>
-          <a:noFill/>
-        </p:spPr>
-        <p:txBody>
-          <a:bodyPr wrap="none" rtlCol="0">
-            <a:spAutoFit/>
-          </a:bodyPr>
-          <a:lstStyle/>
-          <a:p>
-            <a:r>
-              <a:rPr lang="en-US" altLang="zh-CN" dirty="0" err="1"/>
-              <a:t>arcsin</a:t>
-            </a:r>
-            <a:r>
-              <a:rPr lang="en-US" altLang="zh-CN" dirty="0"/>
-              <a:t> x</a:t>
-            </a:r>
-            <a:endParaRPr lang="zh-CN" altLang="en-US" dirty="0"/>
-          </a:p>
-        </p:txBody>
-      </p:sp>
-      <p:sp>
-        <p:nvSpPr>
-          <p:cNvPr id="16" name="文本框 15">
-            <a:extLst>
-              <a:ext uri="{FF2B5EF4-FFF2-40B4-BE49-F238E27FC236}">
-                <a16:creationId xmlns:a16="http://schemas.microsoft.com/office/drawing/2014/main" id="{8F3A2462-E9F3-44F2-A2CB-6F7FFE2B03A9}"/>
-              </a:ext>
-            </a:extLst>
-          </p:cNvPr>
-          <p:cNvSpPr txBox="1"/>
-          <p:nvPr/>
-        </p:nvSpPr>
-        <p:spPr>
-          <a:xfrm>
-            <a:off x="8978900" y="2858189"/>
-            <a:ext cx="962123" cy="369332"/>
-          </a:xfrm>
-          <a:prstGeom prst="rect">
-            <a:avLst/>
-          </a:prstGeom>
-          <a:noFill/>
-        </p:spPr>
-        <p:txBody>
-          <a:bodyPr wrap="none" rtlCol="0">
-            <a:spAutoFit/>
-          </a:bodyPr>
-          <a:lstStyle/>
-          <a:p>
-            <a:r>
-              <a:rPr lang="en-US" altLang="zh-CN" dirty="0"/>
-              <a:t>arctan x</a:t>
-            </a:r>
-            <a:endParaRPr lang="zh-CN" altLang="en-US" dirty="0"/>
-          </a:p>
-        </p:txBody>
-      </p:sp>
     </p:spTree>
     <p:extLst>
       <p:ext uri="{BB962C8B-B14F-4D97-AF65-F5344CB8AC3E}">
-        <p14:creationId xmlns:p14="http://schemas.microsoft.com/office/powerpoint/2010/main" val="2838403145"/>
+        <p14:creationId xmlns:p14="http://schemas.microsoft.com/office/powerpoint/2010/main" val="2727403590"/>
       </p:ext>
     </p:extLst>
   </p:cSld>

</xml_diff>

<commit_message>
Site updated: 2020-09-16 23:15:50
</commit_message>
<xml_diff>
--- a/img/pic.pptx
+++ b/img/pic.pptx
@@ -5,7 +5,7 @@
     <p:sldMasterId id="2147483648" r:id="rId1"/>
   </p:sldMasterIdLst>
   <p:notesMasterIdLst>
-    <p:notesMasterId r:id="rId9"/>
+    <p:notesMasterId r:id="rId10"/>
   </p:notesMasterIdLst>
   <p:sldIdLst>
     <p:sldId id="256" r:id="rId2"/>
@@ -15,6 +15,7 @@
     <p:sldId id="260" r:id="rId6"/>
     <p:sldId id="263" r:id="rId7"/>
     <p:sldId id="264" r:id="rId8"/>
+    <p:sldId id="265" r:id="rId9"/>
   </p:sldIdLst>
   <p:sldSz cx="12192000" cy="6858000"/>
   <p:notesSz cx="6858000" cy="9144000"/>
@@ -203,7 +204,7 @@
           <a:p>
             <a:fld id="{6C1D4226-1D08-4AB6-B9A0-83A7BEB3795D}" type="datetimeFigureOut">
               <a:rPr lang="zh-CN" altLang="en-US" smtClean="0"/>
-              <a:t>2020/8/1</a:t>
+              <a:t>2020/9/16</a:t>
             </a:fld>
             <a:endParaRPr lang="zh-CN" altLang="en-US"/>
           </a:p>
@@ -701,7 +702,7 @@
           <a:p>
             <a:fld id="{AD787EDF-0DB4-449C-B77F-F665B7FCA930}" type="datetimeFigureOut">
               <a:rPr lang="zh-CN" altLang="en-US" smtClean="0"/>
-              <a:t>2020/8/1</a:t>
+              <a:t>2020/9/16</a:t>
             </a:fld>
             <a:endParaRPr lang="zh-CN" altLang="en-US"/>
           </a:p>
@@ -899,7 +900,7 @@
           <a:p>
             <a:fld id="{AD787EDF-0DB4-449C-B77F-F665B7FCA930}" type="datetimeFigureOut">
               <a:rPr lang="zh-CN" altLang="en-US" smtClean="0"/>
-              <a:t>2020/8/1</a:t>
+              <a:t>2020/9/16</a:t>
             </a:fld>
             <a:endParaRPr lang="zh-CN" altLang="en-US"/>
           </a:p>
@@ -1107,7 +1108,7 @@
           <a:p>
             <a:fld id="{AD787EDF-0DB4-449C-B77F-F665B7FCA930}" type="datetimeFigureOut">
               <a:rPr lang="zh-CN" altLang="en-US" smtClean="0"/>
-              <a:t>2020/8/1</a:t>
+              <a:t>2020/9/16</a:t>
             </a:fld>
             <a:endParaRPr lang="zh-CN" altLang="en-US"/>
           </a:p>
@@ -1305,7 +1306,7 @@
           <a:p>
             <a:fld id="{AD787EDF-0DB4-449C-B77F-F665B7FCA930}" type="datetimeFigureOut">
               <a:rPr lang="zh-CN" altLang="en-US" smtClean="0"/>
-              <a:t>2020/8/1</a:t>
+              <a:t>2020/9/16</a:t>
             </a:fld>
             <a:endParaRPr lang="zh-CN" altLang="en-US"/>
           </a:p>
@@ -1580,7 +1581,7 @@
           <a:p>
             <a:fld id="{AD787EDF-0DB4-449C-B77F-F665B7FCA930}" type="datetimeFigureOut">
               <a:rPr lang="zh-CN" altLang="en-US" smtClean="0"/>
-              <a:t>2020/8/1</a:t>
+              <a:t>2020/9/16</a:t>
             </a:fld>
             <a:endParaRPr lang="zh-CN" altLang="en-US"/>
           </a:p>
@@ -1845,7 +1846,7 @@
           <a:p>
             <a:fld id="{AD787EDF-0DB4-449C-B77F-F665B7FCA930}" type="datetimeFigureOut">
               <a:rPr lang="zh-CN" altLang="en-US" smtClean="0"/>
-              <a:t>2020/8/1</a:t>
+              <a:t>2020/9/16</a:t>
             </a:fld>
             <a:endParaRPr lang="zh-CN" altLang="en-US"/>
           </a:p>
@@ -2257,7 +2258,7 @@
           <a:p>
             <a:fld id="{AD787EDF-0DB4-449C-B77F-F665B7FCA930}" type="datetimeFigureOut">
               <a:rPr lang="zh-CN" altLang="en-US" smtClean="0"/>
-              <a:t>2020/8/1</a:t>
+              <a:t>2020/9/16</a:t>
             </a:fld>
             <a:endParaRPr lang="zh-CN" altLang="en-US"/>
           </a:p>
@@ -2398,7 +2399,7 @@
           <a:p>
             <a:fld id="{AD787EDF-0DB4-449C-B77F-F665B7FCA930}" type="datetimeFigureOut">
               <a:rPr lang="zh-CN" altLang="en-US" smtClean="0"/>
-              <a:t>2020/8/1</a:t>
+              <a:t>2020/9/16</a:t>
             </a:fld>
             <a:endParaRPr lang="zh-CN" altLang="en-US"/>
           </a:p>
@@ -2511,7 +2512,7 @@
           <a:p>
             <a:fld id="{AD787EDF-0DB4-449C-B77F-F665B7FCA930}" type="datetimeFigureOut">
               <a:rPr lang="zh-CN" altLang="en-US" smtClean="0"/>
-              <a:t>2020/8/1</a:t>
+              <a:t>2020/9/16</a:t>
             </a:fld>
             <a:endParaRPr lang="zh-CN" altLang="en-US"/>
           </a:p>
@@ -2822,7 +2823,7 @@
           <a:p>
             <a:fld id="{AD787EDF-0DB4-449C-B77F-F665B7FCA930}" type="datetimeFigureOut">
               <a:rPr lang="zh-CN" altLang="en-US" smtClean="0"/>
-              <a:t>2020/8/1</a:t>
+              <a:t>2020/9/16</a:t>
             </a:fld>
             <a:endParaRPr lang="zh-CN" altLang="en-US"/>
           </a:p>
@@ -3110,7 +3111,7 @@
           <a:p>
             <a:fld id="{AD787EDF-0DB4-449C-B77F-F665B7FCA930}" type="datetimeFigureOut">
               <a:rPr lang="zh-CN" altLang="en-US" smtClean="0"/>
-              <a:t>2020/8/1</a:t>
+              <a:t>2020/9/16</a:t>
             </a:fld>
             <a:endParaRPr lang="zh-CN" altLang="en-US"/>
           </a:p>
@@ -3351,7 +3352,7 @@
           <a:p>
             <a:fld id="{AD787EDF-0DB4-449C-B77F-F665B7FCA930}" type="datetimeFigureOut">
               <a:rPr lang="zh-CN" altLang="en-US" smtClean="0"/>
-              <a:t>2020/8/1</a:t>
+              <a:t>2020/9/16</a:t>
             </a:fld>
             <a:endParaRPr lang="zh-CN" altLang="en-US"/>
           </a:p>
@@ -26651,8 +26652,8 @@
           <a:chExt cx="0" cy="0"/>
         </a:xfrm>
       </p:grpSpPr>
-      <mc:AlternateContent xmlns:mc="http://schemas.openxmlformats.org/markup-compatibility/2006">
-        <mc:Choice xmlns:a14="http://schemas.microsoft.com/office/drawing/2010/main" Requires="a14">
+      <mc:AlternateContent xmlns:mc="http://schemas.openxmlformats.org/markup-compatibility/2006" xmlns:a14="http://schemas.microsoft.com/office/drawing/2010/main">
+        <mc:Choice Requires="a14">
           <p:sp>
             <p:nvSpPr>
               <p:cNvPr id="64" name="矩形: 圆角 63">
@@ -26776,7 +26777,7 @@
             </p:txBody>
           </p:sp>
         </mc:Choice>
-        <mc:Fallback>
+        <mc:Fallback xmlns="">
           <p:sp>
             <p:nvSpPr>
               <p:cNvPr id="64" name="矩形: 圆角 63">
@@ -26824,8 +26825,8 @@
           </p:sp>
         </mc:Fallback>
       </mc:AlternateContent>
-      <mc:AlternateContent xmlns:mc="http://schemas.openxmlformats.org/markup-compatibility/2006">
-        <mc:Choice xmlns:a14="http://schemas.microsoft.com/office/drawing/2010/main" Requires="a14">
+      <mc:AlternateContent xmlns:mc="http://schemas.openxmlformats.org/markup-compatibility/2006" xmlns:a14="http://schemas.microsoft.com/office/drawing/2010/main">
+        <mc:Choice Requires="a14">
           <p:sp>
             <p:nvSpPr>
               <p:cNvPr id="65" name="矩形: 圆角 64">
@@ -26949,7 +26950,7 @@
             </p:txBody>
           </p:sp>
         </mc:Choice>
-        <mc:Fallback>
+        <mc:Fallback xmlns="">
           <p:sp>
             <p:nvSpPr>
               <p:cNvPr id="65" name="矩形: 圆角 64">
@@ -27087,8 +27088,8 @@
           </a:fontRef>
         </p:style>
       </p:cxnSp>
-      <mc:AlternateContent xmlns:mc="http://schemas.openxmlformats.org/markup-compatibility/2006">
-        <mc:Choice xmlns:a14="http://schemas.microsoft.com/office/drawing/2010/main" Requires="a14">
+      <mc:AlternateContent xmlns:mc="http://schemas.openxmlformats.org/markup-compatibility/2006" xmlns:a14="http://schemas.microsoft.com/office/drawing/2010/main">
+        <mc:Choice Requires="a14">
           <p:sp>
             <p:nvSpPr>
               <p:cNvPr id="68" name="矩形: 圆角 67">
@@ -27212,7 +27213,7 @@
             </p:txBody>
           </p:sp>
         </mc:Choice>
-        <mc:Fallback>
+        <mc:Fallback xmlns="">
           <p:sp>
             <p:nvSpPr>
               <p:cNvPr id="68" name="矩形: 圆角 67">
@@ -27350,8 +27351,8 @@
           </a:fontRef>
         </p:style>
       </p:cxnSp>
-      <mc:AlternateContent xmlns:mc="http://schemas.openxmlformats.org/markup-compatibility/2006">
-        <mc:Choice xmlns:a14="http://schemas.microsoft.com/office/drawing/2010/main" Requires="a14">
+      <mc:AlternateContent xmlns:mc="http://schemas.openxmlformats.org/markup-compatibility/2006" xmlns:a14="http://schemas.microsoft.com/office/drawing/2010/main">
+        <mc:Choice Requires="a14">
           <p:sp>
             <p:nvSpPr>
               <p:cNvPr id="71" name="矩形: 圆角 70">
@@ -27702,7 +27703,7 @@
             </p:txBody>
           </p:sp>
         </mc:Choice>
-        <mc:Fallback>
+        <mc:Fallback xmlns="">
           <p:sp>
             <p:nvSpPr>
               <p:cNvPr id="71" name="矩形: 圆角 70">
@@ -27750,8 +27751,8 @@
           </p:sp>
         </mc:Fallback>
       </mc:AlternateContent>
-      <mc:AlternateContent xmlns:mc="http://schemas.openxmlformats.org/markup-compatibility/2006">
-        <mc:Choice xmlns:a14="http://schemas.microsoft.com/office/drawing/2010/main" Requires="a14">
+      <mc:AlternateContent xmlns:mc="http://schemas.openxmlformats.org/markup-compatibility/2006" xmlns:a14="http://schemas.microsoft.com/office/drawing/2010/main">
+        <mc:Choice Requires="a14">
           <p:sp>
             <p:nvSpPr>
               <p:cNvPr id="72" name="矩形: 圆角 71">
@@ -28269,7 +28270,7 @@
             </p:txBody>
           </p:sp>
         </mc:Choice>
-        <mc:Fallback>
+        <mc:Fallback xmlns="">
           <p:sp>
             <p:nvSpPr>
               <p:cNvPr id="72" name="矩形: 圆角 71">
@@ -28497,8 +28498,8 @@
           </a:fontRef>
         </p:style>
       </p:cxnSp>
-      <mc:AlternateContent xmlns:mc="http://schemas.openxmlformats.org/markup-compatibility/2006">
-        <mc:Choice xmlns:a14="http://schemas.microsoft.com/office/drawing/2010/main" Requires="a14">
+      <mc:AlternateContent xmlns:mc="http://schemas.openxmlformats.org/markup-compatibility/2006" xmlns:a14="http://schemas.microsoft.com/office/drawing/2010/main">
+        <mc:Choice Requires="a14">
           <p:sp>
             <p:nvSpPr>
               <p:cNvPr id="77" name="矩形: 圆角 76">
@@ -28641,7 +28642,7 @@
             </p:txBody>
           </p:sp>
         </mc:Choice>
-        <mc:Fallback>
+        <mc:Fallback xmlns="">
           <p:sp>
             <p:nvSpPr>
               <p:cNvPr id="77" name="矩形: 圆角 76">
@@ -28689,8 +28690,8 @@
           </p:sp>
         </mc:Fallback>
       </mc:AlternateContent>
-      <mc:AlternateContent xmlns:mc="http://schemas.openxmlformats.org/markup-compatibility/2006">
-        <mc:Choice xmlns:a14="http://schemas.microsoft.com/office/drawing/2010/main" Requires="a14">
+      <mc:AlternateContent xmlns:mc="http://schemas.openxmlformats.org/markup-compatibility/2006" xmlns:a14="http://schemas.microsoft.com/office/drawing/2010/main">
+        <mc:Choice Requires="a14">
           <p:sp>
             <p:nvSpPr>
               <p:cNvPr id="78" name="矩形: 圆角 77">
@@ -29016,7 +29017,7 @@
             </p:txBody>
           </p:sp>
         </mc:Choice>
-        <mc:Fallback>
+        <mc:Fallback xmlns="">
           <p:sp>
             <p:nvSpPr>
               <p:cNvPr id="78" name="矩形: 圆角 77">
@@ -29064,8 +29065,8 @@
           </p:sp>
         </mc:Fallback>
       </mc:AlternateContent>
-      <mc:AlternateContent xmlns:mc="http://schemas.openxmlformats.org/markup-compatibility/2006">
-        <mc:Choice xmlns:a14="http://schemas.microsoft.com/office/drawing/2010/main" Requires="a14">
+      <mc:AlternateContent xmlns:mc="http://schemas.openxmlformats.org/markup-compatibility/2006" xmlns:a14="http://schemas.microsoft.com/office/drawing/2010/main">
+        <mc:Choice Requires="a14">
           <p:sp>
             <p:nvSpPr>
               <p:cNvPr id="79" name="矩形: 圆角 78">
@@ -29189,7 +29190,7 @@
             </p:txBody>
           </p:sp>
         </mc:Choice>
-        <mc:Fallback>
+        <mc:Fallback xmlns="">
           <p:sp>
             <p:nvSpPr>
               <p:cNvPr id="79" name="矩形: 圆角 78">
@@ -29327,8 +29328,8 @@
           </a:fontRef>
         </p:style>
       </p:cxnSp>
-      <mc:AlternateContent xmlns:mc="http://schemas.openxmlformats.org/markup-compatibility/2006">
-        <mc:Choice xmlns:a14="http://schemas.microsoft.com/office/drawing/2010/main" Requires="a14">
+      <mc:AlternateContent xmlns:mc="http://schemas.openxmlformats.org/markup-compatibility/2006" xmlns:a14="http://schemas.microsoft.com/office/drawing/2010/main">
+        <mc:Choice Requires="a14">
           <p:sp>
             <p:nvSpPr>
               <p:cNvPr id="82" name="矩形: 圆角 81">
@@ -29625,7 +29626,7 @@
             </p:txBody>
           </p:sp>
         </mc:Choice>
-        <mc:Fallback>
+        <mc:Fallback xmlns="">
           <p:sp>
             <p:nvSpPr>
               <p:cNvPr id="82" name="矩形: 圆角 81">
@@ -29763,8 +29764,8 @@
           </a:fontRef>
         </p:style>
       </p:cxnSp>
-      <mc:AlternateContent xmlns:mc="http://schemas.openxmlformats.org/markup-compatibility/2006">
-        <mc:Choice xmlns:a14="http://schemas.microsoft.com/office/drawing/2010/main" Requires="a14">
+      <mc:AlternateContent xmlns:mc="http://schemas.openxmlformats.org/markup-compatibility/2006" xmlns:a14="http://schemas.microsoft.com/office/drawing/2010/main">
+        <mc:Choice Requires="a14">
           <p:sp>
             <p:nvSpPr>
               <p:cNvPr id="85" name="矩形: 圆角 84">
@@ -29907,7 +29908,7 @@
             </p:txBody>
           </p:sp>
         </mc:Choice>
-        <mc:Fallback>
+        <mc:Fallback xmlns="">
           <p:sp>
             <p:nvSpPr>
               <p:cNvPr id="85" name="矩形: 圆角 84">
@@ -29955,8 +29956,8 @@
           </p:sp>
         </mc:Fallback>
       </mc:AlternateContent>
-      <mc:AlternateContent xmlns:mc="http://schemas.openxmlformats.org/markup-compatibility/2006">
-        <mc:Choice xmlns:a14="http://schemas.microsoft.com/office/drawing/2010/main" Requires="a14">
+      <mc:AlternateContent xmlns:mc="http://schemas.openxmlformats.org/markup-compatibility/2006" xmlns:a14="http://schemas.microsoft.com/office/drawing/2010/main">
+        <mc:Choice Requires="a14">
           <p:sp>
             <p:nvSpPr>
               <p:cNvPr id="86" name="矩形: 圆角 85">
@@ -30353,7 +30354,7 @@
             </p:txBody>
           </p:sp>
         </mc:Choice>
-        <mc:Fallback>
+        <mc:Fallback xmlns="">
           <p:sp>
             <p:nvSpPr>
               <p:cNvPr id="86" name="矩形: 圆角 85">
@@ -30601,8 +30602,8 @@
           </a:p>
         </p:txBody>
       </p:sp>
-      <mc:AlternateContent xmlns:mc="http://schemas.openxmlformats.org/markup-compatibility/2006">
-        <mc:Choice xmlns:a14="http://schemas.microsoft.com/office/drawing/2010/main" Requires="a14">
+      <mc:AlternateContent xmlns:mc="http://schemas.openxmlformats.org/markup-compatibility/2006" xmlns:a14="http://schemas.microsoft.com/office/drawing/2010/main">
+        <mc:Choice Requires="a14">
           <p:sp>
             <p:nvSpPr>
               <p:cNvPr id="92" name="矩形: 圆角 91">
@@ -30732,7 +30733,7 @@
             </p:txBody>
           </p:sp>
         </mc:Choice>
-        <mc:Fallback>
+        <mc:Fallback xmlns="">
           <p:sp>
             <p:nvSpPr>
               <p:cNvPr id="92" name="矩形: 圆角 91">
@@ -30780,8 +30781,8 @@
           </p:sp>
         </mc:Fallback>
       </mc:AlternateContent>
-      <mc:AlternateContent xmlns:mc="http://schemas.openxmlformats.org/markup-compatibility/2006">
-        <mc:Choice xmlns:a14="http://schemas.microsoft.com/office/drawing/2010/main" Requires="a14">
+      <mc:AlternateContent xmlns:mc="http://schemas.openxmlformats.org/markup-compatibility/2006" xmlns:a14="http://schemas.microsoft.com/office/drawing/2010/main">
+        <mc:Choice Requires="a14">
           <p:sp>
             <p:nvSpPr>
               <p:cNvPr id="93" name="矩形: 圆角 92">
@@ -30878,7 +30879,7 @@
             </p:txBody>
           </p:sp>
         </mc:Choice>
-        <mc:Fallback>
+        <mc:Fallback xmlns="">
           <p:sp>
             <p:nvSpPr>
               <p:cNvPr id="93" name="矩形: 圆角 92">
@@ -30926,8 +30927,8 @@
           </p:sp>
         </mc:Fallback>
       </mc:AlternateContent>
-      <mc:AlternateContent xmlns:mc="http://schemas.openxmlformats.org/markup-compatibility/2006">
-        <mc:Choice xmlns:a14="http://schemas.microsoft.com/office/drawing/2010/main" Requires="a14">
+      <mc:AlternateContent xmlns:mc="http://schemas.openxmlformats.org/markup-compatibility/2006" xmlns:a14="http://schemas.microsoft.com/office/drawing/2010/main">
+        <mc:Choice Requires="a14">
           <p:sp>
             <p:nvSpPr>
               <p:cNvPr id="94" name="矩形: 圆角 93">
@@ -31070,7 +31071,7 @@
             </p:txBody>
           </p:sp>
         </mc:Choice>
-        <mc:Fallback>
+        <mc:Fallback xmlns="">
           <p:sp>
             <p:nvSpPr>
               <p:cNvPr id="94" name="矩形: 圆角 93">
@@ -31118,8 +31119,8 @@
           </p:sp>
         </mc:Fallback>
       </mc:AlternateContent>
-      <mc:AlternateContent xmlns:mc="http://schemas.openxmlformats.org/markup-compatibility/2006">
-        <mc:Choice xmlns:a14="http://schemas.microsoft.com/office/drawing/2010/main" Requires="a14">
+      <mc:AlternateContent xmlns:mc="http://schemas.openxmlformats.org/markup-compatibility/2006" xmlns:a14="http://schemas.microsoft.com/office/drawing/2010/main">
+        <mc:Choice Requires="a14">
           <p:sp>
             <p:nvSpPr>
               <p:cNvPr id="95" name="矩形: 圆角 94">
@@ -31252,7 +31253,7 @@
             </p:txBody>
           </p:sp>
         </mc:Choice>
-        <mc:Fallback>
+        <mc:Fallback xmlns="">
           <p:sp>
             <p:nvSpPr>
               <p:cNvPr id="95" name="矩形: 圆角 94">
@@ -31300,8 +31301,8 @@
           </p:sp>
         </mc:Fallback>
       </mc:AlternateContent>
-      <mc:AlternateContent xmlns:mc="http://schemas.openxmlformats.org/markup-compatibility/2006">
-        <mc:Choice xmlns:a14="http://schemas.microsoft.com/office/drawing/2010/main" Requires="a14">
+      <mc:AlternateContent xmlns:mc="http://schemas.openxmlformats.org/markup-compatibility/2006" xmlns:a14="http://schemas.microsoft.com/office/drawing/2010/main">
+        <mc:Choice Requires="a14">
           <p:sp>
             <p:nvSpPr>
               <p:cNvPr id="96" name="矩形: 圆角 95">
@@ -31451,7 +31452,7 @@
             </p:txBody>
           </p:sp>
         </mc:Choice>
-        <mc:Fallback>
+        <mc:Fallback xmlns="">
           <p:sp>
             <p:nvSpPr>
               <p:cNvPr id="96" name="矩形: 圆角 95">
@@ -31503,6 +31504,436 @@
     <p:extLst>
       <p:ext uri="{BB962C8B-B14F-4D97-AF65-F5344CB8AC3E}">
         <p14:creationId xmlns:p14="http://schemas.microsoft.com/office/powerpoint/2010/main" val="822933424"/>
+      </p:ext>
+    </p:extLst>
+  </p:cSld>
+  <p:clrMapOvr>
+    <a:masterClrMapping/>
+  </p:clrMapOvr>
+</p:sld>
+</file>
+
+<file path=ppt/slides/slide8.xml><?xml version="1.0" encoding="utf-8"?>
+<p:sld xmlns:a="http://schemas.openxmlformats.org/drawingml/2006/main" xmlns:r="http://schemas.openxmlformats.org/officeDocument/2006/relationships" xmlns:p="http://schemas.openxmlformats.org/presentationml/2006/main">
+  <p:cSld>
+    <p:spTree>
+      <p:nvGrpSpPr>
+        <p:cNvPr id="1" name=""/>
+        <p:cNvGrpSpPr/>
+        <p:nvPr/>
+      </p:nvGrpSpPr>
+      <p:grpSpPr>
+        <a:xfrm>
+          <a:off x="0" y="0"/>
+          <a:ext cx="0" cy="0"/>
+          <a:chOff x="0" y="0"/>
+          <a:chExt cx="0" cy="0"/>
+        </a:xfrm>
+      </p:grpSpPr>
+      <p:cxnSp>
+        <p:nvCxnSpPr>
+          <p:cNvPr id="24" name="直接连接符 23">
+            <a:extLst>
+              <a:ext uri="{FF2B5EF4-FFF2-40B4-BE49-F238E27FC236}">
+                <a16:creationId xmlns:a16="http://schemas.microsoft.com/office/drawing/2014/main" id="{C8CFFBE7-64F7-4359-8192-584353C85749}"/>
+              </a:ext>
+            </a:extLst>
+          </p:cNvPr>
+          <p:cNvCxnSpPr>
+            <a:cxnSpLocks/>
+          </p:cNvCxnSpPr>
+          <p:nvPr/>
+        </p:nvCxnSpPr>
+        <p:spPr>
+          <a:xfrm>
+            <a:off x="471055" y="2563091"/>
+            <a:ext cx="1939636" cy="0"/>
+          </a:xfrm>
+          <a:prstGeom prst="line">
+            <a:avLst/>
+          </a:prstGeom>
+          <a:ln w="76200">
+            <a:solidFill>
+              <a:srgbClr val="F9EBE9"/>
+            </a:solidFill>
+            <a:headEnd type="none" w="med" len="med"/>
+            <a:tailEnd type="none" w="med" len="med"/>
+          </a:ln>
+        </p:spPr>
+        <p:style>
+          <a:lnRef idx="1">
+            <a:schemeClr val="accent1"/>
+          </a:lnRef>
+          <a:fillRef idx="0">
+            <a:schemeClr val="accent1"/>
+          </a:fillRef>
+          <a:effectRef idx="0">
+            <a:schemeClr val="accent1"/>
+          </a:effectRef>
+          <a:fontRef idx="minor">
+            <a:schemeClr val="tx1"/>
+          </a:fontRef>
+        </p:style>
+      </p:cxnSp>
+      <p:cxnSp>
+        <p:nvCxnSpPr>
+          <p:cNvPr id="9" name="直接连接符 8">
+            <a:extLst>
+              <a:ext uri="{FF2B5EF4-FFF2-40B4-BE49-F238E27FC236}">
+                <a16:creationId xmlns:a16="http://schemas.microsoft.com/office/drawing/2014/main" id="{371872B6-07A2-4044-88E4-C96222FAA073}"/>
+              </a:ext>
+            </a:extLst>
+          </p:cNvPr>
+          <p:cNvCxnSpPr>
+            <a:cxnSpLocks/>
+          </p:cNvCxnSpPr>
+          <p:nvPr/>
+        </p:nvCxnSpPr>
+        <p:spPr>
+          <a:xfrm>
+            <a:off x="2410691" y="2563091"/>
+            <a:ext cx="1939636" cy="0"/>
+          </a:xfrm>
+          <a:prstGeom prst="line">
+            <a:avLst/>
+          </a:prstGeom>
+          <a:ln w="76200">
+            <a:solidFill>
+              <a:srgbClr val="CDA398"/>
+            </a:solidFill>
+            <a:headEnd type="none" w="med" len="med"/>
+            <a:tailEnd type="none" w="med" len="med"/>
+          </a:ln>
+        </p:spPr>
+        <p:style>
+          <a:lnRef idx="1">
+            <a:schemeClr val="accent1"/>
+          </a:lnRef>
+          <a:fillRef idx="0">
+            <a:schemeClr val="accent1"/>
+          </a:fillRef>
+          <a:effectRef idx="0">
+            <a:schemeClr val="accent1"/>
+          </a:effectRef>
+          <a:fontRef idx="minor">
+            <a:schemeClr val="tx1"/>
+          </a:fontRef>
+        </p:style>
+      </p:cxnSp>
+      <p:cxnSp>
+        <p:nvCxnSpPr>
+          <p:cNvPr id="14" name="直接连接符 13">
+            <a:extLst>
+              <a:ext uri="{FF2B5EF4-FFF2-40B4-BE49-F238E27FC236}">
+                <a16:creationId xmlns:a16="http://schemas.microsoft.com/office/drawing/2014/main" id="{A75412EE-9EE5-433A-919C-3531505FE5F7}"/>
+              </a:ext>
+            </a:extLst>
+          </p:cNvPr>
+          <p:cNvCxnSpPr>
+            <a:cxnSpLocks/>
+          </p:cNvCxnSpPr>
+          <p:nvPr/>
+        </p:nvCxnSpPr>
+        <p:spPr>
+          <a:xfrm>
+            <a:off x="4350327" y="2563091"/>
+            <a:ext cx="1939636" cy="0"/>
+          </a:xfrm>
+          <a:prstGeom prst="line">
+            <a:avLst/>
+          </a:prstGeom>
+          <a:ln w="76200">
+            <a:solidFill>
+              <a:srgbClr val="EFCAC3"/>
+            </a:solidFill>
+            <a:headEnd type="none" w="med" len="med"/>
+            <a:tailEnd type="none" w="med" len="med"/>
+          </a:ln>
+        </p:spPr>
+        <p:style>
+          <a:lnRef idx="1">
+            <a:schemeClr val="accent1"/>
+          </a:lnRef>
+          <a:fillRef idx="0">
+            <a:schemeClr val="accent1"/>
+          </a:fillRef>
+          <a:effectRef idx="0">
+            <a:schemeClr val="accent1"/>
+          </a:effectRef>
+          <a:fontRef idx="minor">
+            <a:schemeClr val="tx1"/>
+          </a:fontRef>
+        </p:style>
+      </p:cxnSp>
+      <p:sp>
+        <p:nvSpPr>
+          <p:cNvPr id="16" name="文本框 15">
+            <a:extLst>
+              <a:ext uri="{FF2B5EF4-FFF2-40B4-BE49-F238E27FC236}">
+                <a16:creationId xmlns:a16="http://schemas.microsoft.com/office/drawing/2014/main" id="{3B6676FE-968F-4CA7-B83A-27A3636A0740}"/>
+              </a:ext>
+            </a:extLst>
+          </p:cNvPr>
+          <p:cNvSpPr txBox="1"/>
+          <p:nvPr/>
+        </p:nvSpPr>
+        <p:spPr>
+          <a:xfrm>
+            <a:off x="2082854" y="2378425"/>
+            <a:ext cx="655674" cy="369332"/>
+          </a:xfrm>
+          <a:prstGeom prst="rect">
+            <a:avLst/>
+          </a:prstGeom>
+          <a:noFill/>
+          <a:ln>
+            <a:solidFill>
+              <a:srgbClr val="2F0000"/>
+            </a:solidFill>
+          </a:ln>
+        </p:spPr>
+        <p:txBody>
+          <a:bodyPr wrap="square" rtlCol="0">
+            <a:spAutoFit/>
+          </a:bodyPr>
+          <a:lstStyle/>
+          <a:p>
+            <a:pPr algn="ctr"/>
+            <a:r>
+              <a:rPr lang="zh-CN" altLang="en-US" dirty="0"/>
+              <a:t>过去</a:t>
+            </a:r>
+          </a:p>
+        </p:txBody>
+      </p:sp>
+      <p:sp>
+        <p:nvSpPr>
+          <p:cNvPr id="17" name="文本框 16">
+            <a:extLst>
+              <a:ext uri="{FF2B5EF4-FFF2-40B4-BE49-F238E27FC236}">
+                <a16:creationId xmlns:a16="http://schemas.microsoft.com/office/drawing/2014/main" id="{AD805D14-551B-4C46-821B-5CFC9D8738AF}"/>
+              </a:ext>
+            </a:extLst>
+          </p:cNvPr>
+          <p:cNvSpPr txBox="1"/>
+          <p:nvPr/>
+        </p:nvSpPr>
+        <p:spPr>
+          <a:xfrm>
+            <a:off x="4022490" y="2378425"/>
+            <a:ext cx="655674" cy="369332"/>
+          </a:xfrm>
+          <a:prstGeom prst="rect">
+            <a:avLst/>
+          </a:prstGeom>
+          <a:noFill/>
+          <a:ln>
+            <a:solidFill>
+              <a:srgbClr val="2F0000"/>
+            </a:solidFill>
+          </a:ln>
+        </p:spPr>
+        <p:txBody>
+          <a:bodyPr wrap="square" rtlCol="0">
+            <a:spAutoFit/>
+          </a:bodyPr>
+          <a:lstStyle/>
+          <a:p>
+            <a:pPr algn="ctr"/>
+            <a:r>
+              <a:rPr lang="zh-CN" altLang="en-US" dirty="0"/>
+              <a:t>现在</a:t>
+            </a:r>
+          </a:p>
+        </p:txBody>
+      </p:sp>
+      <p:sp>
+        <p:nvSpPr>
+          <p:cNvPr id="18" name="文本框 17">
+            <a:extLst>
+              <a:ext uri="{FF2B5EF4-FFF2-40B4-BE49-F238E27FC236}">
+                <a16:creationId xmlns:a16="http://schemas.microsoft.com/office/drawing/2014/main" id="{F5586768-1416-40D0-82A8-65C4B3541412}"/>
+              </a:ext>
+            </a:extLst>
+          </p:cNvPr>
+          <p:cNvSpPr txBox="1"/>
+          <p:nvPr/>
+        </p:nvSpPr>
+        <p:spPr>
+          <a:xfrm>
+            <a:off x="5962126" y="2378425"/>
+            <a:ext cx="655674" cy="369332"/>
+          </a:xfrm>
+          <a:prstGeom prst="rect">
+            <a:avLst/>
+          </a:prstGeom>
+          <a:noFill/>
+          <a:ln>
+            <a:solidFill>
+              <a:srgbClr val="2F0000"/>
+            </a:solidFill>
+          </a:ln>
+        </p:spPr>
+        <p:txBody>
+          <a:bodyPr wrap="square" rtlCol="0">
+            <a:spAutoFit/>
+          </a:bodyPr>
+          <a:lstStyle/>
+          <a:p>
+            <a:pPr algn="ctr"/>
+            <a:r>
+              <a:rPr lang="zh-CN" altLang="en-US" dirty="0"/>
+              <a:t>将来</a:t>
+            </a:r>
+          </a:p>
+        </p:txBody>
+      </p:sp>
+      <p:sp>
+        <p:nvSpPr>
+          <p:cNvPr id="19" name="文本框 18">
+            <a:extLst>
+              <a:ext uri="{FF2B5EF4-FFF2-40B4-BE49-F238E27FC236}">
+                <a16:creationId xmlns:a16="http://schemas.microsoft.com/office/drawing/2014/main" id="{1EA7DA2A-D5B8-4232-BE08-A4623DE158D9}"/>
+              </a:ext>
+            </a:extLst>
+          </p:cNvPr>
+          <p:cNvSpPr txBox="1"/>
+          <p:nvPr/>
+        </p:nvSpPr>
+        <p:spPr>
+          <a:xfrm>
+            <a:off x="744026" y="2101426"/>
+            <a:ext cx="1338828" cy="369332"/>
+          </a:xfrm>
+          <a:prstGeom prst="rect">
+            <a:avLst/>
+          </a:prstGeom>
+          <a:noFill/>
+        </p:spPr>
+        <p:txBody>
+          <a:bodyPr wrap="none" rtlCol="0">
+            <a:spAutoFit/>
+          </a:bodyPr>
+          <a:lstStyle/>
+          <a:p>
+            <a:r>
+              <a:rPr lang="zh-CN" altLang="en-US" dirty="0"/>
+              <a:t>过去完成时</a:t>
+            </a:r>
+          </a:p>
+        </p:txBody>
+      </p:sp>
+      <p:sp>
+        <p:nvSpPr>
+          <p:cNvPr id="20" name="文本框 19">
+            <a:extLst>
+              <a:ext uri="{FF2B5EF4-FFF2-40B4-BE49-F238E27FC236}">
+                <a16:creationId xmlns:a16="http://schemas.microsoft.com/office/drawing/2014/main" id="{01925DC0-002B-43F2-83D1-3EC7F9233225}"/>
+              </a:ext>
+            </a:extLst>
+          </p:cNvPr>
+          <p:cNvSpPr txBox="1"/>
+          <p:nvPr/>
+        </p:nvSpPr>
+        <p:spPr>
+          <a:xfrm>
+            <a:off x="2738528" y="1824427"/>
+            <a:ext cx="1338828" cy="646331"/>
+          </a:xfrm>
+          <a:prstGeom prst="rect">
+            <a:avLst/>
+          </a:prstGeom>
+          <a:noFill/>
+        </p:spPr>
+        <p:txBody>
+          <a:bodyPr wrap="none" rtlCol="0">
+            <a:spAutoFit/>
+          </a:bodyPr>
+          <a:lstStyle/>
+          <a:p>
+            <a:r>
+              <a:rPr lang="zh-CN" altLang="en-US" dirty="0"/>
+              <a:t>现在完成时</a:t>
+            </a:r>
+            <a:endParaRPr lang="en-US" altLang="zh-CN" dirty="0"/>
+          </a:p>
+          <a:p>
+            <a:r>
+              <a:rPr lang="zh-CN" altLang="en-US" dirty="0"/>
+              <a:t>一般过去时</a:t>
+            </a:r>
+          </a:p>
+        </p:txBody>
+      </p:sp>
+      <p:sp>
+        <p:nvSpPr>
+          <p:cNvPr id="22" name="文本框 21">
+            <a:extLst>
+              <a:ext uri="{FF2B5EF4-FFF2-40B4-BE49-F238E27FC236}">
+                <a16:creationId xmlns:a16="http://schemas.microsoft.com/office/drawing/2014/main" id="{9B858700-8A67-4009-8F1D-7C904BDEDA17}"/>
+              </a:ext>
+            </a:extLst>
+          </p:cNvPr>
+          <p:cNvSpPr txBox="1"/>
+          <p:nvPr/>
+        </p:nvSpPr>
+        <p:spPr>
+          <a:xfrm>
+            <a:off x="4699417" y="2101426"/>
+            <a:ext cx="1338828" cy="369332"/>
+          </a:xfrm>
+          <a:prstGeom prst="rect">
+            <a:avLst/>
+          </a:prstGeom>
+          <a:noFill/>
+        </p:spPr>
+        <p:txBody>
+          <a:bodyPr wrap="none" rtlCol="0">
+            <a:spAutoFit/>
+          </a:bodyPr>
+          <a:lstStyle/>
+          <a:p>
+            <a:r>
+              <a:rPr lang="zh-CN" altLang="en-US" dirty="0"/>
+              <a:t>将来完成时</a:t>
+            </a:r>
+          </a:p>
+        </p:txBody>
+      </p:sp>
+      <p:pic>
+        <p:nvPicPr>
+          <p:cNvPr id="25" name="图片 24">
+            <a:extLst>
+              <a:ext uri="{FF2B5EF4-FFF2-40B4-BE49-F238E27FC236}">
+                <a16:creationId xmlns:a16="http://schemas.microsoft.com/office/drawing/2014/main" id="{873173EE-E26C-429C-BE0A-C8A222152EF8}"/>
+              </a:ext>
+            </a:extLst>
+          </p:cNvPr>
+          <p:cNvPicPr>
+            <a:picLocks noChangeAspect="1"/>
+          </p:cNvPicPr>
+          <p:nvPr/>
+        </p:nvPicPr>
+        <p:blipFill>
+          <a:blip r:embed="rId2"/>
+          <a:stretch>
+            <a:fillRect/>
+          </a:stretch>
+        </p:blipFill>
+        <p:spPr>
+          <a:xfrm>
+            <a:off x="2998963" y="2904698"/>
+            <a:ext cx="6194073" cy="1048603"/>
+          </a:xfrm>
+          <a:prstGeom prst="rect">
+            <a:avLst/>
+          </a:prstGeom>
+        </p:spPr>
+      </p:pic>
+    </p:spTree>
+    <p:extLst>
+      <p:ext uri="{BB962C8B-B14F-4D97-AF65-F5344CB8AC3E}">
+        <p14:creationId xmlns:p14="http://schemas.microsoft.com/office/powerpoint/2010/main" val="956915275"/>
       </p:ext>
     </p:extLst>
   </p:cSld>

</xml_diff>

<commit_message>
Site updated: 2021-04-03 10:22:16
</commit_message>
<xml_diff>
--- a/img/pic.pptx
+++ b/img/pic.pptx
@@ -5,7 +5,7 @@
     <p:sldMasterId id="2147483648" r:id="rId1"/>
   </p:sldMasterIdLst>
   <p:notesMasterIdLst>
-    <p:notesMasterId r:id="rId10"/>
+    <p:notesMasterId r:id="rId11"/>
   </p:notesMasterIdLst>
   <p:sldIdLst>
     <p:sldId id="256" r:id="rId2"/>
@@ -16,6 +16,7 @@
     <p:sldId id="263" r:id="rId7"/>
     <p:sldId id="264" r:id="rId8"/>
     <p:sldId id="265" r:id="rId9"/>
+    <p:sldId id="266" r:id="rId10"/>
   </p:sldIdLst>
   <p:sldSz cx="12192000" cy="6858000"/>
   <p:notesSz cx="6858000" cy="9144000"/>
@@ -204,7 +205,7 @@
           <a:p>
             <a:fld id="{6C1D4226-1D08-4AB6-B9A0-83A7BEB3795D}" type="datetimeFigureOut">
               <a:rPr lang="zh-CN" altLang="en-US" smtClean="0"/>
-              <a:t>2020/9/16</a:t>
+              <a:t>2021/3/12</a:t>
             </a:fld>
             <a:endParaRPr lang="zh-CN" altLang="en-US"/>
           </a:p>
@@ -702,7 +703,7 @@
           <a:p>
             <a:fld id="{AD787EDF-0DB4-449C-B77F-F665B7FCA930}" type="datetimeFigureOut">
               <a:rPr lang="zh-CN" altLang="en-US" smtClean="0"/>
-              <a:t>2020/9/16</a:t>
+              <a:t>2021/3/12</a:t>
             </a:fld>
             <a:endParaRPr lang="zh-CN" altLang="en-US"/>
           </a:p>
@@ -900,7 +901,7 @@
           <a:p>
             <a:fld id="{AD787EDF-0DB4-449C-B77F-F665B7FCA930}" type="datetimeFigureOut">
               <a:rPr lang="zh-CN" altLang="en-US" smtClean="0"/>
-              <a:t>2020/9/16</a:t>
+              <a:t>2021/3/12</a:t>
             </a:fld>
             <a:endParaRPr lang="zh-CN" altLang="en-US"/>
           </a:p>
@@ -1108,7 +1109,7 @@
           <a:p>
             <a:fld id="{AD787EDF-0DB4-449C-B77F-F665B7FCA930}" type="datetimeFigureOut">
               <a:rPr lang="zh-CN" altLang="en-US" smtClean="0"/>
-              <a:t>2020/9/16</a:t>
+              <a:t>2021/3/12</a:t>
             </a:fld>
             <a:endParaRPr lang="zh-CN" altLang="en-US"/>
           </a:p>
@@ -1306,7 +1307,7 @@
           <a:p>
             <a:fld id="{AD787EDF-0DB4-449C-B77F-F665B7FCA930}" type="datetimeFigureOut">
               <a:rPr lang="zh-CN" altLang="en-US" smtClean="0"/>
-              <a:t>2020/9/16</a:t>
+              <a:t>2021/3/12</a:t>
             </a:fld>
             <a:endParaRPr lang="zh-CN" altLang="en-US"/>
           </a:p>
@@ -1581,7 +1582,7 @@
           <a:p>
             <a:fld id="{AD787EDF-0DB4-449C-B77F-F665B7FCA930}" type="datetimeFigureOut">
               <a:rPr lang="zh-CN" altLang="en-US" smtClean="0"/>
-              <a:t>2020/9/16</a:t>
+              <a:t>2021/3/12</a:t>
             </a:fld>
             <a:endParaRPr lang="zh-CN" altLang="en-US"/>
           </a:p>
@@ -1846,7 +1847,7 @@
           <a:p>
             <a:fld id="{AD787EDF-0DB4-449C-B77F-F665B7FCA930}" type="datetimeFigureOut">
               <a:rPr lang="zh-CN" altLang="en-US" smtClean="0"/>
-              <a:t>2020/9/16</a:t>
+              <a:t>2021/3/12</a:t>
             </a:fld>
             <a:endParaRPr lang="zh-CN" altLang="en-US"/>
           </a:p>
@@ -2258,7 +2259,7 @@
           <a:p>
             <a:fld id="{AD787EDF-0DB4-449C-B77F-F665B7FCA930}" type="datetimeFigureOut">
               <a:rPr lang="zh-CN" altLang="en-US" smtClean="0"/>
-              <a:t>2020/9/16</a:t>
+              <a:t>2021/3/12</a:t>
             </a:fld>
             <a:endParaRPr lang="zh-CN" altLang="en-US"/>
           </a:p>
@@ -2399,7 +2400,7 @@
           <a:p>
             <a:fld id="{AD787EDF-0DB4-449C-B77F-F665B7FCA930}" type="datetimeFigureOut">
               <a:rPr lang="zh-CN" altLang="en-US" smtClean="0"/>
-              <a:t>2020/9/16</a:t>
+              <a:t>2021/3/12</a:t>
             </a:fld>
             <a:endParaRPr lang="zh-CN" altLang="en-US"/>
           </a:p>
@@ -2512,7 +2513,7 @@
           <a:p>
             <a:fld id="{AD787EDF-0DB4-449C-B77F-F665B7FCA930}" type="datetimeFigureOut">
               <a:rPr lang="zh-CN" altLang="en-US" smtClean="0"/>
-              <a:t>2020/9/16</a:t>
+              <a:t>2021/3/12</a:t>
             </a:fld>
             <a:endParaRPr lang="zh-CN" altLang="en-US"/>
           </a:p>
@@ -2823,7 +2824,7 @@
           <a:p>
             <a:fld id="{AD787EDF-0DB4-449C-B77F-F665B7FCA930}" type="datetimeFigureOut">
               <a:rPr lang="zh-CN" altLang="en-US" smtClean="0"/>
-              <a:t>2020/9/16</a:t>
+              <a:t>2021/3/12</a:t>
             </a:fld>
             <a:endParaRPr lang="zh-CN" altLang="en-US"/>
           </a:p>
@@ -3111,7 +3112,7 @@
           <a:p>
             <a:fld id="{AD787EDF-0DB4-449C-B77F-F665B7FCA930}" type="datetimeFigureOut">
               <a:rPr lang="zh-CN" altLang="en-US" smtClean="0"/>
-              <a:t>2020/9/16</a:t>
+              <a:t>2021/3/12</a:t>
             </a:fld>
             <a:endParaRPr lang="zh-CN" altLang="en-US"/>
           </a:p>
@@ -3352,7 +3353,7 @@
           <a:p>
             <a:fld id="{AD787EDF-0DB4-449C-B77F-F665B7FCA930}" type="datetimeFigureOut">
               <a:rPr lang="zh-CN" altLang="en-US" smtClean="0"/>
-              <a:t>2020/9/16</a:t>
+              <a:t>2021/3/12</a:t>
             </a:fld>
             <a:endParaRPr lang="zh-CN" altLang="en-US"/>
           </a:p>
@@ -31943,6 +31944,780 @@
 </p:sld>
 </file>
 
+<file path=ppt/slides/slide9.xml><?xml version="1.0" encoding="utf-8"?>
+<p:sld xmlns:a="http://schemas.openxmlformats.org/drawingml/2006/main" xmlns:r="http://schemas.openxmlformats.org/officeDocument/2006/relationships" xmlns:p="http://schemas.openxmlformats.org/presentationml/2006/main">
+  <p:cSld>
+    <p:spTree>
+      <p:nvGrpSpPr>
+        <p:cNvPr id="1" name=""/>
+        <p:cNvGrpSpPr/>
+        <p:nvPr/>
+      </p:nvGrpSpPr>
+      <p:grpSpPr>
+        <a:xfrm>
+          <a:off x="0" y="0"/>
+          <a:ext cx="0" cy="0"/>
+          <a:chOff x="0" y="0"/>
+          <a:chExt cx="0" cy="0"/>
+        </a:xfrm>
+      </p:grpSpPr>
+      <p:sp>
+        <p:nvSpPr>
+          <p:cNvPr id="2" name="矩形: 圆角 1">
+            <a:extLst>
+              <a:ext uri="{FF2B5EF4-FFF2-40B4-BE49-F238E27FC236}">
+                <a16:creationId xmlns:a16="http://schemas.microsoft.com/office/drawing/2014/main" id="{279FCAA8-5B88-4992-AEAC-91210A0B40BB}"/>
+              </a:ext>
+            </a:extLst>
+          </p:cNvPr>
+          <p:cNvSpPr/>
+          <p:nvPr/>
+        </p:nvSpPr>
+        <p:spPr>
+          <a:xfrm>
+            <a:off x="1025236" y="324465"/>
+            <a:ext cx="4136699" cy="2728451"/>
+          </a:xfrm>
+          <a:prstGeom prst="roundRect">
+            <a:avLst>
+              <a:gd name="adj" fmla="val 0"/>
+            </a:avLst>
+          </a:prstGeom>
+          <a:solidFill>
+            <a:srgbClr val="CDA398"/>
+          </a:solidFill>
+          <a:ln w="28575">
+            <a:noFill/>
+          </a:ln>
+        </p:spPr>
+        <p:style>
+          <a:lnRef idx="1">
+            <a:schemeClr val="accent1"/>
+          </a:lnRef>
+          <a:fillRef idx="0">
+            <a:schemeClr val="accent1"/>
+          </a:fillRef>
+          <a:effectRef idx="0">
+            <a:schemeClr val="accent1"/>
+          </a:effectRef>
+          <a:fontRef idx="minor">
+            <a:schemeClr val="tx1"/>
+          </a:fontRef>
+        </p:style>
+        <p:txBody>
+          <a:bodyPr rtlCol="0" anchor="ctr"/>
+          <a:lstStyle/>
+          <a:p>
+            <a:r>
+              <a:rPr lang="en-US" altLang="zh-CN" dirty="0">
+                <a:latin typeface="Consolas" panose="020B0609020204030204" pitchFamily="49" charset="0"/>
+              </a:rPr>
+              <a:t>class animal</a:t>
+            </a:r>
+          </a:p>
+          <a:p>
+            <a:r>
+              <a:rPr lang="en-US" altLang="zh-CN" dirty="0">
+                <a:latin typeface="Consolas" panose="020B0609020204030204" pitchFamily="49" charset="0"/>
+              </a:rPr>
+              <a:t>{</a:t>
+            </a:r>
+          </a:p>
+          <a:p>
+            <a:r>
+              <a:rPr lang="en-US" altLang="zh-CN" dirty="0">
+                <a:latin typeface="Consolas" panose="020B0609020204030204" pitchFamily="49" charset="0"/>
+              </a:rPr>
+              <a:t>public:</a:t>
+            </a:r>
+            <a:endParaRPr lang="zh-CN" altLang="en-US" dirty="0">
+              <a:latin typeface="Consolas" panose="020B0609020204030204" pitchFamily="49" charset="0"/>
+            </a:endParaRPr>
+          </a:p>
+          <a:p>
+            <a:r>
+              <a:rPr lang="zh-CN" altLang="en-US" dirty="0">
+                <a:latin typeface="Consolas" panose="020B0609020204030204" pitchFamily="49" charset="0"/>
+              </a:rPr>
+              <a:t>    </a:t>
+            </a:r>
+            <a:r>
+              <a:rPr lang="en-US" altLang="zh-CN" dirty="0">
+                <a:latin typeface="Consolas" panose="020B0609020204030204" pitchFamily="49" charset="0"/>
+              </a:rPr>
+              <a:t>virtual void speak()</a:t>
+            </a:r>
+          </a:p>
+          <a:p>
+            <a:r>
+              <a:rPr lang="en-US" altLang="zh-CN" dirty="0">
+                <a:latin typeface="Consolas" panose="020B0609020204030204" pitchFamily="49" charset="0"/>
+              </a:rPr>
+              <a:t>    {</a:t>
+            </a:r>
+          </a:p>
+          <a:p>
+            <a:r>
+              <a:rPr lang="en-US" altLang="zh-CN" dirty="0">
+                <a:latin typeface="Consolas" panose="020B0609020204030204" pitchFamily="49" charset="0"/>
+              </a:rPr>
+              <a:t>        </a:t>
+            </a:r>
+            <a:r>
+              <a:rPr lang="en-US" altLang="zh-CN" dirty="0" err="1">
+                <a:latin typeface="Consolas" panose="020B0609020204030204" pitchFamily="49" charset="0"/>
+              </a:rPr>
+              <a:t>cout</a:t>
+            </a:r>
+            <a:r>
+              <a:rPr lang="en-US" altLang="zh-CN" dirty="0">
+                <a:latin typeface="Consolas" panose="020B0609020204030204" pitchFamily="49" charset="0"/>
+              </a:rPr>
+              <a:t>&lt;&lt;"</a:t>
+            </a:r>
+            <a:r>
+              <a:rPr lang="zh-CN" altLang="en-US" dirty="0">
+                <a:latin typeface="Consolas" panose="020B0609020204030204" pitchFamily="49" charset="0"/>
+              </a:rPr>
+              <a:t>动物在叫</a:t>
+            </a:r>
+            <a:r>
+              <a:rPr lang="en-US" altLang="zh-CN" dirty="0">
+                <a:latin typeface="Consolas" panose="020B0609020204030204" pitchFamily="49" charset="0"/>
+              </a:rPr>
+              <a:t>"&lt;&lt;</a:t>
+            </a:r>
+            <a:r>
+              <a:rPr lang="en-US" altLang="zh-CN" dirty="0" err="1">
+                <a:latin typeface="Consolas" panose="020B0609020204030204" pitchFamily="49" charset="0"/>
+              </a:rPr>
+              <a:t>endl</a:t>
+            </a:r>
+            <a:r>
+              <a:rPr lang="en-US" altLang="zh-CN" dirty="0">
+                <a:latin typeface="Consolas" panose="020B0609020204030204" pitchFamily="49" charset="0"/>
+              </a:rPr>
+              <a:t>; </a:t>
+            </a:r>
+          </a:p>
+          <a:p>
+            <a:r>
+              <a:rPr lang="en-US" altLang="zh-CN" dirty="0">
+                <a:latin typeface="Consolas" panose="020B0609020204030204" pitchFamily="49" charset="0"/>
+              </a:rPr>
+              <a:t>    }</a:t>
+            </a:r>
+          </a:p>
+          <a:p>
+            <a:r>
+              <a:rPr lang="en-US" altLang="zh-CN" dirty="0">
+                <a:latin typeface="Consolas" panose="020B0609020204030204" pitchFamily="49" charset="0"/>
+              </a:rPr>
+              <a:t>};</a:t>
+            </a:r>
+            <a:endParaRPr lang="zh-CN" altLang="en-US" dirty="0">
+              <a:latin typeface="Consolas" panose="020B0609020204030204" pitchFamily="49" charset="0"/>
+            </a:endParaRPr>
+          </a:p>
+        </p:txBody>
+      </p:sp>
+      <p:sp>
+        <p:nvSpPr>
+          <p:cNvPr id="14" name="矩形: 圆角 13">
+            <a:extLst>
+              <a:ext uri="{FF2B5EF4-FFF2-40B4-BE49-F238E27FC236}">
+                <a16:creationId xmlns:a16="http://schemas.microsoft.com/office/drawing/2014/main" id="{09775453-BC70-4664-B70E-FC2FC325BDEE}"/>
+              </a:ext>
+            </a:extLst>
+          </p:cNvPr>
+          <p:cNvSpPr/>
+          <p:nvPr/>
+        </p:nvSpPr>
+        <p:spPr>
+          <a:xfrm>
+            <a:off x="1025236" y="3279059"/>
+            <a:ext cx="4136699" cy="2728451"/>
+          </a:xfrm>
+          <a:prstGeom prst="roundRect">
+            <a:avLst>
+              <a:gd name="adj" fmla="val 0"/>
+            </a:avLst>
+          </a:prstGeom>
+          <a:solidFill>
+            <a:srgbClr val="CDA398"/>
+          </a:solidFill>
+          <a:ln w="28575">
+            <a:noFill/>
+          </a:ln>
+        </p:spPr>
+        <p:style>
+          <a:lnRef idx="1">
+            <a:schemeClr val="accent1"/>
+          </a:lnRef>
+          <a:fillRef idx="0">
+            <a:schemeClr val="accent1"/>
+          </a:fillRef>
+          <a:effectRef idx="0">
+            <a:schemeClr val="accent1"/>
+          </a:effectRef>
+          <a:fontRef idx="minor">
+            <a:schemeClr val="tx1"/>
+          </a:fontRef>
+        </p:style>
+        <p:txBody>
+          <a:bodyPr rtlCol="0" anchor="ctr"/>
+          <a:lstStyle/>
+          <a:p>
+            <a:r>
+              <a:rPr lang="en-US" altLang="zh-CN" dirty="0">
+                <a:latin typeface="Consolas" panose="020B0609020204030204" pitchFamily="49" charset="0"/>
+              </a:rPr>
+              <a:t>class </a:t>
+            </a:r>
+            <a:r>
+              <a:rPr lang="en-US" altLang="zh-CN" dirty="0" err="1">
+                <a:latin typeface="Consolas" panose="020B0609020204030204" pitchFamily="49" charset="0"/>
+              </a:rPr>
+              <a:t>cat:public</a:t>
+            </a:r>
+            <a:r>
+              <a:rPr lang="en-US" altLang="zh-CN" dirty="0">
+                <a:latin typeface="Consolas" panose="020B0609020204030204" pitchFamily="49" charset="0"/>
+              </a:rPr>
+              <a:t> animal </a:t>
+            </a:r>
+          </a:p>
+          <a:p>
+            <a:r>
+              <a:rPr lang="en-US" altLang="zh-CN" dirty="0">
+                <a:latin typeface="Consolas" panose="020B0609020204030204" pitchFamily="49" charset="0"/>
+              </a:rPr>
+              <a:t>{</a:t>
+            </a:r>
+          </a:p>
+          <a:p>
+            <a:r>
+              <a:rPr lang="en-US" altLang="zh-CN" dirty="0">
+                <a:latin typeface="Consolas" panose="020B0609020204030204" pitchFamily="49" charset="0"/>
+              </a:rPr>
+              <a:t>public:</a:t>
+            </a:r>
+          </a:p>
+          <a:p>
+            <a:r>
+              <a:rPr lang="en-US" altLang="zh-CN" dirty="0">
+                <a:latin typeface="Consolas" panose="020B0609020204030204" pitchFamily="49" charset="0"/>
+              </a:rPr>
+              <a:t>    void speak()</a:t>
+            </a:r>
+          </a:p>
+          <a:p>
+            <a:r>
+              <a:rPr lang="en-US" altLang="zh-CN" dirty="0">
+                <a:latin typeface="Consolas" panose="020B0609020204030204" pitchFamily="49" charset="0"/>
+              </a:rPr>
+              <a:t>    {</a:t>
+            </a:r>
+          </a:p>
+          <a:p>
+            <a:r>
+              <a:rPr lang="en-US" altLang="zh-CN" dirty="0">
+                <a:latin typeface="Consolas" panose="020B0609020204030204" pitchFamily="49" charset="0"/>
+              </a:rPr>
+              <a:t>        </a:t>
+            </a:r>
+            <a:r>
+              <a:rPr lang="en-US" altLang="zh-CN" dirty="0" err="1">
+                <a:latin typeface="Consolas" panose="020B0609020204030204" pitchFamily="49" charset="0"/>
+              </a:rPr>
+              <a:t>cout</a:t>
+            </a:r>
+            <a:r>
+              <a:rPr lang="en-US" altLang="zh-CN" dirty="0">
+                <a:latin typeface="Consolas" panose="020B0609020204030204" pitchFamily="49" charset="0"/>
+              </a:rPr>
+              <a:t>&lt;&lt;"</a:t>
+            </a:r>
+            <a:r>
+              <a:rPr lang="zh-CN" altLang="en-US" dirty="0">
+                <a:latin typeface="Consolas" panose="020B0609020204030204" pitchFamily="49" charset="0"/>
+              </a:rPr>
+              <a:t>喵喵喵</a:t>
+            </a:r>
+            <a:r>
+              <a:rPr lang="en-US" altLang="zh-CN" dirty="0">
+                <a:latin typeface="Consolas" panose="020B0609020204030204" pitchFamily="49" charset="0"/>
+              </a:rPr>
+              <a:t>"&lt;&lt;</a:t>
+            </a:r>
+            <a:r>
+              <a:rPr lang="en-US" altLang="zh-CN" dirty="0" err="1">
+                <a:latin typeface="Consolas" panose="020B0609020204030204" pitchFamily="49" charset="0"/>
+              </a:rPr>
+              <a:t>endl</a:t>
+            </a:r>
+            <a:r>
+              <a:rPr lang="en-US" altLang="zh-CN" dirty="0">
+                <a:latin typeface="Consolas" panose="020B0609020204030204" pitchFamily="49" charset="0"/>
+              </a:rPr>
+              <a:t>; </a:t>
+            </a:r>
+          </a:p>
+          <a:p>
+            <a:r>
+              <a:rPr lang="en-US" altLang="zh-CN" dirty="0">
+                <a:latin typeface="Consolas" panose="020B0609020204030204" pitchFamily="49" charset="0"/>
+              </a:rPr>
+              <a:t>    }</a:t>
+            </a:r>
+          </a:p>
+          <a:p>
+            <a:r>
+              <a:rPr lang="en-US" altLang="zh-CN" dirty="0">
+                <a:latin typeface="Consolas" panose="020B0609020204030204" pitchFamily="49" charset="0"/>
+              </a:rPr>
+              <a:t>}; </a:t>
+            </a:r>
+            <a:endParaRPr lang="zh-CN" altLang="en-US" dirty="0">
+              <a:latin typeface="Consolas" panose="020B0609020204030204" pitchFamily="49" charset="0"/>
+            </a:endParaRPr>
+          </a:p>
+        </p:txBody>
+      </p:sp>
+      <p:pic>
+        <p:nvPicPr>
+          <p:cNvPr id="7" name="图片 6">
+            <a:extLst>
+              <a:ext uri="{FF2B5EF4-FFF2-40B4-BE49-F238E27FC236}">
+                <a16:creationId xmlns:a16="http://schemas.microsoft.com/office/drawing/2014/main" id="{D387E465-E49B-4C40-974D-DA255E400ABE}"/>
+              </a:ext>
+            </a:extLst>
+          </p:cNvPr>
+          <p:cNvPicPr>
+            <a:picLocks noChangeAspect="1"/>
+          </p:cNvPicPr>
+          <p:nvPr/>
+        </p:nvPicPr>
+        <p:blipFill>
+          <a:blip r:embed="rId2">
+            <a:extLst>
+              <a:ext uri="{28A0092B-C50C-407E-A947-70E740481C1C}">
+                <a14:useLocalDpi xmlns:a14="http://schemas.microsoft.com/office/drawing/2010/main" val="0"/>
+              </a:ext>
+            </a:extLst>
+          </a:blip>
+          <a:stretch>
+            <a:fillRect/>
+          </a:stretch>
+        </p:blipFill>
+        <p:spPr>
+          <a:xfrm>
+            <a:off x="5149235" y="324464"/>
+            <a:ext cx="3723969" cy="2728451"/>
+          </a:xfrm>
+          <a:prstGeom prst="rect">
+            <a:avLst/>
+          </a:prstGeom>
+        </p:spPr>
+      </p:pic>
+      <p:sp>
+        <p:nvSpPr>
+          <p:cNvPr id="8" name="矩形: 圆角 7">
+            <a:extLst>
+              <a:ext uri="{FF2B5EF4-FFF2-40B4-BE49-F238E27FC236}">
+                <a16:creationId xmlns:a16="http://schemas.microsoft.com/office/drawing/2014/main" id="{346C4C06-BCB8-4FC2-8542-3CBA62201CCC}"/>
+              </a:ext>
+            </a:extLst>
+          </p:cNvPr>
+          <p:cNvSpPr/>
+          <p:nvPr/>
+        </p:nvSpPr>
+        <p:spPr>
+          <a:xfrm>
+            <a:off x="9055100" y="489564"/>
+            <a:ext cx="1828800" cy="450236"/>
+          </a:xfrm>
+          <a:prstGeom prst="roundRect">
+            <a:avLst/>
+          </a:prstGeom>
+          <a:solidFill>
+            <a:srgbClr val="F9EBE9"/>
+          </a:solidFill>
+          <a:ln w="28575">
+            <a:noFill/>
+          </a:ln>
+        </p:spPr>
+        <p:style>
+          <a:lnRef idx="1">
+            <a:schemeClr val="accent1"/>
+          </a:lnRef>
+          <a:fillRef idx="0">
+            <a:schemeClr val="accent1"/>
+          </a:fillRef>
+          <a:effectRef idx="0">
+            <a:schemeClr val="accent1"/>
+          </a:effectRef>
+          <a:fontRef idx="minor">
+            <a:schemeClr val="tx1"/>
+          </a:fontRef>
+        </p:style>
+        <p:txBody>
+          <a:bodyPr rtlCol="0" anchor="ctr"/>
+          <a:lstStyle/>
+          <a:p>
+            <a:pPr algn="ctr"/>
+            <a:r>
+              <a:rPr lang="en-US" altLang="zh-CN" dirty="0" err="1"/>
+              <a:t>vfptr</a:t>
+            </a:r>
+            <a:endParaRPr lang="zh-CN" altLang="en-US" dirty="0"/>
+          </a:p>
+        </p:txBody>
+      </p:sp>
+      <p:cxnSp>
+        <p:nvCxnSpPr>
+          <p:cNvPr id="15" name="直接箭头连接符 14">
+            <a:extLst>
+              <a:ext uri="{FF2B5EF4-FFF2-40B4-BE49-F238E27FC236}">
+                <a16:creationId xmlns:a16="http://schemas.microsoft.com/office/drawing/2014/main" id="{210D5DAD-9158-4366-8C28-063CC7C5E839}"/>
+              </a:ext>
+            </a:extLst>
+          </p:cNvPr>
+          <p:cNvCxnSpPr>
+            <a:cxnSpLocks/>
+            <a:stCxn id="8" idx="2"/>
+          </p:cNvCxnSpPr>
+          <p:nvPr/>
+        </p:nvCxnSpPr>
+        <p:spPr>
+          <a:xfrm>
+            <a:off x="9969500" y="939800"/>
+            <a:ext cx="0" cy="304800"/>
+          </a:xfrm>
+          <a:prstGeom prst="straightConnector1">
+            <a:avLst/>
+          </a:prstGeom>
+          <a:ln w="28575">
+            <a:solidFill>
+              <a:srgbClr val="390606"/>
+            </a:solidFill>
+            <a:headEnd type="none" w="med" len="med"/>
+            <a:tailEnd type="triangle"/>
+          </a:ln>
+        </p:spPr>
+        <p:style>
+          <a:lnRef idx="1">
+            <a:schemeClr val="accent1"/>
+          </a:lnRef>
+          <a:fillRef idx="0">
+            <a:schemeClr val="accent1"/>
+          </a:fillRef>
+          <a:effectRef idx="0">
+            <a:schemeClr val="accent1"/>
+          </a:effectRef>
+          <a:fontRef idx="minor">
+            <a:schemeClr val="tx1"/>
+          </a:fontRef>
+        </p:style>
+      </p:cxnSp>
+      <p:sp>
+        <p:nvSpPr>
+          <p:cNvPr id="23" name="矩形: 圆角 22">
+            <a:extLst>
+              <a:ext uri="{FF2B5EF4-FFF2-40B4-BE49-F238E27FC236}">
+                <a16:creationId xmlns:a16="http://schemas.microsoft.com/office/drawing/2014/main" id="{2C9A129F-BEF3-44DA-967B-A38A65515C3F}"/>
+              </a:ext>
+            </a:extLst>
+          </p:cNvPr>
+          <p:cNvSpPr/>
+          <p:nvPr/>
+        </p:nvSpPr>
+        <p:spPr>
+          <a:xfrm>
+            <a:off x="9055100" y="3456859"/>
+            <a:ext cx="1828800" cy="450236"/>
+          </a:xfrm>
+          <a:prstGeom prst="roundRect">
+            <a:avLst/>
+          </a:prstGeom>
+          <a:solidFill>
+            <a:srgbClr val="F9EBE9"/>
+          </a:solidFill>
+          <a:ln w="28575">
+            <a:noFill/>
+          </a:ln>
+        </p:spPr>
+        <p:style>
+          <a:lnRef idx="1">
+            <a:schemeClr val="accent1"/>
+          </a:lnRef>
+          <a:fillRef idx="0">
+            <a:schemeClr val="accent1"/>
+          </a:fillRef>
+          <a:effectRef idx="0">
+            <a:schemeClr val="accent1"/>
+          </a:effectRef>
+          <a:fontRef idx="minor">
+            <a:schemeClr val="tx1"/>
+          </a:fontRef>
+        </p:style>
+        <p:txBody>
+          <a:bodyPr rtlCol="0" anchor="ctr"/>
+          <a:lstStyle/>
+          <a:p>
+            <a:pPr algn="ctr"/>
+            <a:r>
+              <a:rPr lang="en-US" altLang="zh-CN" dirty="0" err="1"/>
+              <a:t>vfptr</a:t>
+            </a:r>
+            <a:endParaRPr lang="zh-CN" altLang="en-US" dirty="0"/>
+          </a:p>
+        </p:txBody>
+      </p:sp>
+      <p:cxnSp>
+        <p:nvCxnSpPr>
+          <p:cNvPr id="24" name="直接箭头连接符 23">
+            <a:extLst>
+              <a:ext uri="{FF2B5EF4-FFF2-40B4-BE49-F238E27FC236}">
+                <a16:creationId xmlns:a16="http://schemas.microsoft.com/office/drawing/2014/main" id="{E3CB7C11-F62B-451B-9698-1441BAF4861B}"/>
+              </a:ext>
+            </a:extLst>
+          </p:cNvPr>
+          <p:cNvCxnSpPr>
+            <a:cxnSpLocks/>
+          </p:cNvCxnSpPr>
+          <p:nvPr/>
+        </p:nvCxnSpPr>
+        <p:spPr>
+          <a:xfrm>
+            <a:off x="9969500" y="3907095"/>
+            <a:ext cx="0" cy="304800"/>
+          </a:xfrm>
+          <a:prstGeom prst="straightConnector1">
+            <a:avLst/>
+          </a:prstGeom>
+          <a:ln w="28575">
+            <a:solidFill>
+              <a:srgbClr val="390606"/>
+            </a:solidFill>
+            <a:headEnd type="none" w="med" len="med"/>
+            <a:tailEnd type="triangle"/>
+          </a:ln>
+        </p:spPr>
+        <p:style>
+          <a:lnRef idx="1">
+            <a:schemeClr val="accent1"/>
+          </a:lnRef>
+          <a:fillRef idx="0">
+            <a:schemeClr val="accent1"/>
+          </a:fillRef>
+          <a:effectRef idx="0">
+            <a:schemeClr val="accent1"/>
+          </a:effectRef>
+          <a:fontRef idx="minor">
+            <a:schemeClr val="tx1"/>
+          </a:fontRef>
+        </p:style>
+      </p:cxnSp>
+      <p:sp>
+        <p:nvSpPr>
+          <p:cNvPr id="25" name="矩形: 圆角 24">
+            <a:extLst>
+              <a:ext uri="{FF2B5EF4-FFF2-40B4-BE49-F238E27FC236}">
+                <a16:creationId xmlns:a16="http://schemas.microsoft.com/office/drawing/2014/main" id="{7E5E419F-7B68-450F-8B41-93996B9C18D6}"/>
+              </a:ext>
+            </a:extLst>
+          </p:cNvPr>
+          <p:cNvSpPr/>
+          <p:nvPr/>
+        </p:nvSpPr>
+        <p:spPr>
+          <a:xfrm>
+            <a:off x="9055100" y="1244600"/>
+            <a:ext cx="1828800" cy="1625600"/>
+          </a:xfrm>
+          <a:prstGeom prst="roundRect">
+            <a:avLst>
+              <a:gd name="adj" fmla="val 3906"/>
+            </a:avLst>
+          </a:prstGeom>
+          <a:solidFill>
+            <a:srgbClr val="EFCAC3"/>
+          </a:solidFill>
+          <a:ln w="28575">
+            <a:noFill/>
+          </a:ln>
+        </p:spPr>
+        <p:style>
+          <a:lnRef idx="1">
+            <a:schemeClr val="accent1"/>
+          </a:lnRef>
+          <a:fillRef idx="0">
+            <a:schemeClr val="accent1"/>
+          </a:fillRef>
+          <a:effectRef idx="0">
+            <a:schemeClr val="accent1"/>
+          </a:effectRef>
+          <a:fontRef idx="minor">
+            <a:schemeClr val="tx1"/>
+          </a:fontRef>
+        </p:style>
+        <p:txBody>
+          <a:bodyPr rtlCol="0" anchor="ctr"/>
+          <a:lstStyle/>
+          <a:p>
+            <a:pPr algn="ctr"/>
+            <a:r>
+              <a:rPr lang="en-US" altLang="zh-CN" dirty="0" err="1"/>
+              <a:t>Vftable</a:t>
+            </a:r>
+            <a:endParaRPr lang="en-US" altLang="zh-CN" dirty="0"/>
+          </a:p>
+          <a:p>
+            <a:pPr algn="ctr"/>
+            <a:endParaRPr lang="en-US" altLang="zh-CN" dirty="0"/>
+          </a:p>
+          <a:p>
+            <a:pPr algn="ctr"/>
+            <a:r>
+              <a:rPr lang="en-US" altLang="zh-CN" dirty="0"/>
+              <a:t>&amp;animal::speak</a:t>
+            </a:r>
+          </a:p>
+          <a:p>
+            <a:pPr algn="ctr"/>
+            <a:endParaRPr lang="en-US" altLang="zh-CN" dirty="0"/>
+          </a:p>
+          <a:p>
+            <a:pPr algn="ctr"/>
+            <a:endParaRPr lang="zh-CN" altLang="en-US" dirty="0"/>
+          </a:p>
+        </p:txBody>
+      </p:sp>
+      <p:sp>
+        <p:nvSpPr>
+          <p:cNvPr id="26" name="矩形: 圆角 25">
+            <a:extLst>
+              <a:ext uri="{FF2B5EF4-FFF2-40B4-BE49-F238E27FC236}">
+                <a16:creationId xmlns:a16="http://schemas.microsoft.com/office/drawing/2014/main" id="{6457A2AD-D0A4-45FA-8A92-FDA319B7473C}"/>
+              </a:ext>
+            </a:extLst>
+          </p:cNvPr>
+          <p:cNvSpPr/>
+          <p:nvPr/>
+        </p:nvSpPr>
+        <p:spPr>
+          <a:xfrm>
+            <a:off x="9055100" y="4224595"/>
+            <a:ext cx="1828800" cy="1625600"/>
+          </a:xfrm>
+          <a:prstGeom prst="roundRect">
+            <a:avLst>
+              <a:gd name="adj" fmla="val 4167"/>
+            </a:avLst>
+          </a:prstGeom>
+          <a:solidFill>
+            <a:srgbClr val="EFCAC3"/>
+          </a:solidFill>
+          <a:ln w="28575">
+            <a:noFill/>
+          </a:ln>
+        </p:spPr>
+        <p:style>
+          <a:lnRef idx="1">
+            <a:schemeClr val="accent1"/>
+          </a:lnRef>
+          <a:fillRef idx="0">
+            <a:schemeClr val="accent1"/>
+          </a:fillRef>
+          <a:effectRef idx="0">
+            <a:schemeClr val="accent1"/>
+          </a:effectRef>
+          <a:fontRef idx="minor">
+            <a:schemeClr val="tx1"/>
+          </a:fontRef>
+        </p:style>
+        <p:txBody>
+          <a:bodyPr rtlCol="0" anchor="ctr"/>
+          <a:lstStyle/>
+          <a:p>
+            <a:pPr algn="ctr"/>
+            <a:r>
+              <a:rPr lang="en-US" altLang="zh-CN" dirty="0" err="1"/>
+              <a:t>Vftable</a:t>
+            </a:r>
+            <a:endParaRPr lang="en-US" altLang="zh-CN" dirty="0"/>
+          </a:p>
+          <a:p>
+            <a:pPr algn="ctr"/>
+            <a:endParaRPr lang="en-US" altLang="zh-CN" dirty="0"/>
+          </a:p>
+          <a:p>
+            <a:pPr algn="ctr"/>
+            <a:r>
+              <a:rPr lang="en-US" altLang="zh-CN" dirty="0"/>
+              <a:t>&amp;cat::speak</a:t>
+            </a:r>
+          </a:p>
+          <a:p>
+            <a:pPr algn="ctr"/>
+            <a:endParaRPr lang="en-US" altLang="zh-CN" dirty="0"/>
+          </a:p>
+          <a:p>
+            <a:pPr algn="ctr"/>
+            <a:endParaRPr lang="zh-CN" altLang="en-US" dirty="0"/>
+          </a:p>
+        </p:txBody>
+      </p:sp>
+      <p:pic>
+        <p:nvPicPr>
+          <p:cNvPr id="27" name="图片 26">
+            <a:extLst>
+              <a:ext uri="{FF2B5EF4-FFF2-40B4-BE49-F238E27FC236}">
+                <a16:creationId xmlns:a16="http://schemas.microsoft.com/office/drawing/2014/main" id="{3D0A15E3-9EFC-4BC3-8034-30A4CE4F508A}"/>
+              </a:ext>
+            </a:extLst>
+          </p:cNvPr>
+          <p:cNvPicPr>
+            <a:picLocks noChangeAspect="1"/>
+          </p:cNvPicPr>
+          <p:nvPr/>
+        </p:nvPicPr>
+        <p:blipFill>
+          <a:blip r:embed="rId3">
+            <a:extLst>
+              <a:ext uri="{28A0092B-C50C-407E-A947-70E740481C1C}">
+                <a14:useLocalDpi xmlns:a14="http://schemas.microsoft.com/office/drawing/2010/main" val="0"/>
+              </a:ext>
+            </a:extLst>
+          </a:blip>
+          <a:stretch>
+            <a:fillRect/>
+          </a:stretch>
+        </p:blipFill>
+        <p:spPr>
+          <a:xfrm>
+            <a:off x="5151066" y="3279058"/>
+            <a:ext cx="3742303" cy="2728450"/>
+          </a:xfrm>
+          <a:prstGeom prst="rect">
+            <a:avLst/>
+          </a:prstGeom>
+        </p:spPr>
+      </p:pic>
+    </p:spTree>
+    <p:extLst>
+      <p:ext uri="{BB962C8B-B14F-4D97-AF65-F5344CB8AC3E}">
+        <p14:creationId xmlns:p14="http://schemas.microsoft.com/office/powerpoint/2010/main" val="121297361"/>
+      </p:ext>
+    </p:extLst>
+  </p:cSld>
+  <p:clrMapOvr>
+    <a:masterClrMapping/>
+  </p:clrMapOvr>
+</p:sld>
+</file>
+
 <file path=ppt/theme/theme1.xml><?xml version="1.0" encoding="utf-8"?>
 <a:theme xmlns:a="http://schemas.openxmlformats.org/drawingml/2006/main" name="Office 主题​​">
   <a:themeElements>

</xml_diff>

<commit_message>
Site updated: 2021-08-13 23:40:48
</commit_message>
<xml_diff>
--- a/img/pic.pptx
+++ b/img/pic.pptx
@@ -16,7 +16,7 @@
     <p:sldId id="263" r:id="rId7"/>
     <p:sldId id="264" r:id="rId8"/>
     <p:sldId id="265" r:id="rId9"/>
-    <p:sldId id="266" r:id="rId10"/>
+    <p:sldId id="267" r:id="rId10"/>
   </p:sldIdLst>
   <p:sldSz cx="12192000" cy="6858000"/>
   <p:notesSz cx="6858000" cy="9144000"/>
@@ -117,7 +117,18 @@
   </p:defaultTextStyle>
   <p:extLst>
     <p:ext uri="{EFAFB233-063F-42B5-8137-9DF3F51BA10A}">
-      <p15:sldGuideLst xmlns:p15="http://schemas.microsoft.com/office/powerpoint/2012/main"/>
+      <p15:sldGuideLst xmlns:p15="http://schemas.microsoft.com/office/powerpoint/2012/main">
+        <p15:guide id="1" orient="horz" pos="2160" userDrawn="1">
+          <p15:clr>
+            <a:srgbClr val="A4A3A4"/>
+          </p15:clr>
+        </p15:guide>
+        <p15:guide id="2" pos="3840" userDrawn="1">
+          <p15:clr>
+            <a:srgbClr val="A4A3A4"/>
+          </p15:clr>
+        </p15:guide>
+      </p15:sldGuideLst>
     </p:ext>
   </p:extLst>
 </p:presentation>
@@ -205,7 +216,7 @@
           <a:p>
             <a:fld id="{6C1D4226-1D08-4AB6-B9A0-83A7BEB3795D}" type="datetimeFigureOut">
               <a:rPr lang="zh-CN" altLang="en-US" smtClean="0"/>
-              <a:t>2021/3/12</a:t>
+              <a:t>2021/6/24</a:t>
             </a:fld>
             <a:endParaRPr lang="zh-CN" altLang="en-US"/>
           </a:p>
@@ -703,7 +714,7 @@
           <a:p>
             <a:fld id="{AD787EDF-0DB4-449C-B77F-F665B7FCA930}" type="datetimeFigureOut">
               <a:rPr lang="zh-CN" altLang="en-US" smtClean="0"/>
-              <a:t>2021/3/12</a:t>
+              <a:t>2021/6/24</a:t>
             </a:fld>
             <a:endParaRPr lang="zh-CN" altLang="en-US"/>
           </a:p>
@@ -901,7 +912,7 @@
           <a:p>
             <a:fld id="{AD787EDF-0DB4-449C-B77F-F665B7FCA930}" type="datetimeFigureOut">
               <a:rPr lang="zh-CN" altLang="en-US" smtClean="0"/>
-              <a:t>2021/3/12</a:t>
+              <a:t>2021/6/24</a:t>
             </a:fld>
             <a:endParaRPr lang="zh-CN" altLang="en-US"/>
           </a:p>
@@ -1109,7 +1120,7 @@
           <a:p>
             <a:fld id="{AD787EDF-0DB4-449C-B77F-F665B7FCA930}" type="datetimeFigureOut">
               <a:rPr lang="zh-CN" altLang="en-US" smtClean="0"/>
-              <a:t>2021/3/12</a:t>
+              <a:t>2021/6/24</a:t>
             </a:fld>
             <a:endParaRPr lang="zh-CN" altLang="en-US"/>
           </a:p>
@@ -1307,7 +1318,7 @@
           <a:p>
             <a:fld id="{AD787EDF-0DB4-449C-B77F-F665B7FCA930}" type="datetimeFigureOut">
               <a:rPr lang="zh-CN" altLang="en-US" smtClean="0"/>
-              <a:t>2021/3/12</a:t>
+              <a:t>2021/6/24</a:t>
             </a:fld>
             <a:endParaRPr lang="zh-CN" altLang="en-US"/>
           </a:p>
@@ -1582,7 +1593,7 @@
           <a:p>
             <a:fld id="{AD787EDF-0DB4-449C-B77F-F665B7FCA930}" type="datetimeFigureOut">
               <a:rPr lang="zh-CN" altLang="en-US" smtClean="0"/>
-              <a:t>2021/3/12</a:t>
+              <a:t>2021/6/24</a:t>
             </a:fld>
             <a:endParaRPr lang="zh-CN" altLang="en-US"/>
           </a:p>
@@ -1847,7 +1858,7 @@
           <a:p>
             <a:fld id="{AD787EDF-0DB4-449C-B77F-F665B7FCA930}" type="datetimeFigureOut">
               <a:rPr lang="zh-CN" altLang="en-US" smtClean="0"/>
-              <a:t>2021/3/12</a:t>
+              <a:t>2021/6/24</a:t>
             </a:fld>
             <a:endParaRPr lang="zh-CN" altLang="en-US"/>
           </a:p>
@@ -2259,7 +2270,7 @@
           <a:p>
             <a:fld id="{AD787EDF-0DB4-449C-B77F-F665B7FCA930}" type="datetimeFigureOut">
               <a:rPr lang="zh-CN" altLang="en-US" smtClean="0"/>
-              <a:t>2021/3/12</a:t>
+              <a:t>2021/6/24</a:t>
             </a:fld>
             <a:endParaRPr lang="zh-CN" altLang="en-US"/>
           </a:p>
@@ -2400,7 +2411,7 @@
           <a:p>
             <a:fld id="{AD787EDF-0DB4-449C-B77F-F665B7FCA930}" type="datetimeFigureOut">
               <a:rPr lang="zh-CN" altLang="en-US" smtClean="0"/>
-              <a:t>2021/3/12</a:t>
+              <a:t>2021/6/24</a:t>
             </a:fld>
             <a:endParaRPr lang="zh-CN" altLang="en-US"/>
           </a:p>
@@ -2513,7 +2524,7 @@
           <a:p>
             <a:fld id="{AD787EDF-0DB4-449C-B77F-F665B7FCA930}" type="datetimeFigureOut">
               <a:rPr lang="zh-CN" altLang="en-US" smtClean="0"/>
-              <a:t>2021/3/12</a:t>
+              <a:t>2021/6/24</a:t>
             </a:fld>
             <a:endParaRPr lang="zh-CN" altLang="en-US"/>
           </a:p>
@@ -2824,7 +2835,7 @@
           <a:p>
             <a:fld id="{AD787EDF-0DB4-449C-B77F-F665B7FCA930}" type="datetimeFigureOut">
               <a:rPr lang="zh-CN" altLang="en-US" smtClean="0"/>
-              <a:t>2021/3/12</a:t>
+              <a:t>2021/6/24</a:t>
             </a:fld>
             <a:endParaRPr lang="zh-CN" altLang="en-US"/>
           </a:p>
@@ -3112,7 +3123,7 @@
           <a:p>
             <a:fld id="{AD787EDF-0DB4-449C-B77F-F665B7FCA930}" type="datetimeFigureOut">
               <a:rPr lang="zh-CN" altLang="en-US" smtClean="0"/>
-              <a:t>2021/3/12</a:t>
+              <a:t>2021/6/24</a:t>
             </a:fld>
             <a:endParaRPr lang="zh-CN" altLang="en-US"/>
           </a:p>
@@ -3353,7 +3364,7 @@
           <a:p>
             <a:fld id="{AD787EDF-0DB4-449C-B77F-F665B7FCA930}" type="datetimeFigureOut">
               <a:rPr lang="zh-CN" altLang="en-US" smtClean="0"/>
-              <a:t>2021/3/12</a:t>
+              <a:t>2021/6/24</a:t>
             </a:fld>
             <a:endParaRPr lang="zh-CN" altLang="en-US"/>
           </a:p>
@@ -31961,448 +31972,32 @@
           <a:chExt cx="0" cy="0"/>
         </a:xfrm>
       </p:grpSpPr>
-      <p:sp>
-        <p:nvSpPr>
-          <p:cNvPr id="2" name="矩形: 圆角 1">
+      <p:cxnSp>
+        <p:nvCxnSpPr>
+          <p:cNvPr id="3" name="直接连接符 2">
             <a:extLst>
               <a:ext uri="{FF2B5EF4-FFF2-40B4-BE49-F238E27FC236}">
-                <a16:creationId xmlns:a16="http://schemas.microsoft.com/office/drawing/2014/main" id="{279FCAA8-5B88-4992-AEAC-91210A0B40BB}"/>
+                <a16:creationId xmlns:a16="http://schemas.microsoft.com/office/drawing/2014/main" id="{AAEC224B-B26B-41A7-8964-FEAC163F3699}"/>
               </a:ext>
             </a:extLst>
           </p:cNvPr>
-          <p:cNvSpPr/>
-          <p:nvPr/>
-        </p:nvSpPr>
-        <p:spPr>
-          <a:xfrm>
-            <a:off x="1025236" y="324465"/>
-            <a:ext cx="4136699" cy="2728451"/>
-          </a:xfrm>
-          <a:prstGeom prst="roundRect">
-            <a:avLst>
-              <a:gd name="adj" fmla="val 0"/>
-            </a:avLst>
-          </a:prstGeom>
-          <a:solidFill>
-            <a:srgbClr val="CDA398"/>
-          </a:solidFill>
-          <a:ln w="28575">
-            <a:noFill/>
-          </a:ln>
-        </p:spPr>
-        <p:style>
-          <a:lnRef idx="1">
-            <a:schemeClr val="accent1"/>
-          </a:lnRef>
-          <a:fillRef idx="0">
-            <a:schemeClr val="accent1"/>
-          </a:fillRef>
-          <a:effectRef idx="0">
-            <a:schemeClr val="accent1"/>
-          </a:effectRef>
-          <a:fontRef idx="minor">
-            <a:schemeClr val="tx1"/>
-          </a:fontRef>
-        </p:style>
-        <p:txBody>
-          <a:bodyPr rtlCol="0" anchor="ctr"/>
-          <a:lstStyle/>
-          <a:p>
-            <a:r>
-              <a:rPr lang="en-US" altLang="zh-CN" dirty="0">
-                <a:latin typeface="Consolas" panose="020B0609020204030204" pitchFamily="49" charset="0"/>
-              </a:rPr>
-              <a:t>class animal</a:t>
-            </a:r>
-          </a:p>
-          <a:p>
-            <a:r>
-              <a:rPr lang="en-US" altLang="zh-CN" dirty="0">
-                <a:latin typeface="Consolas" panose="020B0609020204030204" pitchFamily="49" charset="0"/>
-              </a:rPr>
-              <a:t>{</a:t>
-            </a:r>
-          </a:p>
-          <a:p>
-            <a:r>
-              <a:rPr lang="en-US" altLang="zh-CN" dirty="0">
-                <a:latin typeface="Consolas" panose="020B0609020204030204" pitchFamily="49" charset="0"/>
-              </a:rPr>
-              <a:t>public:</a:t>
-            </a:r>
-            <a:endParaRPr lang="zh-CN" altLang="en-US" dirty="0">
-              <a:latin typeface="Consolas" panose="020B0609020204030204" pitchFamily="49" charset="0"/>
-            </a:endParaRPr>
-          </a:p>
-          <a:p>
-            <a:r>
-              <a:rPr lang="zh-CN" altLang="en-US" dirty="0">
-                <a:latin typeface="Consolas" panose="020B0609020204030204" pitchFamily="49" charset="0"/>
-              </a:rPr>
-              <a:t>    </a:t>
-            </a:r>
-            <a:r>
-              <a:rPr lang="en-US" altLang="zh-CN" dirty="0">
-                <a:latin typeface="Consolas" panose="020B0609020204030204" pitchFamily="49" charset="0"/>
-              </a:rPr>
-              <a:t>virtual void speak()</a:t>
-            </a:r>
-          </a:p>
-          <a:p>
-            <a:r>
-              <a:rPr lang="en-US" altLang="zh-CN" dirty="0">
-                <a:latin typeface="Consolas" panose="020B0609020204030204" pitchFamily="49" charset="0"/>
-              </a:rPr>
-              <a:t>    {</a:t>
-            </a:r>
-          </a:p>
-          <a:p>
-            <a:r>
-              <a:rPr lang="en-US" altLang="zh-CN" dirty="0">
-                <a:latin typeface="Consolas" panose="020B0609020204030204" pitchFamily="49" charset="0"/>
-              </a:rPr>
-              <a:t>        </a:t>
-            </a:r>
-            <a:r>
-              <a:rPr lang="en-US" altLang="zh-CN" dirty="0" err="1">
-                <a:latin typeface="Consolas" panose="020B0609020204030204" pitchFamily="49" charset="0"/>
-              </a:rPr>
-              <a:t>cout</a:t>
-            </a:r>
-            <a:r>
-              <a:rPr lang="en-US" altLang="zh-CN" dirty="0">
-                <a:latin typeface="Consolas" panose="020B0609020204030204" pitchFamily="49" charset="0"/>
-              </a:rPr>
-              <a:t>&lt;&lt;"</a:t>
-            </a:r>
-            <a:r>
-              <a:rPr lang="zh-CN" altLang="en-US" dirty="0">
-                <a:latin typeface="Consolas" panose="020B0609020204030204" pitchFamily="49" charset="0"/>
-              </a:rPr>
-              <a:t>动物在叫</a:t>
-            </a:r>
-            <a:r>
-              <a:rPr lang="en-US" altLang="zh-CN" dirty="0">
-                <a:latin typeface="Consolas" panose="020B0609020204030204" pitchFamily="49" charset="0"/>
-              </a:rPr>
-              <a:t>"&lt;&lt;</a:t>
-            </a:r>
-            <a:r>
-              <a:rPr lang="en-US" altLang="zh-CN" dirty="0" err="1">
-                <a:latin typeface="Consolas" panose="020B0609020204030204" pitchFamily="49" charset="0"/>
-              </a:rPr>
-              <a:t>endl</a:t>
-            </a:r>
-            <a:r>
-              <a:rPr lang="en-US" altLang="zh-CN" dirty="0">
-                <a:latin typeface="Consolas" panose="020B0609020204030204" pitchFamily="49" charset="0"/>
-              </a:rPr>
-              <a:t>; </a:t>
-            </a:r>
-          </a:p>
-          <a:p>
-            <a:r>
-              <a:rPr lang="en-US" altLang="zh-CN" dirty="0">
-                <a:latin typeface="Consolas" panose="020B0609020204030204" pitchFamily="49" charset="0"/>
-              </a:rPr>
-              <a:t>    }</a:t>
-            </a:r>
-          </a:p>
-          <a:p>
-            <a:r>
-              <a:rPr lang="en-US" altLang="zh-CN" dirty="0">
-                <a:latin typeface="Consolas" panose="020B0609020204030204" pitchFamily="49" charset="0"/>
-              </a:rPr>
-              <a:t>};</a:t>
-            </a:r>
-            <a:endParaRPr lang="zh-CN" altLang="en-US" dirty="0">
-              <a:latin typeface="Consolas" panose="020B0609020204030204" pitchFamily="49" charset="0"/>
-            </a:endParaRPr>
-          </a:p>
-        </p:txBody>
-      </p:sp>
-      <p:sp>
-        <p:nvSpPr>
-          <p:cNvPr id="14" name="矩形: 圆角 13">
-            <a:extLst>
-              <a:ext uri="{FF2B5EF4-FFF2-40B4-BE49-F238E27FC236}">
-                <a16:creationId xmlns:a16="http://schemas.microsoft.com/office/drawing/2014/main" id="{09775453-BC70-4664-B70E-FC2FC325BDEE}"/>
-              </a:ext>
-            </a:extLst>
-          </p:cNvPr>
-          <p:cNvSpPr/>
-          <p:nvPr/>
-        </p:nvSpPr>
-        <p:spPr>
-          <a:xfrm>
-            <a:off x="1025236" y="3279059"/>
-            <a:ext cx="4136699" cy="2728451"/>
-          </a:xfrm>
-          <a:prstGeom prst="roundRect">
-            <a:avLst>
-              <a:gd name="adj" fmla="val 0"/>
-            </a:avLst>
-          </a:prstGeom>
-          <a:solidFill>
-            <a:srgbClr val="CDA398"/>
-          </a:solidFill>
-          <a:ln w="28575">
-            <a:noFill/>
-          </a:ln>
-        </p:spPr>
-        <p:style>
-          <a:lnRef idx="1">
-            <a:schemeClr val="accent1"/>
-          </a:lnRef>
-          <a:fillRef idx="0">
-            <a:schemeClr val="accent1"/>
-          </a:fillRef>
-          <a:effectRef idx="0">
-            <a:schemeClr val="accent1"/>
-          </a:effectRef>
-          <a:fontRef idx="minor">
-            <a:schemeClr val="tx1"/>
-          </a:fontRef>
-        </p:style>
-        <p:txBody>
-          <a:bodyPr rtlCol="0" anchor="ctr"/>
-          <a:lstStyle/>
-          <a:p>
-            <a:r>
-              <a:rPr lang="en-US" altLang="zh-CN" dirty="0">
-                <a:latin typeface="Consolas" panose="020B0609020204030204" pitchFamily="49" charset="0"/>
-              </a:rPr>
-              <a:t>class </a:t>
-            </a:r>
-            <a:r>
-              <a:rPr lang="en-US" altLang="zh-CN" dirty="0" err="1">
-                <a:latin typeface="Consolas" panose="020B0609020204030204" pitchFamily="49" charset="0"/>
-              </a:rPr>
-              <a:t>cat:public</a:t>
-            </a:r>
-            <a:r>
-              <a:rPr lang="en-US" altLang="zh-CN" dirty="0">
-                <a:latin typeface="Consolas" panose="020B0609020204030204" pitchFamily="49" charset="0"/>
-              </a:rPr>
-              <a:t> animal </a:t>
-            </a:r>
-          </a:p>
-          <a:p>
-            <a:r>
-              <a:rPr lang="en-US" altLang="zh-CN" dirty="0">
-                <a:latin typeface="Consolas" panose="020B0609020204030204" pitchFamily="49" charset="0"/>
-              </a:rPr>
-              <a:t>{</a:t>
-            </a:r>
-          </a:p>
-          <a:p>
-            <a:r>
-              <a:rPr lang="en-US" altLang="zh-CN" dirty="0">
-                <a:latin typeface="Consolas" panose="020B0609020204030204" pitchFamily="49" charset="0"/>
-              </a:rPr>
-              <a:t>public:</a:t>
-            </a:r>
-          </a:p>
-          <a:p>
-            <a:r>
-              <a:rPr lang="en-US" altLang="zh-CN" dirty="0">
-                <a:latin typeface="Consolas" panose="020B0609020204030204" pitchFamily="49" charset="0"/>
-              </a:rPr>
-              <a:t>    void speak()</a:t>
-            </a:r>
-          </a:p>
-          <a:p>
-            <a:r>
-              <a:rPr lang="en-US" altLang="zh-CN" dirty="0">
-                <a:latin typeface="Consolas" panose="020B0609020204030204" pitchFamily="49" charset="0"/>
-              </a:rPr>
-              <a:t>    {</a:t>
-            </a:r>
-          </a:p>
-          <a:p>
-            <a:r>
-              <a:rPr lang="en-US" altLang="zh-CN" dirty="0">
-                <a:latin typeface="Consolas" panose="020B0609020204030204" pitchFamily="49" charset="0"/>
-              </a:rPr>
-              <a:t>        </a:t>
-            </a:r>
-            <a:r>
-              <a:rPr lang="en-US" altLang="zh-CN" dirty="0" err="1">
-                <a:latin typeface="Consolas" panose="020B0609020204030204" pitchFamily="49" charset="0"/>
-              </a:rPr>
-              <a:t>cout</a:t>
-            </a:r>
-            <a:r>
-              <a:rPr lang="en-US" altLang="zh-CN" dirty="0">
-                <a:latin typeface="Consolas" panose="020B0609020204030204" pitchFamily="49" charset="0"/>
-              </a:rPr>
-              <a:t>&lt;&lt;"</a:t>
-            </a:r>
-            <a:r>
-              <a:rPr lang="zh-CN" altLang="en-US" dirty="0">
-                <a:latin typeface="Consolas" panose="020B0609020204030204" pitchFamily="49" charset="0"/>
-              </a:rPr>
-              <a:t>喵喵喵</a:t>
-            </a:r>
-            <a:r>
-              <a:rPr lang="en-US" altLang="zh-CN" dirty="0">
-                <a:latin typeface="Consolas" panose="020B0609020204030204" pitchFamily="49" charset="0"/>
-              </a:rPr>
-              <a:t>"&lt;&lt;</a:t>
-            </a:r>
-            <a:r>
-              <a:rPr lang="en-US" altLang="zh-CN" dirty="0" err="1">
-                <a:latin typeface="Consolas" panose="020B0609020204030204" pitchFamily="49" charset="0"/>
-              </a:rPr>
-              <a:t>endl</a:t>
-            </a:r>
-            <a:r>
-              <a:rPr lang="en-US" altLang="zh-CN" dirty="0">
-                <a:latin typeface="Consolas" panose="020B0609020204030204" pitchFamily="49" charset="0"/>
-              </a:rPr>
-              <a:t>; </a:t>
-            </a:r>
-          </a:p>
-          <a:p>
-            <a:r>
-              <a:rPr lang="en-US" altLang="zh-CN" dirty="0">
-                <a:latin typeface="Consolas" panose="020B0609020204030204" pitchFamily="49" charset="0"/>
-              </a:rPr>
-              <a:t>    }</a:t>
-            </a:r>
-          </a:p>
-          <a:p>
-            <a:r>
-              <a:rPr lang="en-US" altLang="zh-CN" dirty="0">
-                <a:latin typeface="Consolas" panose="020B0609020204030204" pitchFamily="49" charset="0"/>
-              </a:rPr>
-              <a:t>}; </a:t>
-            </a:r>
-            <a:endParaRPr lang="zh-CN" altLang="en-US" dirty="0">
-              <a:latin typeface="Consolas" panose="020B0609020204030204" pitchFamily="49" charset="0"/>
-            </a:endParaRPr>
-          </a:p>
-        </p:txBody>
-      </p:sp>
-      <p:pic>
-        <p:nvPicPr>
-          <p:cNvPr id="7" name="图片 6">
-            <a:extLst>
-              <a:ext uri="{FF2B5EF4-FFF2-40B4-BE49-F238E27FC236}">
-                <a16:creationId xmlns:a16="http://schemas.microsoft.com/office/drawing/2014/main" id="{D387E465-E49B-4C40-974D-DA255E400ABE}"/>
-              </a:ext>
-            </a:extLst>
-          </p:cNvPr>
-          <p:cNvPicPr>
-            <a:picLocks noChangeAspect="1"/>
-          </p:cNvPicPr>
-          <p:nvPr/>
-        </p:nvPicPr>
-        <p:blipFill>
-          <a:blip r:embed="rId2">
-            <a:extLst>
-              <a:ext uri="{28A0092B-C50C-407E-A947-70E740481C1C}">
-                <a14:useLocalDpi xmlns:a14="http://schemas.microsoft.com/office/drawing/2010/main" val="0"/>
-              </a:ext>
-            </a:extLst>
-          </a:blip>
-          <a:stretch>
-            <a:fillRect/>
-          </a:stretch>
-        </p:blipFill>
-        <p:spPr>
-          <a:xfrm>
-            <a:off x="5149235" y="324464"/>
-            <a:ext cx="3723969" cy="2728451"/>
-          </a:xfrm>
-          <a:prstGeom prst="rect">
-            <a:avLst/>
-          </a:prstGeom>
-        </p:spPr>
-      </p:pic>
-      <p:sp>
-        <p:nvSpPr>
-          <p:cNvPr id="8" name="矩形: 圆角 7">
-            <a:extLst>
-              <a:ext uri="{FF2B5EF4-FFF2-40B4-BE49-F238E27FC236}">
-                <a16:creationId xmlns:a16="http://schemas.microsoft.com/office/drawing/2014/main" id="{346C4C06-BCB8-4FC2-8542-3CBA62201CCC}"/>
-              </a:ext>
-            </a:extLst>
-          </p:cNvPr>
-          <p:cNvSpPr/>
-          <p:nvPr/>
-        </p:nvSpPr>
-        <p:spPr>
-          <a:xfrm>
-            <a:off x="9055100" y="489564"/>
-            <a:ext cx="1828800" cy="450236"/>
-          </a:xfrm>
-          <a:prstGeom prst="roundRect">
-            <a:avLst/>
-          </a:prstGeom>
-          <a:solidFill>
-            <a:srgbClr val="F9EBE9"/>
-          </a:solidFill>
-          <a:ln w="28575">
-            <a:noFill/>
-          </a:ln>
-        </p:spPr>
-        <p:style>
-          <a:lnRef idx="1">
-            <a:schemeClr val="accent1"/>
-          </a:lnRef>
-          <a:fillRef idx="0">
-            <a:schemeClr val="accent1"/>
-          </a:fillRef>
-          <a:effectRef idx="0">
-            <a:schemeClr val="accent1"/>
-          </a:effectRef>
-          <a:fontRef idx="minor">
-            <a:schemeClr val="tx1"/>
-          </a:fontRef>
-        </p:style>
-        <p:txBody>
-          <a:bodyPr rtlCol="0" anchor="ctr"/>
-          <a:lstStyle/>
-          <a:p>
-            <a:pPr algn="ctr"/>
-            <a:r>
-              <a:rPr lang="en-US" altLang="zh-CN" dirty="0" err="1"/>
-              <a:t>vfptr</a:t>
-            </a:r>
-            <a:endParaRPr lang="zh-CN" altLang="en-US" dirty="0"/>
-          </a:p>
-        </p:txBody>
-      </p:sp>
-      <p:cxnSp>
-        <p:nvCxnSpPr>
-          <p:cNvPr id="15" name="直接箭头连接符 14">
-            <a:extLst>
-              <a:ext uri="{FF2B5EF4-FFF2-40B4-BE49-F238E27FC236}">
-                <a16:creationId xmlns:a16="http://schemas.microsoft.com/office/drawing/2014/main" id="{210D5DAD-9158-4366-8C28-063CC7C5E839}"/>
-              </a:ext>
-            </a:extLst>
-          </p:cNvPr>
-          <p:cNvCxnSpPr>
-            <a:cxnSpLocks/>
-            <a:stCxn id="8" idx="2"/>
-          </p:cNvCxnSpPr>
+          <p:cNvCxnSpPr/>
           <p:nvPr/>
         </p:nvCxnSpPr>
         <p:spPr>
           <a:xfrm>
-            <a:off x="9969500" y="939800"/>
-            <a:ext cx="0" cy="304800"/>
+            <a:off x="3935760" y="1988840"/>
+            <a:ext cx="0" cy="2491153"/>
           </a:xfrm>
-          <a:prstGeom prst="straightConnector1">
+          <a:prstGeom prst="line">
             <a:avLst/>
           </a:prstGeom>
-          <a:ln w="28575">
+          <a:ln w="76200">
             <a:solidFill>
               <a:srgbClr val="390606"/>
             </a:solidFill>
             <a:headEnd type="none" w="med" len="med"/>
-            <a:tailEnd type="triangle"/>
+            <a:tailEnd type="none" w="med" len="med"/>
           </a:ln>
         </p:spPr>
         <p:style>
@@ -32420,88 +32015,32 @@
           </a:fontRef>
         </p:style>
       </p:cxnSp>
-      <p:sp>
-        <p:nvSpPr>
-          <p:cNvPr id="23" name="矩形: 圆角 22">
+      <p:cxnSp>
+        <p:nvCxnSpPr>
+          <p:cNvPr id="4" name="直接连接符 3">
             <a:extLst>
               <a:ext uri="{FF2B5EF4-FFF2-40B4-BE49-F238E27FC236}">
-                <a16:creationId xmlns:a16="http://schemas.microsoft.com/office/drawing/2014/main" id="{2C9A129F-BEF3-44DA-967B-A38A65515C3F}"/>
+                <a16:creationId xmlns:a16="http://schemas.microsoft.com/office/drawing/2014/main" id="{1C0E1F9A-C0DA-42D9-AE1D-9D62A750DFFE}"/>
               </a:ext>
             </a:extLst>
           </p:cNvPr>
-          <p:cNvSpPr/>
-          <p:nvPr/>
-        </p:nvSpPr>
-        <p:spPr>
-          <a:xfrm>
-            <a:off x="9055100" y="3456859"/>
-            <a:ext cx="1828800" cy="450236"/>
-          </a:xfrm>
-          <a:prstGeom prst="roundRect">
-            <a:avLst/>
-          </a:prstGeom>
-          <a:solidFill>
-            <a:srgbClr val="F9EBE9"/>
-          </a:solidFill>
-          <a:ln w="28575">
-            <a:noFill/>
-          </a:ln>
-        </p:spPr>
-        <p:style>
-          <a:lnRef idx="1">
-            <a:schemeClr val="accent1"/>
-          </a:lnRef>
-          <a:fillRef idx="0">
-            <a:schemeClr val="accent1"/>
-          </a:fillRef>
-          <a:effectRef idx="0">
-            <a:schemeClr val="accent1"/>
-          </a:effectRef>
-          <a:fontRef idx="minor">
-            <a:schemeClr val="tx1"/>
-          </a:fontRef>
-        </p:style>
-        <p:txBody>
-          <a:bodyPr rtlCol="0" anchor="ctr"/>
-          <a:lstStyle/>
-          <a:p>
-            <a:pPr algn="ctr"/>
-            <a:r>
-              <a:rPr lang="en-US" altLang="zh-CN" dirty="0" err="1"/>
-              <a:t>vfptr</a:t>
-            </a:r>
-            <a:endParaRPr lang="zh-CN" altLang="en-US" dirty="0"/>
-          </a:p>
-        </p:txBody>
-      </p:sp>
-      <p:cxnSp>
-        <p:nvCxnSpPr>
-          <p:cNvPr id="24" name="直接箭头连接符 23">
-            <a:extLst>
-              <a:ext uri="{FF2B5EF4-FFF2-40B4-BE49-F238E27FC236}">
-                <a16:creationId xmlns:a16="http://schemas.microsoft.com/office/drawing/2014/main" id="{E3CB7C11-F62B-451B-9698-1441BAF4861B}"/>
-              </a:ext>
-            </a:extLst>
-          </p:cNvPr>
-          <p:cNvCxnSpPr>
-            <a:cxnSpLocks/>
-          </p:cNvCxnSpPr>
+          <p:cNvCxnSpPr/>
           <p:nvPr/>
         </p:nvCxnSpPr>
         <p:spPr>
           <a:xfrm>
-            <a:off x="9969500" y="3907095"/>
-            <a:ext cx="0" cy="304800"/>
+            <a:off x="6096000" y="1988840"/>
+            <a:ext cx="0" cy="2491153"/>
           </a:xfrm>
-          <a:prstGeom prst="straightConnector1">
+          <a:prstGeom prst="line">
             <a:avLst/>
           </a:prstGeom>
-          <a:ln w="28575">
+          <a:ln w="76200">
             <a:solidFill>
               <a:srgbClr val="390606"/>
             </a:solidFill>
             <a:headEnd type="none" w="med" len="med"/>
-            <a:tailEnd type="triangle"/>
+            <a:tailEnd type="none" w="med" len="med"/>
           </a:ln>
         </p:spPr>
         <p:style>
@@ -32519,33 +32058,32 @@
           </a:fontRef>
         </p:style>
       </p:cxnSp>
-      <p:sp>
-        <p:nvSpPr>
-          <p:cNvPr id="25" name="矩形: 圆角 24">
+      <p:cxnSp>
+        <p:nvCxnSpPr>
+          <p:cNvPr id="5" name="直接连接符 4">
             <a:extLst>
               <a:ext uri="{FF2B5EF4-FFF2-40B4-BE49-F238E27FC236}">
-                <a16:creationId xmlns:a16="http://schemas.microsoft.com/office/drawing/2014/main" id="{7E5E419F-7B68-450F-8B41-93996B9C18D6}"/>
+                <a16:creationId xmlns:a16="http://schemas.microsoft.com/office/drawing/2014/main" id="{F7902A41-D861-492B-B580-2EBF5AD2AFCC}"/>
               </a:ext>
             </a:extLst>
           </p:cNvPr>
-          <p:cNvSpPr/>
+          <p:cNvCxnSpPr/>
           <p:nvPr/>
-        </p:nvSpPr>
+        </p:nvCxnSpPr>
         <p:spPr>
           <a:xfrm>
-            <a:off x="9055100" y="1244600"/>
-            <a:ext cx="1828800" cy="1625600"/>
+            <a:off x="8256240" y="1988840"/>
+            <a:ext cx="0" cy="2491153"/>
           </a:xfrm>
-          <a:prstGeom prst="roundRect">
-            <a:avLst>
-              <a:gd name="adj" fmla="val 3906"/>
-            </a:avLst>
+          <a:prstGeom prst="line">
+            <a:avLst/>
           </a:prstGeom>
-          <a:solidFill>
-            <a:srgbClr val="EFCAC3"/>
-          </a:solidFill>
-          <a:ln w="28575">
-            <a:noFill/>
+          <a:ln w="76200">
+            <a:solidFill>
+              <a:srgbClr val="390606"/>
+            </a:solidFill>
+            <a:headEnd type="none" w="med" len="med"/>
+            <a:tailEnd type="none" w="med" len="med"/>
           </a:ln>
         </p:spPr>
         <p:style>
@@ -32562,153 +32100,11 @@
             <a:schemeClr val="tx1"/>
           </a:fontRef>
         </p:style>
-        <p:txBody>
-          <a:bodyPr rtlCol="0" anchor="ctr"/>
-          <a:lstStyle/>
-          <a:p>
-            <a:pPr algn="ctr"/>
-            <a:r>
-              <a:rPr lang="en-US" altLang="zh-CN" dirty="0" err="1"/>
-              <a:t>Vftable</a:t>
-            </a:r>
-            <a:endParaRPr lang="en-US" altLang="zh-CN" dirty="0"/>
-          </a:p>
-          <a:p>
-            <a:pPr algn="ctr"/>
-            <a:endParaRPr lang="en-US" altLang="zh-CN" dirty="0"/>
-          </a:p>
-          <a:p>
-            <a:pPr algn="ctr"/>
-            <a:r>
-              <a:rPr lang="en-US" altLang="zh-CN" dirty="0"/>
-              <a:t>&amp;animal::speak</a:t>
-            </a:r>
-          </a:p>
-          <a:p>
-            <a:pPr algn="ctr"/>
-            <a:endParaRPr lang="en-US" altLang="zh-CN" dirty="0"/>
-          </a:p>
-          <a:p>
-            <a:pPr algn="ctr"/>
-            <a:endParaRPr lang="zh-CN" altLang="en-US" dirty="0"/>
-          </a:p>
-        </p:txBody>
-      </p:sp>
-      <p:sp>
-        <p:nvSpPr>
-          <p:cNvPr id="26" name="矩形: 圆角 25">
-            <a:extLst>
-              <a:ext uri="{FF2B5EF4-FFF2-40B4-BE49-F238E27FC236}">
-                <a16:creationId xmlns:a16="http://schemas.microsoft.com/office/drawing/2014/main" id="{6457A2AD-D0A4-45FA-8A92-FDA319B7473C}"/>
-              </a:ext>
-            </a:extLst>
-          </p:cNvPr>
-          <p:cNvSpPr/>
-          <p:nvPr/>
-        </p:nvSpPr>
-        <p:spPr>
-          <a:xfrm>
-            <a:off x="9055100" y="4224595"/>
-            <a:ext cx="1828800" cy="1625600"/>
-          </a:xfrm>
-          <a:prstGeom prst="roundRect">
-            <a:avLst>
-              <a:gd name="adj" fmla="val 4167"/>
-            </a:avLst>
-          </a:prstGeom>
-          <a:solidFill>
-            <a:srgbClr val="EFCAC3"/>
-          </a:solidFill>
-          <a:ln w="28575">
-            <a:noFill/>
-          </a:ln>
-        </p:spPr>
-        <p:style>
-          <a:lnRef idx="1">
-            <a:schemeClr val="accent1"/>
-          </a:lnRef>
-          <a:fillRef idx="0">
-            <a:schemeClr val="accent1"/>
-          </a:fillRef>
-          <a:effectRef idx="0">
-            <a:schemeClr val="accent1"/>
-          </a:effectRef>
-          <a:fontRef idx="minor">
-            <a:schemeClr val="tx1"/>
-          </a:fontRef>
-        </p:style>
-        <p:txBody>
-          <a:bodyPr rtlCol="0" anchor="ctr"/>
-          <a:lstStyle/>
-          <a:p>
-            <a:pPr algn="ctr"/>
-            <a:r>
-              <a:rPr lang="en-US" altLang="zh-CN" dirty="0" err="1"/>
-              <a:t>Vftable</a:t>
-            </a:r>
-            <a:endParaRPr lang="en-US" altLang="zh-CN" dirty="0"/>
-          </a:p>
-          <a:p>
-            <a:pPr algn="ctr"/>
-            <a:endParaRPr lang="en-US" altLang="zh-CN" dirty="0"/>
-          </a:p>
-          <a:p>
-            <a:pPr algn="ctr"/>
-            <a:r>
-              <a:rPr lang="en-US" altLang="zh-CN" dirty="0"/>
-              <a:t>&amp;cat::speak</a:t>
-            </a:r>
-          </a:p>
-          <a:p>
-            <a:pPr algn="ctr"/>
-            <a:endParaRPr lang="en-US" altLang="zh-CN" dirty="0"/>
-          </a:p>
-          <a:p>
-            <a:pPr algn="ctr"/>
-            <a:endParaRPr lang="zh-CN" altLang="en-US" dirty="0"/>
-          </a:p>
-        </p:txBody>
-      </p:sp>
-      <p:pic>
-        <p:nvPicPr>
-          <p:cNvPr id="27" name="图片 26">
-            <a:extLst>
-              <a:ext uri="{FF2B5EF4-FFF2-40B4-BE49-F238E27FC236}">
-                <a16:creationId xmlns:a16="http://schemas.microsoft.com/office/drawing/2014/main" id="{3D0A15E3-9EFC-4BC3-8034-30A4CE4F508A}"/>
-              </a:ext>
-            </a:extLst>
-          </p:cNvPr>
-          <p:cNvPicPr>
-            <a:picLocks noChangeAspect="1"/>
-          </p:cNvPicPr>
-          <p:nvPr/>
-        </p:nvPicPr>
-        <p:blipFill>
-          <a:blip r:embed="rId3">
-            <a:extLst>
-              <a:ext uri="{28A0092B-C50C-407E-A947-70E740481C1C}">
-                <a14:useLocalDpi xmlns:a14="http://schemas.microsoft.com/office/drawing/2010/main" val="0"/>
-              </a:ext>
-            </a:extLst>
-          </a:blip>
-          <a:stretch>
-            <a:fillRect/>
-          </a:stretch>
-        </p:blipFill>
-        <p:spPr>
-          <a:xfrm>
-            <a:off x="5151066" y="3279058"/>
-            <a:ext cx="3742303" cy="2728450"/>
-          </a:xfrm>
-          <a:prstGeom prst="rect">
-            <a:avLst/>
-          </a:prstGeom>
-        </p:spPr>
-      </p:pic>
+      </p:cxnSp>
     </p:spTree>
     <p:extLst>
       <p:ext uri="{BB962C8B-B14F-4D97-AF65-F5344CB8AC3E}">
-        <p14:creationId xmlns:p14="http://schemas.microsoft.com/office/powerpoint/2010/main" val="121297361"/>
+        <p14:creationId xmlns:p14="http://schemas.microsoft.com/office/powerpoint/2010/main" val="415010363"/>
       </p:ext>
     </p:extLst>
   </p:cSld>
@@ -33040,7 +32436,7 @@
             <a:srgbClr val="390606"/>
           </a:solidFill>
           <a:headEnd type="none" w="med" len="med"/>
-          <a:tailEnd type="arrow" w="med" len="med"/>
+          <a:tailEnd type="none" w="med" len="med"/>
         </a:ln>
       </a:spPr>
       <a:bodyPr/>

</xml_diff>